<commit_message>
altre slide su concurrency profiler
</commit_message>
<xml_diff>
--- a/presentazioneCDAYS2014.pptx
+++ b/presentazioneCDAYS2014.pptx
@@ -5,10 +5,10 @@
     <p:sldMasterId id="2147483840" r:id="rId1"/>
   </p:sldMasterIdLst>
   <p:notesMasterIdLst>
-    <p:notesMasterId r:id="rId35"/>
+    <p:notesMasterId r:id="rId36"/>
   </p:notesMasterIdLst>
   <p:handoutMasterIdLst>
-    <p:handoutMasterId r:id="rId36"/>
+    <p:handoutMasterId r:id="rId37"/>
   </p:handoutMasterIdLst>
   <p:sldIdLst>
     <p:sldId id="256" r:id="rId2"/>
@@ -37,13 +37,14 @@
     <p:sldId id="282" r:id="rId25"/>
     <p:sldId id="283" r:id="rId26"/>
     <p:sldId id="285" r:id="rId27"/>
-    <p:sldId id="286" r:id="rId28"/>
-    <p:sldId id="288" r:id="rId29"/>
-    <p:sldId id="289" r:id="rId30"/>
-    <p:sldId id="290" r:id="rId31"/>
-    <p:sldId id="262" r:id="rId32"/>
-    <p:sldId id="264" r:id="rId33"/>
-    <p:sldId id="263" r:id="rId34"/>
+    <p:sldId id="291" r:id="rId28"/>
+    <p:sldId id="292" r:id="rId29"/>
+    <p:sldId id="288" r:id="rId30"/>
+    <p:sldId id="289" r:id="rId31"/>
+    <p:sldId id="290" r:id="rId32"/>
+    <p:sldId id="262" r:id="rId33"/>
+    <p:sldId id="264" r:id="rId34"/>
+    <p:sldId id="263" r:id="rId35"/>
   </p:sldIdLst>
   <p:sldSz cx="12192000" cy="6858000"/>
   <p:notesSz cx="6858000" cy="9144000"/>
@@ -173,7 +174,8 @@
             <p14:sldId id="282"/>
             <p14:sldId id="283"/>
             <p14:sldId id="285"/>
-            <p14:sldId id="286"/>
+            <p14:sldId id="291"/>
+            <p14:sldId id="292"/>
             <p14:sldId id="288"/>
             <p14:sldId id="289"/>
             <p14:sldId id="290"/>
@@ -288,7 +290,7 @@
           <a:p>
             <a:fld id="{7541E3AA-7BE5-4B59-82F5-30F2E5FF0CD3}" type="datetimeFigureOut">
               <a:rPr lang="it-IT" smtClean="0"/>
-              <a:t>09/02/2014</a:t>
+              <a:t>12/02/2014</a:t>
             </a:fld>
             <a:endParaRPr lang="it-IT"/>
           </a:p>
@@ -453,7 +455,7 @@
           <a:p>
             <a:fld id="{1634FCDD-F444-4746-A037-762098AD364A}" type="datetimeFigureOut">
               <a:rPr lang="it-IT" smtClean="0"/>
-              <a:t>09/02/2014</a:t>
+              <a:t>12/02/2014</a:t>
             </a:fld>
             <a:endParaRPr lang="it-IT"/>
           </a:p>
@@ -974,7 +976,7 @@
               <a:pPr>
                 <a:defRPr/>
               </a:pPr>
-              <a:t>31</a:t>
+              <a:t>32</a:t>
             </a:fld>
             <a:endParaRPr lang="it-IT"/>
           </a:p>
@@ -1067,7 +1069,7 @@
           <a:p>
             <a:fld id="{6B6C5E1B-63F6-4CD9-93BD-FBDB130EB2E4}" type="slidenum">
               <a:rPr lang="it-IT" smtClean="0"/>
-              <a:t>33</a:t>
+              <a:t>34</a:t>
             </a:fld>
             <a:endParaRPr lang="it-IT"/>
           </a:p>
@@ -1513,7 +1515,7 @@
           <a:p>
             <a:fld id="{06D8BB37-67E1-420F-B488-3DE93FA3DF1F}" type="datetimeFigureOut">
               <a:rPr lang="en-US" dirty="0"/>
-              <a:t>2/9/2014</a:t>
+              <a:t>2/12/2014</a:t>
             </a:fld>
             <a:endParaRPr lang="en-US" dirty="0"/>
           </a:p>
@@ -1717,7 +1719,7 @@
           <a:p>
             <a:fld id="{E4B96382-B15D-466F-9E7D-0603461872B7}" type="datetimeFigureOut">
               <a:rPr lang="en-US" dirty="0"/>
-              <a:t>2/9/2014</a:t>
+              <a:t>2/12/2014</a:t>
             </a:fld>
             <a:endParaRPr lang="en-US" dirty="0"/>
           </a:p>
@@ -1973,7 +1975,7 @@
           <a:p>
             <a:fld id="{218672AE-FC7B-40BA-8844-0693A2434617}" type="datetimeFigureOut">
               <a:rPr lang="en-US" dirty="0"/>
-              <a:t>2/9/2014</a:t>
+              <a:t>2/12/2014</a:t>
             </a:fld>
             <a:endParaRPr lang="en-US" dirty="0"/>
           </a:p>
@@ -2217,7 +2219,7 @@
           <a:p>
             <a:fld id="{3568EC8D-9508-4A2C-8FBC-4C089BA52EE5}" type="datetimeFigureOut">
               <a:rPr lang="en-US" dirty="0"/>
-              <a:t>2/9/2014</a:t>
+              <a:t>2/12/2014</a:t>
             </a:fld>
             <a:endParaRPr lang="en-US" dirty="0"/>
           </a:p>
@@ -2542,7 +2544,7 @@
           <a:p>
             <a:fld id="{DB7A1C89-C29A-4D79-B5A1-1F424905E9A1}" type="datetimeFigureOut">
               <a:rPr lang="en-US" dirty="0"/>
-              <a:t>2/9/2014</a:t>
+              <a:t>2/12/2014</a:t>
             </a:fld>
             <a:endParaRPr lang="en-US" dirty="0"/>
           </a:p>
@@ -2906,7 +2908,7 @@
           <a:p>
             <a:fld id="{57ECC248-0691-4AB1-BB8B-882D656FF160}" type="datetimeFigureOut">
               <a:rPr lang="en-US" dirty="0"/>
-              <a:t>2/9/2014</a:t>
+              <a:t>2/12/2014</a:t>
             </a:fld>
             <a:endParaRPr lang="en-US" dirty="0"/>
           </a:p>
@@ -3433,7 +3435,7 @@
           <a:p>
             <a:fld id="{D4E54B09-E178-460F-B46D-023FA9745608}" type="datetimeFigureOut">
               <a:rPr lang="en-US" dirty="0"/>
-              <a:t>2/9/2014</a:t>
+              <a:t>2/12/2014</a:t>
             </a:fld>
             <a:endParaRPr lang="en-US" dirty="0"/>
           </a:p>
@@ -3627,7 +3629,7 @@
           <a:p>
             <a:fld id="{6CD62E06-21B3-4A3D-A6C8-F0DFEB8AB04D}" type="datetimeFigureOut">
               <a:rPr lang="en-US" dirty="0"/>
-              <a:t>2/9/2014</a:t>
+              <a:t>2/12/2014</a:t>
             </a:fld>
             <a:endParaRPr lang="en-US" dirty="0"/>
           </a:p>
@@ -3788,7 +3790,7 @@
           <a:p>
             <a:fld id="{2CC7CC01-41FD-4607-B8B1-976991065B2D}" type="datetimeFigureOut">
               <a:rPr lang="en-US" dirty="0"/>
-              <a:t>2/9/2014</a:t>
+              <a:t>2/12/2014</a:t>
             </a:fld>
             <a:endParaRPr lang="en-US" dirty="0"/>
           </a:p>
@@ -4152,7 +4154,7 @@
           <a:p>
             <a:fld id="{6D6740A7-C153-476A-BA27-5BE657EA7C21}" type="datetimeFigureOut">
               <a:rPr lang="en-US" dirty="0"/>
-              <a:t>2/9/2014</a:t>
+              <a:t>2/12/2014</a:t>
             </a:fld>
             <a:endParaRPr lang="en-US" dirty="0"/>
           </a:p>
@@ -4418,7 +4420,7 @@
           <a:p>
             <a:fld id="{1C86C2EC-F3EA-4AFE-88D7-51A6BBFDBA8B}" type="datetimeFigureOut">
               <a:rPr lang="en-US" dirty="0"/>
-              <a:t>2/9/2014</a:t>
+              <a:t>2/12/2014</a:t>
             </a:fld>
             <a:endParaRPr lang="en-US" dirty="0"/>
           </a:p>
@@ -4812,7 +4814,7 @@
           <a:p>
             <a:fld id="{BF2EAB5F-78EB-45CA-9E26-D1BAA0AA6EEC}" type="datetimeFigureOut">
               <a:rPr lang="en-US" dirty="0"/>
-              <a:t>2/9/2014</a:t>
+              <a:t>2/12/2014</a:t>
             </a:fld>
             <a:endParaRPr lang="en-US" dirty="0"/>
           </a:p>
@@ -12757,11 +12759,7 @@
           <a:p>
             <a:r>
               <a:rPr lang="en-US" dirty="0" smtClean="0"/>
-              <a:t>Concurrency - </a:t>
-            </a:r>
-            <a:r>
-              <a:rPr lang="en-US" dirty="0" err="1" smtClean="0"/>
-              <a:t>todo</a:t>
+              <a:t>Concurrency</a:t>
             </a:r>
             <a:endParaRPr lang="it-IT" dirty="0"/>
           </a:p>
@@ -12784,38 +12782,583 @@
           </a:bodyPr>
           <a:lstStyle/>
           <a:p>
+            <a:pPr lvl="0" algn="just"/>
+            <a:r>
+              <a:rPr lang="en-US" dirty="0" smtClean="0"/>
+              <a:t>Serve a </a:t>
+            </a:r>
+            <a:r>
+              <a:rPr lang="en-US" dirty="0" err="1" smtClean="0"/>
+              <a:t>individuare</a:t>
+            </a:r>
+            <a:r>
+              <a:rPr lang="en-US" dirty="0" smtClean="0"/>
+              <a:t> </a:t>
+            </a:r>
+            <a:r>
+              <a:rPr lang="en-US" dirty="0" err="1" smtClean="0"/>
+              <a:t>eventuali</a:t>
+            </a:r>
+            <a:r>
+              <a:rPr lang="en-US" dirty="0" smtClean="0"/>
+              <a:t> bottleneck in </a:t>
+            </a:r>
+            <a:r>
+              <a:rPr lang="en-US" dirty="0" err="1" smtClean="0"/>
+              <a:t>applicazioni</a:t>
+            </a:r>
+            <a:r>
+              <a:rPr lang="en-US" dirty="0" smtClean="0"/>
+              <a:t> multithread, in </a:t>
+            </a:r>
+            <a:r>
+              <a:rPr lang="en-US" dirty="0" err="1" smtClean="0"/>
+              <a:t>particolare</a:t>
+            </a:r>
+            <a:r>
+              <a:rPr lang="en-US" dirty="0" smtClean="0"/>
+              <a:t> </a:t>
+            </a:r>
+            <a:r>
+              <a:rPr lang="en-US" dirty="0" err="1" smtClean="0"/>
+              <a:t>nell’accesso</a:t>
+            </a:r>
+            <a:r>
+              <a:rPr lang="en-US" dirty="0" smtClean="0"/>
+              <a:t> a </a:t>
+            </a:r>
+            <a:r>
+              <a:rPr lang="en-US" dirty="0" err="1" smtClean="0"/>
+              <a:t>risorse</a:t>
+            </a:r>
+            <a:r>
+              <a:rPr lang="en-US" dirty="0" smtClean="0"/>
+              <a:t> </a:t>
+            </a:r>
+            <a:r>
+              <a:rPr lang="en-US" dirty="0" err="1" smtClean="0"/>
+              <a:t>condivise</a:t>
+            </a:r>
+            <a:endParaRPr lang="en-US" dirty="0"/>
+          </a:p>
+          <a:p>
+            <a:pPr lvl="0" algn="just"/>
+            <a:r>
+              <a:rPr lang="en-US" dirty="0" err="1" smtClean="0"/>
+              <a:t>Suppponiamo</a:t>
+            </a:r>
+            <a:r>
+              <a:rPr lang="en-US" dirty="0" smtClean="0"/>
+              <a:t> </a:t>
+            </a:r>
+            <a:r>
+              <a:rPr lang="en-US" dirty="0" err="1" smtClean="0"/>
+              <a:t>una</a:t>
+            </a:r>
+            <a:r>
+              <a:rPr lang="en-US" dirty="0" smtClean="0"/>
+              <a:t> </a:t>
+            </a:r>
+            <a:r>
+              <a:rPr lang="en-US" dirty="0" err="1" smtClean="0"/>
+              <a:t>situazione</a:t>
+            </a:r>
+            <a:r>
+              <a:rPr lang="en-US" dirty="0" smtClean="0"/>
+              <a:t> di </a:t>
+            </a:r>
+            <a:r>
+              <a:rPr lang="en-US" b="1" dirty="0" smtClean="0"/>
+              <a:t>due</a:t>
+            </a:r>
+            <a:r>
+              <a:rPr lang="en-US" dirty="0" smtClean="0"/>
+              <a:t> thread </a:t>
+            </a:r>
+            <a:r>
+              <a:rPr lang="en-US" dirty="0" err="1" smtClean="0"/>
+              <a:t>che</a:t>
+            </a:r>
+            <a:r>
+              <a:rPr lang="en-US" dirty="0" smtClean="0"/>
+              <a:t> </a:t>
+            </a:r>
+            <a:r>
+              <a:rPr lang="en-US" dirty="0" err="1" smtClean="0"/>
+              <a:t>scrivono</a:t>
+            </a:r>
+            <a:r>
+              <a:rPr lang="en-US" dirty="0" smtClean="0"/>
+              <a:t> </a:t>
+            </a:r>
+            <a:r>
+              <a:rPr lang="en-US" dirty="0" err="1" smtClean="0"/>
+              <a:t>su</a:t>
+            </a:r>
+            <a:r>
+              <a:rPr lang="en-US" dirty="0" smtClean="0"/>
+              <a:t> </a:t>
+            </a:r>
+            <a:r>
+              <a:rPr lang="en-US" dirty="0" err="1" smtClean="0"/>
+              <a:t>una</a:t>
+            </a:r>
+            <a:r>
+              <a:rPr lang="en-US" dirty="0" smtClean="0"/>
+              <a:t> </a:t>
+            </a:r>
+            <a:r>
+              <a:rPr lang="en-US" dirty="0" err="1" smtClean="0"/>
+              <a:t>mappa</a:t>
+            </a:r>
+            <a:r>
+              <a:rPr lang="en-US" dirty="0" smtClean="0"/>
+              <a:t>, la quale è </a:t>
+            </a:r>
+            <a:r>
+              <a:rPr lang="en-US" dirty="0" err="1" smtClean="0"/>
+              <a:t>sottoposta</a:t>
+            </a:r>
+            <a:r>
+              <a:rPr lang="en-US" dirty="0" smtClean="0"/>
+              <a:t> ad un </a:t>
+            </a:r>
+            <a:r>
+              <a:rPr lang="en-US" dirty="0" err="1" smtClean="0"/>
+              <a:t>evento</a:t>
+            </a:r>
+            <a:r>
+              <a:rPr lang="en-US" dirty="0" smtClean="0"/>
+              <a:t> </a:t>
+            </a:r>
+            <a:r>
+              <a:rPr lang="en-US" dirty="0" err="1" smtClean="0"/>
+              <a:t>bloccante</a:t>
+            </a:r>
+            <a:r>
+              <a:rPr lang="en-US" dirty="0" smtClean="0"/>
+              <a:t> (</a:t>
+            </a:r>
+            <a:r>
+              <a:rPr lang="en-US" dirty="0" err="1" smtClean="0"/>
+              <a:t>mutex</a:t>
+            </a:r>
+            <a:r>
+              <a:rPr lang="en-US" dirty="0" smtClean="0"/>
+              <a:t>). </a:t>
+            </a:r>
+            <a:r>
+              <a:rPr lang="en-US" dirty="0" err="1" smtClean="0"/>
+              <a:t>All’interno</a:t>
+            </a:r>
+            <a:r>
+              <a:rPr lang="en-US" dirty="0" smtClean="0"/>
+              <a:t> </a:t>
+            </a:r>
+            <a:r>
+              <a:rPr lang="en-US" dirty="0" err="1" smtClean="0"/>
+              <a:t>della</a:t>
+            </a:r>
+            <a:r>
+              <a:rPr lang="en-US" dirty="0" smtClean="0"/>
+              <a:t> </a:t>
+            </a:r>
+            <a:r>
+              <a:rPr lang="en-US" dirty="0" err="1" smtClean="0"/>
+              <a:t>sezione</a:t>
+            </a:r>
+            <a:r>
+              <a:rPr lang="en-US" dirty="0" smtClean="0"/>
+              <a:t> </a:t>
+            </a:r>
+            <a:r>
+              <a:rPr lang="en-US" dirty="0" err="1" smtClean="0"/>
+              <a:t>critica</a:t>
+            </a:r>
+            <a:r>
+              <a:rPr lang="en-US" dirty="0" smtClean="0"/>
+              <a:t>, </a:t>
+            </a:r>
+            <a:r>
+              <a:rPr lang="en-US" dirty="0" err="1" smtClean="0"/>
+              <a:t>simuliamo</a:t>
+            </a:r>
+            <a:r>
+              <a:rPr lang="en-US" dirty="0" smtClean="0"/>
+              <a:t> </a:t>
+            </a:r>
+            <a:r>
+              <a:rPr lang="en-US" dirty="0" err="1" smtClean="0"/>
+              <a:t>l’evento</a:t>
+            </a:r>
+            <a:r>
+              <a:rPr lang="en-US" dirty="0" smtClean="0"/>
+              <a:t> </a:t>
+            </a:r>
+            <a:r>
+              <a:rPr lang="en-US" dirty="0" err="1" smtClean="0"/>
+              <a:t>bloccante</a:t>
+            </a:r>
+            <a:r>
+              <a:rPr lang="en-US" dirty="0" smtClean="0"/>
+              <a:t> con </a:t>
+            </a:r>
+            <a:r>
+              <a:rPr lang="en-US" dirty="0" err="1" smtClean="0"/>
+              <a:t>uno</a:t>
+            </a:r>
+            <a:r>
+              <a:rPr lang="en-US" dirty="0" smtClean="0"/>
+              <a:t> sleep</a:t>
+            </a:r>
+          </a:p>
+          <a:p>
+            <a:pPr lvl="0" algn="just"/>
+            <a:r>
+              <a:rPr lang="en-US" dirty="0" err="1" smtClean="0"/>
+              <a:t>Abbiamo</a:t>
+            </a:r>
+            <a:r>
+              <a:rPr lang="en-US" dirty="0"/>
+              <a:t> </a:t>
+            </a:r>
+            <a:r>
+              <a:rPr lang="en-US" dirty="0" smtClean="0"/>
+              <a:t>2 </a:t>
+            </a:r>
+            <a:r>
+              <a:rPr lang="en-US" dirty="0" err="1" smtClean="0"/>
+              <a:t>configurazioni</a:t>
+            </a:r>
+            <a:r>
+              <a:rPr lang="en-US" dirty="0" smtClean="0"/>
+              <a:t> </a:t>
+            </a:r>
+            <a:r>
+              <a:rPr lang="en-US" dirty="0" err="1" smtClean="0"/>
+              <a:t>possibili</a:t>
+            </a:r>
+            <a:r>
+              <a:rPr lang="en-US" dirty="0" smtClean="0"/>
+              <a:t> di “contention” , </a:t>
+            </a:r>
+            <a:r>
+              <a:rPr lang="en-US" dirty="0" err="1" smtClean="0"/>
+              <a:t>rispettivamente</a:t>
+            </a:r>
+            <a:r>
+              <a:rPr lang="en-US" dirty="0" smtClean="0"/>
+              <a:t> </a:t>
+            </a:r>
+          </a:p>
+          <a:p>
             <a:pPr lvl="1" algn="just"/>
+            <a:r>
+              <a:rPr lang="en-US" dirty="0" err="1" smtClean="0"/>
+              <a:t>Singola</a:t>
+            </a:r>
+            <a:r>
+              <a:rPr lang="en-US" dirty="0" smtClean="0"/>
+              <a:t> contention: </a:t>
+            </a:r>
+            <a:r>
+              <a:rPr lang="en-US" dirty="0" err="1" smtClean="0"/>
+              <a:t>quando</a:t>
+            </a:r>
+            <a:r>
+              <a:rPr lang="en-US" dirty="0" smtClean="0"/>
+              <a:t> </a:t>
+            </a:r>
+            <a:r>
+              <a:rPr lang="en-US" dirty="0" err="1" smtClean="0"/>
+              <a:t>il</a:t>
+            </a:r>
+            <a:r>
+              <a:rPr lang="en-US" dirty="0" smtClean="0"/>
+              <a:t> thread </a:t>
+            </a:r>
+            <a:r>
+              <a:rPr lang="en-US" dirty="0" err="1" smtClean="0"/>
+              <a:t>che</a:t>
+            </a:r>
+            <a:r>
+              <a:rPr lang="en-US" dirty="0" smtClean="0"/>
+              <a:t> </a:t>
+            </a:r>
+            <a:r>
+              <a:rPr lang="en-US" dirty="0" err="1" smtClean="0"/>
+              <a:t>acqusisce</a:t>
+            </a:r>
+            <a:r>
+              <a:rPr lang="en-US" dirty="0" smtClean="0"/>
+              <a:t> la </a:t>
+            </a:r>
+            <a:r>
+              <a:rPr lang="en-US" dirty="0" err="1" smtClean="0"/>
+              <a:t>risorsa</a:t>
+            </a:r>
+            <a:r>
+              <a:rPr lang="en-US" dirty="0" smtClean="0"/>
+              <a:t> per primo è lo </a:t>
+            </a:r>
+            <a:r>
+              <a:rPr lang="en-US" dirty="0" err="1" smtClean="0"/>
+              <a:t>stesso</a:t>
+            </a:r>
+            <a:r>
+              <a:rPr lang="en-US" dirty="0" smtClean="0"/>
+              <a:t> thread di cui </a:t>
+            </a:r>
+            <a:r>
+              <a:rPr lang="en-US" dirty="0" err="1" smtClean="0"/>
+              <a:t>viene</a:t>
+            </a:r>
+            <a:r>
+              <a:rPr lang="en-US" dirty="0" smtClean="0"/>
+              <a:t> </a:t>
+            </a:r>
+            <a:r>
+              <a:rPr lang="en-US" dirty="0" err="1" smtClean="0"/>
+              <a:t>attesa</a:t>
+            </a:r>
+            <a:r>
+              <a:rPr lang="en-US" dirty="0" smtClean="0"/>
+              <a:t> la </a:t>
+            </a:r>
+            <a:r>
+              <a:rPr lang="en-US" dirty="0" err="1" smtClean="0"/>
+              <a:t>terminazione</a:t>
+            </a:r>
+            <a:r>
+              <a:rPr lang="en-US" dirty="0" smtClean="0"/>
+              <a:t> dal </a:t>
+            </a:r>
+            <a:r>
+              <a:rPr lang="en-US" dirty="0" err="1" smtClean="0"/>
+              <a:t>trhead</a:t>
+            </a:r>
+            <a:r>
+              <a:rPr lang="en-US" dirty="0" smtClean="0"/>
+              <a:t> </a:t>
+            </a:r>
+            <a:r>
+              <a:rPr lang="en-US" dirty="0" err="1" smtClean="0"/>
+              <a:t>principale</a:t>
+            </a:r>
             <a:endParaRPr lang="en-US" dirty="0" smtClean="0"/>
           </a:p>
           <a:p>
             <a:pPr lvl="1" algn="just"/>
-            <a:endParaRPr lang="en-US" dirty="0"/>
-          </a:p>
-          <a:p>
-            <a:pPr lvl="1" algn="just"/>
-            <a:endParaRPr lang="en-US" dirty="0" smtClean="0"/>
-          </a:p>
-          <a:p>
-            <a:pPr lvl="1" algn="just"/>
-            <a:endParaRPr lang="en-US" dirty="0" smtClean="0"/>
+            <a:r>
+              <a:rPr lang="en-US" dirty="0" err="1" smtClean="0"/>
+              <a:t>Doppia</a:t>
+            </a:r>
+            <a:r>
+              <a:rPr lang="en-US" dirty="0" smtClean="0"/>
+              <a:t> contention: </a:t>
+            </a:r>
+            <a:r>
+              <a:rPr lang="en-US" dirty="0" err="1" smtClean="0"/>
+              <a:t>quando</a:t>
+            </a:r>
+            <a:r>
+              <a:rPr lang="en-US" dirty="0" smtClean="0"/>
+              <a:t> </a:t>
+            </a:r>
+            <a:r>
+              <a:rPr lang="en-US" dirty="0" err="1" smtClean="0"/>
+              <a:t>il</a:t>
+            </a:r>
+            <a:r>
+              <a:rPr lang="en-US" dirty="0" smtClean="0"/>
+              <a:t> thread </a:t>
+            </a:r>
+            <a:r>
+              <a:rPr lang="en-US" dirty="0" err="1" smtClean="0"/>
+              <a:t>che</a:t>
+            </a:r>
+            <a:r>
+              <a:rPr lang="en-US" dirty="0" smtClean="0"/>
+              <a:t> </a:t>
+            </a:r>
+            <a:r>
+              <a:rPr lang="en-US" dirty="0" err="1" smtClean="0"/>
+              <a:t>acqusisce</a:t>
+            </a:r>
+            <a:r>
+              <a:rPr lang="en-US" dirty="0" smtClean="0"/>
+              <a:t> per primo la </a:t>
+            </a:r>
+            <a:r>
+              <a:rPr lang="en-US" dirty="0" err="1" smtClean="0"/>
+              <a:t>risorsa</a:t>
+            </a:r>
+            <a:r>
+              <a:rPr lang="en-US" dirty="0" smtClean="0"/>
+              <a:t> non è </a:t>
+            </a:r>
+            <a:r>
+              <a:rPr lang="en-US" dirty="0" err="1" smtClean="0"/>
+              <a:t>il</a:t>
+            </a:r>
+            <a:r>
+              <a:rPr lang="en-US" dirty="0" smtClean="0"/>
+              <a:t> thread </a:t>
+            </a:r>
+            <a:r>
+              <a:rPr lang="en-US" dirty="0" err="1" smtClean="0"/>
+              <a:t>che</a:t>
+            </a:r>
+            <a:r>
+              <a:rPr lang="en-US" dirty="0" smtClean="0"/>
+              <a:t> </a:t>
+            </a:r>
+            <a:r>
+              <a:rPr lang="en-US" dirty="0" err="1" smtClean="0"/>
+              <a:t>viene</a:t>
+            </a:r>
+            <a:r>
+              <a:rPr lang="en-US" dirty="0" smtClean="0"/>
+              <a:t> </a:t>
+            </a:r>
+            <a:r>
+              <a:rPr lang="en-US" dirty="0" err="1" smtClean="0"/>
+              <a:t>atteso</a:t>
+            </a:r>
+            <a:r>
+              <a:rPr lang="en-US" dirty="0" smtClean="0"/>
+              <a:t> per primo. In </a:t>
+            </a:r>
+            <a:r>
+              <a:rPr lang="en-US" dirty="0" err="1" smtClean="0"/>
+              <a:t>questo</a:t>
+            </a:r>
+            <a:r>
+              <a:rPr lang="en-US" dirty="0" smtClean="0"/>
+              <a:t> </a:t>
+            </a:r>
+            <a:r>
+              <a:rPr lang="en-US" dirty="0" err="1" smtClean="0"/>
+              <a:t>caso</a:t>
+            </a:r>
+            <a:r>
+              <a:rPr lang="en-US" dirty="0" smtClean="0"/>
+              <a:t> </a:t>
+            </a:r>
+            <a:r>
+              <a:rPr lang="en-US" dirty="0" err="1" smtClean="0"/>
+              <a:t>abbiamo</a:t>
+            </a:r>
+            <a:r>
+              <a:rPr lang="en-US" dirty="0" smtClean="0"/>
+              <a:t> due entry </a:t>
+            </a:r>
+            <a:r>
+              <a:rPr lang="en-US" dirty="0" err="1" smtClean="0"/>
+              <a:t>nel</a:t>
+            </a:r>
+            <a:r>
+              <a:rPr lang="en-US" dirty="0" smtClean="0"/>
+              <a:t> profiler, </a:t>
+            </a:r>
+            <a:r>
+              <a:rPr lang="en-US" dirty="0" err="1" smtClean="0"/>
+              <a:t>una</a:t>
+            </a:r>
+            <a:r>
+              <a:rPr lang="en-US" dirty="0" smtClean="0"/>
+              <a:t> </a:t>
+            </a:r>
+            <a:r>
+              <a:rPr lang="en-US" dirty="0" err="1" smtClean="0"/>
+              <a:t>relativa</a:t>
+            </a:r>
+            <a:r>
+              <a:rPr lang="en-US" dirty="0" smtClean="0"/>
+              <a:t> al main </a:t>
+            </a:r>
+            <a:r>
+              <a:rPr lang="en-US" dirty="0" err="1" smtClean="0"/>
+              <a:t>che</a:t>
+            </a:r>
+            <a:r>
+              <a:rPr lang="en-US" dirty="0" smtClean="0"/>
+              <a:t> </a:t>
+            </a:r>
+            <a:r>
+              <a:rPr lang="en-US" dirty="0" err="1" smtClean="0"/>
+              <a:t>si</a:t>
+            </a:r>
+            <a:r>
+              <a:rPr lang="en-US" dirty="0" smtClean="0"/>
+              <a:t> </a:t>
+            </a:r>
+            <a:r>
+              <a:rPr lang="en-US" dirty="0" err="1" smtClean="0"/>
+              <a:t>joina</a:t>
+            </a:r>
+            <a:r>
+              <a:rPr lang="en-US" dirty="0" smtClean="0"/>
+              <a:t> </a:t>
+            </a:r>
+            <a:r>
+              <a:rPr lang="en-US" dirty="0" err="1" smtClean="0"/>
+              <a:t>sul</a:t>
+            </a:r>
+            <a:r>
+              <a:rPr lang="en-US" dirty="0" smtClean="0"/>
+              <a:t> secondo thread, </a:t>
+            </a:r>
+            <a:r>
+              <a:rPr lang="en-US" dirty="0" err="1" smtClean="0"/>
+              <a:t>il</a:t>
+            </a:r>
+            <a:r>
+              <a:rPr lang="en-US" dirty="0" smtClean="0"/>
+              <a:t> quale è </a:t>
+            </a:r>
+            <a:r>
+              <a:rPr lang="en-US" dirty="0" err="1" smtClean="0"/>
+              <a:t>bloccato</a:t>
+            </a:r>
+            <a:r>
+              <a:rPr lang="en-US" dirty="0" smtClean="0"/>
+              <a:t> </a:t>
+            </a:r>
+            <a:r>
+              <a:rPr lang="en-US" dirty="0" err="1" smtClean="0"/>
+              <a:t>dalla</a:t>
+            </a:r>
+            <a:r>
+              <a:rPr lang="en-US" dirty="0" smtClean="0"/>
+              <a:t> </a:t>
+            </a:r>
+            <a:r>
+              <a:rPr lang="en-US" dirty="0" err="1" smtClean="0"/>
+              <a:t>terminazione</a:t>
+            </a:r>
+            <a:r>
+              <a:rPr lang="en-US" dirty="0" smtClean="0"/>
+              <a:t> del primo thread</a:t>
+            </a:r>
           </a:p>
         </p:txBody>
       </p:sp>
     </p:spTree>
     <p:extLst>
       <p:ext uri="{BB962C8B-B14F-4D97-AF65-F5344CB8AC3E}">
-        <p14:creationId xmlns:p14="http://schemas.microsoft.com/office/powerpoint/2010/main" val="3131800521"/>
+        <p14:creationId xmlns:p14="http://schemas.microsoft.com/office/powerpoint/2010/main" val="3191814083"/>
       </p:ext>
     </p:extLst>
   </p:cSld>
   <p:clrMapOvr>
     <a:masterClrMapping/>
   </p:clrMapOvr>
-  <mc:AlternateContent xmlns:mc="http://schemas.openxmlformats.org/markup-compatibility/2006" xmlns:p14="http://schemas.microsoft.com/office/powerpoint/2010/main">
-    <mc:Choice Requires="p14">
+  <mc:AlternateContent xmlns:mc="http://schemas.openxmlformats.org/markup-compatibility/2006">
+    <mc:Choice xmlns:p14="http://schemas.microsoft.com/office/powerpoint/2010/main" Requires="p14">
       <p:transition spd="slow" p14:dur="2000"/>
     </mc:Choice>
-    <mc:Fallback xmlns="">
+    <mc:Fallback>
       <p:transition spd="slow"/>
     </mc:Fallback>
   </mc:AlternateContent>
@@ -12863,7 +13406,15 @@
           <a:p>
             <a:r>
               <a:rPr lang="en-US" dirty="0" smtClean="0"/>
-              <a:t>Profiler – summary view</a:t>
+              <a:t>Concurrency- </a:t>
+            </a:r>
+            <a:r>
+              <a:rPr lang="en-US" dirty="0" err="1" smtClean="0"/>
+              <a:t>esempi</a:t>
+            </a:r>
+            <a:r>
+              <a:rPr lang="en-US" dirty="0" smtClean="0"/>
+              <a:t> di contention</a:t>
             </a:r>
             <a:endParaRPr lang="it-IT" dirty="0"/>
           </a:p>
@@ -12882,539 +13433,168 @@
         <p:spPr/>
         <p:txBody>
           <a:bodyPr>
-            <a:normAutofit lnSpcReduction="10000"/>
+            <a:normAutofit/>
           </a:bodyPr>
           <a:lstStyle/>
           <a:p>
             <a:pPr lvl="0" algn="just"/>
             <a:r>
               <a:rPr lang="en-US" dirty="0" err="1" smtClean="0"/>
-              <a:t>Tutte</a:t>
-            </a:r>
-            <a:r>
-              <a:rPr lang="en-US" dirty="0" smtClean="0"/>
-              <a:t> le </a:t>
-            </a:r>
-            <a:r>
-              <a:rPr lang="en-US" dirty="0" err="1" smtClean="0"/>
-              <a:t>tipologie</a:t>
-            </a:r>
-            <a:r>
-              <a:rPr lang="en-US" dirty="0" smtClean="0"/>
-              <a:t> di profiling </a:t>
-            </a:r>
-            <a:r>
-              <a:rPr lang="en-US" dirty="0" err="1" smtClean="0"/>
-              <a:t>sono</a:t>
-            </a:r>
-            <a:r>
-              <a:rPr lang="en-US" dirty="0" smtClean="0"/>
-              <a:t> </a:t>
-            </a:r>
-            <a:r>
-              <a:rPr lang="en-US" dirty="0" err="1" smtClean="0"/>
-              <a:t>abbatanza</a:t>
-            </a:r>
-            <a:r>
-              <a:rPr lang="en-US" dirty="0" smtClean="0"/>
-              <a:t> </a:t>
-            </a:r>
-            <a:r>
-              <a:rPr lang="en-US" dirty="0" err="1" smtClean="0"/>
-              <a:t>simili</a:t>
-            </a:r>
-            <a:r>
-              <a:rPr lang="en-US" dirty="0" smtClean="0"/>
-              <a:t> </a:t>
-            </a:r>
-            <a:r>
-              <a:rPr lang="en-US" dirty="0" err="1" smtClean="0"/>
-              <a:t>fra</a:t>
-            </a:r>
-            <a:r>
-              <a:rPr lang="en-US" dirty="0" smtClean="0"/>
-              <a:t> </a:t>
-            </a:r>
-            <a:r>
-              <a:rPr lang="en-US" dirty="0" err="1" smtClean="0"/>
-              <a:t>loro</a:t>
-            </a:r>
-            <a:endParaRPr lang="en-US" dirty="0" smtClean="0"/>
+              <a:t>Nei</a:t>
+            </a:r>
+            <a:r>
+              <a:rPr lang="en-US" dirty="0" smtClean="0"/>
+              <a:t> </a:t>
+            </a:r>
+            <a:r>
+              <a:rPr lang="en-US" dirty="0" err="1" smtClean="0"/>
+              <a:t>rapporti</a:t>
+            </a:r>
+            <a:r>
+              <a:rPr lang="en-US" dirty="0" smtClean="0"/>
+              <a:t> 19/20/21/22 </a:t>
+            </a:r>
+            <a:r>
+              <a:rPr lang="en-US" dirty="0" err="1" smtClean="0"/>
+              <a:t>abbiamo</a:t>
+            </a:r>
+            <a:r>
+              <a:rPr lang="en-US" dirty="0" smtClean="0"/>
+              <a:t> I </a:t>
+            </a:r>
+            <a:r>
+              <a:rPr lang="en-US" dirty="0" err="1" smtClean="0"/>
+              <a:t>seguenti</a:t>
+            </a:r>
+            <a:r>
+              <a:rPr lang="en-US" dirty="0" smtClean="0"/>
+              <a:t> </a:t>
+            </a:r>
+            <a:r>
+              <a:rPr lang="en-US" dirty="0" err="1" smtClean="0"/>
+              <a:t>casi</a:t>
+            </a:r>
+            <a:r>
+              <a:rPr lang="en-US" dirty="0" smtClean="0"/>
+              <a:t>:</a:t>
+            </a:r>
+          </a:p>
+          <a:p>
+            <a:pPr lvl="1" algn="just"/>
+            <a:r>
+              <a:rPr lang="en-US" dirty="0" smtClean="0"/>
+              <a:t>Thread t1 con wait di 17 sec </a:t>
+            </a:r>
+          </a:p>
+          <a:p>
+            <a:pPr lvl="1" algn="just"/>
+            <a:r>
+              <a:rPr lang="en-US" dirty="0" smtClean="0"/>
+              <a:t>Thread t2 con wait di 10 sec</a:t>
+            </a:r>
+          </a:p>
+          <a:p>
+            <a:pPr lvl="1" algn="just"/>
+            <a:r>
+              <a:rPr lang="en-US" dirty="0" smtClean="0"/>
+              <a:t>Join a t1</a:t>
+            </a:r>
+          </a:p>
+          <a:p>
+            <a:pPr lvl="1" algn="just"/>
+            <a:r>
+              <a:rPr lang="en-US" dirty="0" smtClean="0"/>
+              <a:t>Join a t2</a:t>
+            </a:r>
+          </a:p>
+          <a:p>
+            <a:pPr lvl="1" algn="just"/>
+            <a:r>
+              <a:rPr lang="en-US" dirty="0" smtClean="0"/>
+              <a:t>Contention ? Tempo di </a:t>
+            </a:r>
+            <a:r>
+              <a:rPr lang="en-US" dirty="0" err="1" smtClean="0"/>
+              <a:t>bloccaggio</a:t>
+            </a:r>
+            <a:r>
+              <a:rPr lang="en-US" dirty="0" smtClean="0"/>
+              <a:t> ?</a:t>
+            </a:r>
           </a:p>
           <a:p>
             <a:pPr lvl="0" algn="just"/>
             <a:r>
-              <a:rPr lang="en-US" dirty="0" smtClean="0"/>
-              <a:t>Summary view: </a:t>
-            </a:r>
-            <a:r>
-              <a:rPr lang="en-US" dirty="0" err="1" smtClean="0"/>
-              <a:t>grafico</a:t>
-            </a:r>
-            <a:r>
-              <a:rPr lang="en-US" dirty="0" smtClean="0"/>
-              <a:t> di </a:t>
-            </a:r>
-            <a:r>
-              <a:rPr lang="en-US" dirty="0" err="1" smtClean="0"/>
-              <a:t>utilizzo</a:t>
-            </a:r>
-            <a:r>
-              <a:rPr lang="en-US" dirty="0" smtClean="0"/>
-              <a:t> CPU </a:t>
-            </a:r>
-            <a:r>
-              <a:rPr lang="en-US" dirty="0" err="1" smtClean="0"/>
-              <a:t>nel</a:t>
-            </a:r>
-            <a:r>
-              <a:rPr lang="en-US" dirty="0" smtClean="0"/>
-              <a:t> tempo di </a:t>
-            </a:r>
-            <a:r>
-              <a:rPr lang="en-US" dirty="0" err="1" smtClean="0"/>
-              <a:t>profilazione</a:t>
-            </a:r>
-            <a:r>
-              <a:rPr lang="en-US" dirty="0" smtClean="0"/>
-              <a:t>. </a:t>
-            </a:r>
-            <a:r>
-              <a:rPr lang="en-US" dirty="0" err="1" smtClean="0"/>
-              <a:t>Possibilità</a:t>
-            </a:r>
-            <a:r>
-              <a:rPr lang="en-US" dirty="0" smtClean="0"/>
-              <a:t> di fare zoom e </a:t>
-            </a:r>
-            <a:r>
-              <a:rPr lang="en-US" dirty="0" err="1" smtClean="0"/>
-              <a:t>avere</a:t>
-            </a:r>
-            <a:r>
-              <a:rPr lang="en-US" dirty="0" smtClean="0"/>
-              <a:t> </a:t>
-            </a:r>
-            <a:r>
-              <a:rPr lang="en-US" dirty="0" err="1" smtClean="0"/>
-              <a:t>il</a:t>
-            </a:r>
-            <a:r>
-              <a:rPr lang="en-US" dirty="0" smtClean="0"/>
-              <a:t> summary </a:t>
-            </a:r>
-            <a:r>
-              <a:rPr lang="en-US" dirty="0" err="1" smtClean="0"/>
-              <a:t>della</a:t>
-            </a:r>
-            <a:r>
-              <a:rPr lang="en-US" dirty="0" smtClean="0"/>
-              <a:t> sola parte </a:t>
-            </a:r>
-            <a:r>
-              <a:rPr lang="en-US" dirty="0" err="1" smtClean="0"/>
-              <a:t>selezionata</a:t>
-            </a:r>
-            <a:endParaRPr lang="en-US" dirty="0" smtClean="0"/>
-          </a:p>
-          <a:p>
-            <a:pPr lvl="0" algn="just"/>
-            <a:r>
-              <a:rPr lang="en-US" dirty="0" err="1" smtClean="0"/>
-              <a:t>Ogni</a:t>
-            </a:r>
-            <a:r>
-              <a:rPr lang="en-US" dirty="0" smtClean="0"/>
-              <a:t> </a:t>
-            </a:r>
-            <a:r>
-              <a:rPr lang="en-US" dirty="0" err="1" smtClean="0"/>
-              <a:t>funzione</a:t>
-            </a:r>
-            <a:r>
-              <a:rPr lang="en-US" dirty="0" smtClean="0"/>
-              <a:t> </a:t>
-            </a:r>
-            <a:r>
-              <a:rPr lang="en-US" dirty="0" err="1" smtClean="0"/>
-              <a:t>che</a:t>
-            </a:r>
-            <a:r>
-              <a:rPr lang="en-US" dirty="0" smtClean="0"/>
-              <a:t> </a:t>
-            </a:r>
-            <a:r>
-              <a:rPr lang="en-US" dirty="0" err="1" smtClean="0"/>
-              <a:t>appare</a:t>
-            </a:r>
-            <a:r>
-              <a:rPr lang="en-US" dirty="0" smtClean="0"/>
-              <a:t> </a:t>
-            </a:r>
-            <a:r>
-              <a:rPr lang="en-US" dirty="0" err="1" smtClean="0"/>
-              <a:t>nel</a:t>
-            </a:r>
-            <a:r>
-              <a:rPr lang="en-US" dirty="0" smtClean="0"/>
-              <a:t> summary è </a:t>
-            </a:r>
-            <a:r>
-              <a:rPr lang="en-US" dirty="0" err="1" smtClean="0"/>
-              <a:t>cliccabile</a:t>
-            </a:r>
-            <a:r>
-              <a:rPr lang="en-US" dirty="0" smtClean="0"/>
-              <a:t>. Con </a:t>
-            </a:r>
-            <a:r>
-              <a:rPr lang="en-US" dirty="0" err="1" smtClean="0"/>
-              <a:t>tasto</a:t>
-            </a:r>
-            <a:r>
-              <a:rPr lang="en-US" dirty="0" smtClean="0"/>
-              <a:t> destroy è </a:t>
-            </a:r>
-            <a:r>
-              <a:rPr lang="en-US" dirty="0" err="1" smtClean="0"/>
-              <a:t>possibile</a:t>
-            </a:r>
-            <a:r>
-              <a:rPr lang="en-US" dirty="0" smtClean="0"/>
-              <a:t> </a:t>
-            </a:r>
-            <a:r>
-              <a:rPr lang="en-US" dirty="0" err="1" smtClean="0"/>
-              <a:t>avere</a:t>
-            </a:r>
-            <a:r>
-              <a:rPr lang="en-US" dirty="0" smtClean="0"/>
-              <a:t> </a:t>
-            </a:r>
-            <a:r>
-              <a:rPr lang="en-US" dirty="0" err="1" smtClean="0"/>
-              <a:t>altre</a:t>
-            </a:r>
-            <a:r>
-              <a:rPr lang="en-US" dirty="0" smtClean="0"/>
-              <a:t> </a:t>
-            </a:r>
-            <a:r>
-              <a:rPr lang="en-US" dirty="0" err="1" smtClean="0"/>
-              <a:t>opzioni</a:t>
-            </a:r>
-            <a:r>
-              <a:rPr lang="en-US" dirty="0" smtClean="0"/>
-              <a:t>, </a:t>
-            </a:r>
-            <a:r>
-              <a:rPr lang="en-US" dirty="0" err="1" smtClean="0"/>
-              <a:t>fra</a:t>
-            </a:r>
-            <a:r>
-              <a:rPr lang="en-US" dirty="0" smtClean="0"/>
-              <a:t> cui </a:t>
-            </a:r>
-            <a:r>
-              <a:rPr lang="en-US" dirty="0" err="1" smtClean="0"/>
-              <a:t>raggiungere</a:t>
-            </a:r>
-            <a:r>
-              <a:rPr lang="en-US" dirty="0" smtClean="0"/>
-              <a:t> </a:t>
-            </a:r>
-            <a:r>
-              <a:rPr lang="en-US" dirty="0" err="1" smtClean="0"/>
-              <a:t>il</a:t>
-            </a:r>
-            <a:r>
-              <a:rPr lang="en-US" dirty="0" smtClean="0"/>
-              <a:t> </a:t>
-            </a:r>
-            <a:r>
-              <a:rPr lang="en-US" dirty="0" err="1" smtClean="0"/>
-              <a:t>sorgente</a:t>
-            </a:r>
-            <a:endParaRPr lang="en-US" dirty="0" smtClean="0"/>
-          </a:p>
-          <a:p>
-            <a:pPr lvl="0" algn="just"/>
-            <a:r>
-              <a:rPr lang="en-US" dirty="0" smtClean="0"/>
-              <a:t> </a:t>
-            </a:r>
-            <a:r>
-              <a:rPr lang="en-US" dirty="0" err="1" smtClean="0"/>
-              <a:t>Sempre</a:t>
-            </a:r>
-            <a:r>
-              <a:rPr lang="en-US" dirty="0" smtClean="0"/>
-              <a:t> dal summary </a:t>
-            </a:r>
-            <a:r>
-              <a:rPr lang="en-US" dirty="0" err="1" smtClean="0"/>
-              <a:t>raggiungiamo</a:t>
-            </a:r>
-            <a:r>
-              <a:rPr lang="en-US" dirty="0" smtClean="0"/>
-              <a:t>:</a:t>
-            </a:r>
+              <a:rPr lang="en-US" dirty="0"/>
+              <a:t> </a:t>
+            </a:r>
+            <a:r>
+              <a:rPr lang="en-US" dirty="0" err="1" smtClean="0"/>
+              <a:t>Oppure</a:t>
+            </a:r>
+            <a:endParaRPr lang="en-US" dirty="0"/>
           </a:p>
           <a:p>
             <a:pPr lvl="1" algn="just"/>
             <a:r>
-              <a:rPr lang="en-US" dirty="0" smtClean="0"/>
-              <a:t>Show Trimmed Call Tree : </a:t>
-            </a:r>
-            <a:r>
-              <a:rPr lang="en-US" dirty="0" err="1" smtClean="0"/>
-              <a:t>vediamo</a:t>
-            </a:r>
-            <a:r>
-              <a:rPr lang="en-US" dirty="0" smtClean="0"/>
-              <a:t> </a:t>
-            </a:r>
-            <a:r>
-              <a:rPr lang="en-US" dirty="0" err="1" smtClean="0"/>
-              <a:t>nella</a:t>
-            </a:r>
-            <a:r>
-              <a:rPr lang="en-US" dirty="0" smtClean="0"/>
-              <a:t> vista “Call Tree” le </a:t>
-            </a:r>
-            <a:r>
-              <a:rPr lang="en-US" dirty="0" err="1" smtClean="0"/>
-              <a:t>parti</a:t>
-            </a:r>
-            <a:r>
-              <a:rPr lang="en-US" dirty="0" smtClean="0"/>
-              <a:t> </a:t>
-            </a:r>
-            <a:r>
-              <a:rPr lang="en-US" dirty="0" err="1" smtClean="0"/>
-              <a:t>più</a:t>
-            </a:r>
-            <a:r>
-              <a:rPr lang="en-US" dirty="0" smtClean="0"/>
-              <a:t> </a:t>
-            </a:r>
-            <a:r>
-              <a:rPr lang="en-US" dirty="0" err="1" smtClean="0"/>
-              <a:t>costose</a:t>
-            </a:r>
-            <a:r>
-              <a:rPr lang="en-US" dirty="0" smtClean="0"/>
-              <a:t>, </a:t>
-            </a:r>
-            <a:r>
-              <a:rPr lang="en-US" dirty="0" err="1" smtClean="0"/>
-              <a:t>indichiamo</a:t>
-            </a:r>
-            <a:r>
-              <a:rPr lang="en-US" dirty="0" smtClean="0"/>
-              <a:t> </a:t>
-            </a:r>
-            <a:r>
-              <a:rPr lang="en-US" dirty="0" err="1" smtClean="0"/>
-              <a:t>l’hot</a:t>
-            </a:r>
-            <a:r>
-              <a:rPr lang="en-US" dirty="0" smtClean="0"/>
-              <a:t> path e </a:t>
-            </a:r>
-            <a:r>
-              <a:rPr lang="en-US" dirty="0" err="1" smtClean="0"/>
-              <a:t>possiamo</a:t>
-            </a:r>
-            <a:r>
-              <a:rPr lang="en-US" dirty="0" smtClean="0"/>
-              <a:t> </a:t>
-            </a:r>
-            <a:r>
-              <a:rPr lang="en-US" dirty="0" err="1" smtClean="0"/>
-              <a:t>filtrare</a:t>
-            </a:r>
-            <a:r>
-              <a:rPr lang="en-US" dirty="0" smtClean="0"/>
-              <a:t> le entry </a:t>
-            </a:r>
-            <a:r>
-              <a:rPr lang="en-US" dirty="0" err="1" smtClean="0"/>
-              <a:t>che</a:t>
-            </a:r>
-            <a:r>
-              <a:rPr lang="en-US" dirty="0" smtClean="0"/>
-              <a:t> </a:t>
-            </a:r>
-            <a:r>
-              <a:rPr lang="en-US" dirty="0" err="1" smtClean="0"/>
-              <a:t>riteniamo</a:t>
-            </a:r>
-            <a:r>
-              <a:rPr lang="en-US" dirty="0" smtClean="0"/>
-              <a:t> di </a:t>
-            </a:r>
-            <a:r>
-              <a:rPr lang="en-US" dirty="0" err="1" smtClean="0"/>
-              <a:t>poco</a:t>
-            </a:r>
-            <a:r>
-              <a:rPr lang="en-US" dirty="0" smtClean="0"/>
-              <a:t> </a:t>
-            </a:r>
-            <a:r>
-              <a:rPr lang="en-US" dirty="0" err="1" smtClean="0"/>
-              <a:t>interesse</a:t>
+              <a:rPr lang="en-US" dirty="0"/>
+              <a:t>Thread t1 con wait di 17 sec </a:t>
+            </a:r>
+          </a:p>
+          <a:p>
+            <a:pPr lvl="1" algn="just"/>
+            <a:r>
+              <a:rPr lang="en-US" dirty="0"/>
+              <a:t>Thread t2 con wait di 10 sec</a:t>
+            </a:r>
+          </a:p>
+          <a:p>
+            <a:pPr lvl="1" algn="just"/>
+            <a:r>
+              <a:rPr lang="en-US" dirty="0"/>
+              <a:t>Join a </a:t>
+            </a:r>
+            <a:r>
+              <a:rPr lang="en-US" dirty="0" smtClean="0"/>
+              <a:t>t2</a:t>
             </a:r>
             <a:endParaRPr lang="en-US" dirty="0"/>
           </a:p>
           <a:p>
             <a:pPr lvl="1" algn="just"/>
             <a:r>
-              <a:rPr lang="en-US" dirty="0" smtClean="0"/>
-              <a:t>Show hot lines: </a:t>
-            </a:r>
-            <a:r>
-              <a:rPr lang="en-US" dirty="0" err="1" smtClean="0"/>
-              <a:t>vediamo</a:t>
-            </a:r>
-            <a:r>
-              <a:rPr lang="en-US" dirty="0" smtClean="0"/>
-              <a:t> </a:t>
-            </a:r>
-            <a:r>
-              <a:rPr lang="en-US" dirty="0" err="1" smtClean="0"/>
-              <a:t>nella</a:t>
-            </a:r>
-            <a:r>
-              <a:rPr lang="en-US" dirty="0" smtClean="0"/>
-              <a:t> vista “Lines” le </a:t>
-            </a:r>
-            <a:r>
-              <a:rPr lang="en-US" dirty="0" err="1" smtClean="0"/>
-              <a:t>linee</a:t>
-            </a:r>
-            <a:r>
-              <a:rPr lang="en-US" dirty="0" smtClean="0"/>
-              <a:t> di </a:t>
-            </a:r>
-            <a:r>
-              <a:rPr lang="en-US" dirty="0" err="1" smtClean="0"/>
-              <a:t>codice</a:t>
-            </a:r>
-            <a:r>
-              <a:rPr lang="en-US" dirty="0" smtClean="0"/>
-              <a:t> </a:t>
-            </a:r>
-            <a:r>
-              <a:rPr lang="en-US" dirty="0" err="1" smtClean="0"/>
-              <a:t>più</a:t>
-            </a:r>
-            <a:r>
-              <a:rPr lang="en-US" dirty="0" smtClean="0"/>
-              <a:t> </a:t>
-            </a:r>
-            <a:r>
-              <a:rPr lang="en-US" dirty="0" err="1" smtClean="0"/>
-              <a:t>costose</a:t>
-            </a:r>
-            <a:r>
-              <a:rPr lang="en-US" dirty="0" smtClean="0"/>
-              <a:t>. Non </a:t>
-            </a:r>
-            <a:r>
-              <a:rPr lang="en-US" dirty="0" err="1" smtClean="0"/>
-              <a:t>disponibile</a:t>
-            </a:r>
-            <a:r>
-              <a:rPr lang="en-US" dirty="0" smtClean="0"/>
-              <a:t> in instrumentation.</a:t>
-            </a:r>
+              <a:rPr lang="en-US" dirty="0"/>
+              <a:t>Join </a:t>
+            </a:r>
+            <a:r>
+              <a:rPr lang="en-US"/>
+              <a:t>a </a:t>
+            </a:r>
+            <a:r>
+              <a:rPr lang="en-US" smtClean="0"/>
+              <a:t>t1</a:t>
+            </a:r>
+            <a:endParaRPr lang="en-US" dirty="0"/>
           </a:p>
           <a:p>
             <a:pPr lvl="1" algn="just"/>
             <a:r>
-              <a:rPr lang="en-US" dirty="0" smtClean="0"/>
-              <a:t>Export Report Data: .csv o .xml</a:t>
-            </a:r>
-          </a:p>
-          <a:p>
-            <a:pPr lvl="1" algn="just"/>
-            <a:r>
-              <a:rPr lang="en-US" dirty="0" smtClean="0"/>
-              <a:t>Save Analyzed Report: </a:t>
-            </a:r>
-            <a:r>
-              <a:rPr lang="en-US" dirty="0" err="1" smtClean="0"/>
-              <a:t>salva</a:t>
-            </a:r>
-            <a:r>
-              <a:rPr lang="en-US" dirty="0" smtClean="0"/>
-              <a:t> in </a:t>
-            </a:r>
-            <a:r>
-              <a:rPr lang="en-US" dirty="0" err="1" smtClean="0"/>
-              <a:t>formato</a:t>
-            </a:r>
-            <a:r>
-              <a:rPr lang="en-US" dirty="0" smtClean="0"/>
-              <a:t> .</a:t>
-            </a:r>
-            <a:r>
-              <a:rPr lang="en-US" dirty="0" err="1" smtClean="0"/>
-              <a:t>vsps</a:t>
-            </a:r>
-            <a:r>
-              <a:rPr lang="en-US" dirty="0" smtClean="0"/>
-              <a:t>, </a:t>
-            </a:r>
-            <a:r>
-              <a:rPr lang="en-US" dirty="0" err="1" smtClean="0"/>
-              <a:t>che</a:t>
-            </a:r>
-            <a:r>
-              <a:rPr lang="en-US" dirty="0" smtClean="0"/>
-              <a:t> </a:t>
-            </a:r>
-            <a:r>
-              <a:rPr lang="en-US" dirty="0" err="1" smtClean="0"/>
-              <a:t>si</a:t>
-            </a:r>
-            <a:r>
-              <a:rPr lang="en-US" dirty="0" smtClean="0"/>
-              <a:t> </a:t>
-            </a:r>
-            <a:r>
-              <a:rPr lang="en-US" dirty="0" err="1" smtClean="0"/>
-              <a:t>aprè</a:t>
-            </a:r>
-            <a:r>
-              <a:rPr lang="en-US" dirty="0" smtClean="0"/>
-              <a:t> </a:t>
-            </a:r>
-            <a:r>
-              <a:rPr lang="en-US" dirty="0" err="1" smtClean="0"/>
-              <a:t>più</a:t>
-            </a:r>
-            <a:r>
-              <a:rPr lang="en-US" dirty="0" smtClean="0"/>
-              <a:t> </a:t>
-            </a:r>
-            <a:r>
-              <a:rPr lang="en-US" dirty="0" err="1" smtClean="0"/>
-              <a:t>rapidamente</a:t>
-            </a:r>
-            <a:r>
-              <a:rPr lang="en-US" dirty="0" smtClean="0"/>
-              <a:t> </a:t>
-            </a:r>
-          </a:p>
-          <a:p>
-            <a:pPr lvl="1" algn="just"/>
-            <a:endParaRPr lang="en-US" dirty="0" smtClean="0"/>
-          </a:p>
-          <a:p>
-            <a:pPr lvl="0" algn="just"/>
+              <a:rPr lang="en-US" dirty="0"/>
+              <a:t>Contention ? Tempo di </a:t>
+            </a:r>
+            <a:r>
+              <a:rPr lang="en-US" dirty="0" err="1"/>
+              <a:t>bloccaggio</a:t>
+            </a:r>
+            <a:r>
+              <a:rPr lang="en-US" dirty="0"/>
+              <a:t> ?</a:t>
+            </a:r>
+          </a:p>
+          <a:p>
+            <a:pPr marL="274320" lvl="1" indent="0" algn="just">
+              <a:buNone/>
+            </a:pPr>
             <a:endParaRPr lang="en-US" dirty="0" smtClean="0"/>
           </a:p>
         </p:txBody>
@@ -13422,18 +13602,18 @@
     </p:spTree>
     <p:extLst>
       <p:ext uri="{BB962C8B-B14F-4D97-AF65-F5344CB8AC3E}">
-        <p14:creationId xmlns:p14="http://schemas.microsoft.com/office/powerpoint/2010/main" val="3506873978"/>
+        <p14:creationId xmlns:p14="http://schemas.microsoft.com/office/powerpoint/2010/main" val="3019174895"/>
       </p:ext>
     </p:extLst>
   </p:cSld>
   <p:clrMapOvr>
     <a:masterClrMapping/>
   </p:clrMapOvr>
-  <mc:AlternateContent xmlns:mc="http://schemas.openxmlformats.org/markup-compatibility/2006" xmlns:p14="http://schemas.microsoft.com/office/powerpoint/2010/main">
-    <mc:Choice Requires="p14">
+  <mc:AlternateContent xmlns:mc="http://schemas.openxmlformats.org/markup-compatibility/2006">
+    <mc:Choice xmlns:p14="http://schemas.microsoft.com/office/powerpoint/2010/main" Requires="p14">
       <p:transition spd="slow" p14:dur="2000"/>
     </mc:Choice>
-    <mc:Fallback xmlns="">
+    <mc:Fallback>
       <p:transition spd="slow"/>
     </mc:Fallback>
   </mc:AlternateContent>
@@ -13481,19 +13661,7 @@
           <a:p>
             <a:r>
               <a:rPr lang="en-US" dirty="0" smtClean="0"/>
-              <a:t>Profiler – </a:t>
-            </a:r>
-            <a:r>
-              <a:rPr lang="en-US" dirty="0" err="1" smtClean="0"/>
-              <a:t>altre</a:t>
-            </a:r>
-            <a:r>
-              <a:rPr lang="en-US" dirty="0" smtClean="0"/>
-              <a:t> </a:t>
-            </a:r>
-            <a:r>
-              <a:rPr lang="en-US" dirty="0" err="1" smtClean="0"/>
-              <a:t>viste</a:t>
+              <a:t>Profiler – summary view</a:t>
             </a:r>
             <a:endParaRPr lang="it-IT" dirty="0"/>
           </a:p>
@@ -13512,26 +13680,98 @@
         <p:spPr/>
         <p:txBody>
           <a:bodyPr>
-            <a:normAutofit/>
+            <a:normAutofit lnSpcReduction="10000"/>
           </a:bodyPr>
           <a:lstStyle/>
           <a:p>
             <a:pPr lvl="0" algn="just"/>
             <a:r>
-              <a:rPr lang="en-US" dirty="0" smtClean="0"/>
-              <a:t>Call Tree: </a:t>
-            </a:r>
-            <a:r>
-              <a:rPr lang="en-US" dirty="0" err="1" smtClean="0"/>
-              <a:t>piuttosto</a:t>
-            </a:r>
-            <a:r>
-              <a:rPr lang="en-US" dirty="0" smtClean="0"/>
-              <a:t> </a:t>
-            </a:r>
-            <a:r>
-              <a:rPr lang="en-US" dirty="0" err="1" smtClean="0"/>
-              <a:t>intuitivo</a:t>
+              <a:rPr lang="en-US" dirty="0" err="1" smtClean="0"/>
+              <a:t>Tutte</a:t>
+            </a:r>
+            <a:r>
+              <a:rPr lang="en-US" dirty="0" smtClean="0"/>
+              <a:t> le </a:t>
+            </a:r>
+            <a:r>
+              <a:rPr lang="en-US" dirty="0" err="1" smtClean="0"/>
+              <a:t>tipologie</a:t>
+            </a:r>
+            <a:r>
+              <a:rPr lang="en-US" dirty="0" smtClean="0"/>
+              <a:t> di profiling </a:t>
+            </a:r>
+            <a:r>
+              <a:rPr lang="en-US" dirty="0" err="1" smtClean="0"/>
+              <a:t>sono</a:t>
+            </a:r>
+            <a:r>
+              <a:rPr lang="en-US" dirty="0" smtClean="0"/>
+              <a:t> </a:t>
+            </a:r>
+            <a:r>
+              <a:rPr lang="en-US" dirty="0" err="1" smtClean="0"/>
+              <a:t>abbatanza</a:t>
+            </a:r>
+            <a:r>
+              <a:rPr lang="en-US" dirty="0" smtClean="0"/>
+              <a:t> </a:t>
+            </a:r>
+            <a:r>
+              <a:rPr lang="en-US" dirty="0" err="1" smtClean="0"/>
+              <a:t>simili</a:t>
+            </a:r>
+            <a:r>
+              <a:rPr lang="en-US" dirty="0" smtClean="0"/>
+              <a:t> </a:t>
+            </a:r>
+            <a:r>
+              <a:rPr lang="en-US" dirty="0" err="1" smtClean="0"/>
+              <a:t>fra</a:t>
+            </a:r>
+            <a:r>
+              <a:rPr lang="en-US" dirty="0" smtClean="0"/>
+              <a:t> </a:t>
+            </a:r>
+            <a:r>
+              <a:rPr lang="en-US" dirty="0" err="1" smtClean="0"/>
+              <a:t>loro</a:t>
+            </a:r>
+            <a:endParaRPr lang="en-US" dirty="0" smtClean="0"/>
+          </a:p>
+          <a:p>
+            <a:pPr lvl="0" algn="just"/>
+            <a:r>
+              <a:rPr lang="en-US" dirty="0" smtClean="0"/>
+              <a:t>Summary view: </a:t>
+            </a:r>
+            <a:r>
+              <a:rPr lang="en-US" dirty="0" err="1" smtClean="0"/>
+              <a:t>grafico</a:t>
+            </a:r>
+            <a:r>
+              <a:rPr lang="en-US" dirty="0" smtClean="0"/>
+              <a:t> di </a:t>
+            </a:r>
+            <a:r>
+              <a:rPr lang="en-US" dirty="0" err="1" smtClean="0"/>
+              <a:t>utilizzo</a:t>
+            </a:r>
+            <a:r>
+              <a:rPr lang="en-US" dirty="0" smtClean="0"/>
+              <a:t> CPU </a:t>
+            </a:r>
+            <a:r>
+              <a:rPr lang="en-US" dirty="0" err="1" smtClean="0"/>
+              <a:t>nel</a:t>
+            </a:r>
+            <a:r>
+              <a:rPr lang="en-US" dirty="0" smtClean="0"/>
+              <a:t> tempo di </a:t>
+            </a:r>
+            <a:r>
+              <a:rPr lang="en-US" dirty="0" err="1" smtClean="0"/>
+              <a:t>profilazione</a:t>
             </a:r>
             <a:r>
               <a:rPr lang="en-US" dirty="0" smtClean="0"/>
@@ -13539,101 +13779,388 @@
             </a:r>
             <a:r>
               <a:rPr lang="en-US" dirty="0" err="1" smtClean="0"/>
-              <a:t>Abbiamo</a:t>
-            </a:r>
-            <a:r>
-              <a:rPr lang="en-US" dirty="0" smtClean="0"/>
-              <a:t> la </a:t>
-            </a:r>
-            <a:r>
-              <a:rPr lang="en-US" dirty="0" err="1" smtClean="0"/>
-              <a:t>possibilità</a:t>
+              <a:t>Possibilità</a:t>
+            </a:r>
+            <a:r>
+              <a:rPr lang="en-US" dirty="0" smtClean="0"/>
+              <a:t> di fare zoom e </a:t>
+            </a:r>
+            <a:r>
+              <a:rPr lang="en-US" dirty="0" err="1" smtClean="0"/>
+              <a:t>avere</a:t>
+            </a:r>
+            <a:r>
+              <a:rPr lang="en-US" dirty="0" smtClean="0"/>
+              <a:t> </a:t>
+            </a:r>
+            <a:r>
+              <a:rPr lang="en-US" dirty="0" err="1" smtClean="0"/>
+              <a:t>il</a:t>
+            </a:r>
+            <a:r>
+              <a:rPr lang="en-US" dirty="0" smtClean="0"/>
+              <a:t> summary </a:t>
+            </a:r>
+            <a:r>
+              <a:rPr lang="en-US" dirty="0" err="1" smtClean="0"/>
+              <a:t>della</a:t>
+            </a:r>
+            <a:r>
+              <a:rPr lang="en-US" dirty="0" smtClean="0"/>
+              <a:t> sola parte </a:t>
+            </a:r>
+            <a:r>
+              <a:rPr lang="en-US" dirty="0" err="1" smtClean="0"/>
+              <a:t>selezionata</a:t>
+            </a:r>
+            <a:endParaRPr lang="en-US" dirty="0" smtClean="0"/>
+          </a:p>
+          <a:p>
+            <a:pPr lvl="0" algn="just"/>
+            <a:r>
+              <a:rPr lang="en-US" dirty="0" err="1" smtClean="0"/>
+              <a:t>Ogni</a:t>
+            </a:r>
+            <a:r>
+              <a:rPr lang="en-US" dirty="0" smtClean="0"/>
+              <a:t> </a:t>
+            </a:r>
+            <a:r>
+              <a:rPr lang="en-US" dirty="0" err="1" smtClean="0"/>
+              <a:t>funzione</a:t>
+            </a:r>
+            <a:r>
+              <a:rPr lang="en-US" dirty="0" smtClean="0"/>
+              <a:t> </a:t>
+            </a:r>
+            <a:r>
+              <a:rPr lang="en-US" dirty="0" err="1" smtClean="0"/>
+              <a:t>che</a:t>
+            </a:r>
+            <a:r>
+              <a:rPr lang="en-US" dirty="0" smtClean="0"/>
+              <a:t> </a:t>
+            </a:r>
+            <a:r>
+              <a:rPr lang="en-US" dirty="0" err="1" smtClean="0"/>
+              <a:t>appare</a:t>
+            </a:r>
+            <a:r>
+              <a:rPr lang="en-US" dirty="0" smtClean="0"/>
+              <a:t> </a:t>
+            </a:r>
+            <a:r>
+              <a:rPr lang="en-US" dirty="0" err="1" smtClean="0"/>
+              <a:t>nel</a:t>
+            </a:r>
+            <a:r>
+              <a:rPr lang="en-US" dirty="0" smtClean="0"/>
+              <a:t> summary è </a:t>
+            </a:r>
+            <a:r>
+              <a:rPr lang="en-US" dirty="0" err="1" smtClean="0"/>
+              <a:t>cliccabile</a:t>
+            </a:r>
+            <a:r>
+              <a:rPr lang="en-US" dirty="0" smtClean="0"/>
+              <a:t>. Con </a:t>
+            </a:r>
+            <a:r>
+              <a:rPr lang="en-US" dirty="0" err="1" smtClean="0"/>
+              <a:t>tasto</a:t>
+            </a:r>
+            <a:r>
+              <a:rPr lang="en-US" dirty="0" smtClean="0"/>
+              <a:t> destroy è </a:t>
+            </a:r>
+            <a:r>
+              <a:rPr lang="en-US" dirty="0" err="1" smtClean="0"/>
+              <a:t>possibile</a:t>
+            </a:r>
+            <a:r>
+              <a:rPr lang="en-US" dirty="0" smtClean="0"/>
+              <a:t> </a:t>
+            </a:r>
+            <a:r>
+              <a:rPr lang="en-US" dirty="0" err="1" smtClean="0"/>
+              <a:t>avere</a:t>
+            </a:r>
+            <a:r>
+              <a:rPr lang="en-US" dirty="0" smtClean="0"/>
+              <a:t> </a:t>
+            </a:r>
+            <a:r>
+              <a:rPr lang="en-US" dirty="0" err="1" smtClean="0"/>
+              <a:t>altre</a:t>
+            </a:r>
+            <a:r>
+              <a:rPr lang="en-US" dirty="0" smtClean="0"/>
+              <a:t> </a:t>
+            </a:r>
+            <a:r>
+              <a:rPr lang="en-US" dirty="0" err="1" smtClean="0"/>
+              <a:t>opzioni</a:t>
+            </a:r>
+            <a:r>
+              <a:rPr lang="en-US" dirty="0" smtClean="0"/>
+              <a:t>, </a:t>
+            </a:r>
+            <a:r>
+              <a:rPr lang="en-US" dirty="0" err="1" smtClean="0"/>
+              <a:t>fra</a:t>
+            </a:r>
+            <a:r>
+              <a:rPr lang="en-US" dirty="0" smtClean="0"/>
+              <a:t> cui </a:t>
+            </a:r>
+            <a:r>
+              <a:rPr lang="en-US" dirty="0" err="1" smtClean="0"/>
+              <a:t>raggiungere</a:t>
+            </a:r>
+            <a:r>
+              <a:rPr lang="en-US" dirty="0" smtClean="0"/>
+              <a:t> </a:t>
+            </a:r>
+            <a:r>
+              <a:rPr lang="en-US" dirty="0" err="1" smtClean="0"/>
+              <a:t>il</a:t>
+            </a:r>
+            <a:r>
+              <a:rPr lang="en-US" dirty="0" smtClean="0"/>
+              <a:t> </a:t>
+            </a:r>
+            <a:r>
+              <a:rPr lang="en-US" dirty="0" err="1" smtClean="0"/>
+              <a:t>sorgente</a:t>
+            </a:r>
+            <a:endParaRPr lang="en-US" dirty="0" smtClean="0"/>
+          </a:p>
+          <a:p>
+            <a:pPr lvl="0" algn="just"/>
+            <a:r>
+              <a:rPr lang="en-US" dirty="0" smtClean="0"/>
+              <a:t> </a:t>
+            </a:r>
+            <a:r>
+              <a:rPr lang="en-US" dirty="0" err="1" smtClean="0"/>
+              <a:t>Sempre</a:t>
+            </a:r>
+            <a:r>
+              <a:rPr lang="en-US" dirty="0" smtClean="0"/>
+              <a:t> dal summary </a:t>
+            </a:r>
+            <a:r>
+              <a:rPr lang="en-US" dirty="0" err="1" smtClean="0"/>
+              <a:t>raggiungiamo</a:t>
+            </a:r>
+            <a:r>
+              <a:rPr lang="en-US" dirty="0" smtClean="0"/>
+              <a:t>:</a:t>
+            </a:r>
+          </a:p>
+          <a:p>
+            <a:pPr lvl="1" algn="just"/>
+            <a:r>
+              <a:rPr lang="en-US" dirty="0" smtClean="0"/>
+              <a:t>Show Trimmed Call Tree : </a:t>
+            </a:r>
+            <a:r>
+              <a:rPr lang="en-US" dirty="0" err="1" smtClean="0"/>
+              <a:t>vediamo</a:t>
+            </a:r>
+            <a:r>
+              <a:rPr lang="en-US" dirty="0" smtClean="0"/>
+              <a:t> </a:t>
+            </a:r>
+            <a:r>
+              <a:rPr lang="en-US" dirty="0" err="1" smtClean="0"/>
+              <a:t>nella</a:t>
+            </a:r>
+            <a:r>
+              <a:rPr lang="en-US" dirty="0" smtClean="0"/>
+              <a:t> vista “Call Tree” le </a:t>
+            </a:r>
+            <a:r>
+              <a:rPr lang="en-US" dirty="0" err="1" smtClean="0"/>
+              <a:t>parti</a:t>
+            </a:r>
+            <a:r>
+              <a:rPr lang="en-US" dirty="0" smtClean="0"/>
+              <a:t> </a:t>
+            </a:r>
+            <a:r>
+              <a:rPr lang="en-US" dirty="0" err="1" smtClean="0"/>
+              <a:t>più</a:t>
+            </a:r>
+            <a:r>
+              <a:rPr lang="en-US" dirty="0" smtClean="0"/>
+              <a:t> </a:t>
+            </a:r>
+            <a:r>
+              <a:rPr lang="en-US" dirty="0" err="1" smtClean="0"/>
+              <a:t>costose</a:t>
+            </a:r>
+            <a:r>
+              <a:rPr lang="en-US" dirty="0" smtClean="0"/>
+              <a:t>, </a:t>
+            </a:r>
+            <a:r>
+              <a:rPr lang="en-US" dirty="0" err="1" smtClean="0"/>
+              <a:t>indichiamo</a:t>
+            </a:r>
+            <a:r>
+              <a:rPr lang="en-US" dirty="0" smtClean="0"/>
+              <a:t> </a:t>
+            </a:r>
+            <a:r>
+              <a:rPr lang="en-US" dirty="0" err="1" smtClean="0"/>
+              <a:t>l’hot</a:t>
+            </a:r>
+            <a:r>
+              <a:rPr lang="en-US" dirty="0" smtClean="0"/>
+              <a:t> path e </a:t>
+            </a:r>
+            <a:r>
+              <a:rPr lang="en-US" dirty="0" err="1" smtClean="0"/>
+              <a:t>possiamo</a:t>
+            </a:r>
+            <a:r>
+              <a:rPr lang="en-US" dirty="0" smtClean="0"/>
+              <a:t> </a:t>
+            </a:r>
+            <a:r>
+              <a:rPr lang="en-US" dirty="0" err="1" smtClean="0"/>
+              <a:t>filtrare</a:t>
+            </a:r>
+            <a:r>
+              <a:rPr lang="en-US" dirty="0" smtClean="0"/>
+              <a:t> le entry </a:t>
+            </a:r>
+            <a:r>
+              <a:rPr lang="en-US" dirty="0" err="1" smtClean="0"/>
+              <a:t>che</a:t>
+            </a:r>
+            <a:r>
+              <a:rPr lang="en-US" dirty="0" smtClean="0"/>
+              <a:t> </a:t>
+            </a:r>
+            <a:r>
+              <a:rPr lang="en-US" dirty="0" err="1" smtClean="0"/>
+              <a:t>riteniamo</a:t>
             </a:r>
             <a:r>
               <a:rPr lang="en-US" dirty="0" smtClean="0"/>
               <a:t> di </a:t>
             </a:r>
+            <a:r>
+              <a:rPr lang="en-US" dirty="0" err="1" smtClean="0"/>
+              <a:t>poco</a:t>
+            </a:r>
+            <a:r>
+              <a:rPr lang="en-US" dirty="0" smtClean="0"/>
+              <a:t> </a:t>
+            </a:r>
+            <a:r>
+              <a:rPr lang="en-US" dirty="0" err="1" smtClean="0"/>
+              <a:t>interesse</a:t>
+            </a:r>
+            <a:endParaRPr lang="en-US" dirty="0"/>
           </a:p>
           <a:p>
             <a:pPr lvl="1" algn="just"/>
             <a:r>
-              <a:rPr lang="en-US" dirty="0" err="1" smtClean="0"/>
-              <a:t>Filtrare</a:t>
-            </a:r>
-            <a:r>
-              <a:rPr lang="en-US" dirty="0" smtClean="0"/>
-              <a:t> </a:t>
-            </a:r>
-            <a:r>
-              <a:rPr lang="en-US" dirty="0" err="1" smtClean="0"/>
-              <a:t>i</a:t>
-            </a:r>
-            <a:r>
-              <a:rPr lang="en-US" dirty="0" smtClean="0"/>
-              <a:t> </a:t>
-            </a:r>
-            <a:r>
-              <a:rPr lang="en-US" dirty="0" err="1" smtClean="0"/>
-              <a:t>risultati</a:t>
-            </a:r>
-            <a:r>
-              <a:rPr lang="en-US" dirty="0" smtClean="0"/>
-              <a:t> (trimming/folding)</a:t>
+              <a:rPr lang="en-US" dirty="0" smtClean="0"/>
+              <a:t>Show hot lines: </a:t>
+            </a:r>
+            <a:r>
+              <a:rPr lang="en-US" dirty="0" err="1" smtClean="0"/>
+              <a:t>vediamo</a:t>
+            </a:r>
+            <a:r>
+              <a:rPr lang="en-US" dirty="0" smtClean="0"/>
+              <a:t> </a:t>
+            </a:r>
+            <a:r>
+              <a:rPr lang="en-US" dirty="0" err="1" smtClean="0"/>
+              <a:t>nella</a:t>
+            </a:r>
+            <a:r>
+              <a:rPr lang="en-US" dirty="0" smtClean="0"/>
+              <a:t> vista “Lines” le </a:t>
+            </a:r>
+            <a:r>
+              <a:rPr lang="en-US" dirty="0" err="1" smtClean="0"/>
+              <a:t>linee</a:t>
+            </a:r>
+            <a:r>
+              <a:rPr lang="en-US" dirty="0" smtClean="0"/>
+              <a:t> di </a:t>
+            </a:r>
+            <a:r>
+              <a:rPr lang="en-US" dirty="0" err="1" smtClean="0"/>
+              <a:t>codice</a:t>
+            </a:r>
+            <a:r>
+              <a:rPr lang="en-US" dirty="0" smtClean="0"/>
+              <a:t> </a:t>
+            </a:r>
+            <a:r>
+              <a:rPr lang="en-US" dirty="0" err="1" smtClean="0"/>
+              <a:t>più</a:t>
+            </a:r>
+            <a:r>
+              <a:rPr lang="en-US" dirty="0" smtClean="0"/>
+              <a:t> </a:t>
+            </a:r>
+            <a:r>
+              <a:rPr lang="en-US" dirty="0" err="1" smtClean="0"/>
+              <a:t>costose</a:t>
+            </a:r>
+            <a:r>
+              <a:rPr lang="en-US" dirty="0" smtClean="0"/>
+              <a:t>. Non </a:t>
+            </a:r>
+            <a:r>
+              <a:rPr lang="en-US" dirty="0" err="1" smtClean="0"/>
+              <a:t>disponibile</a:t>
+            </a:r>
+            <a:r>
+              <a:rPr lang="en-US" dirty="0" smtClean="0"/>
+              <a:t> in instrumentation.</a:t>
             </a:r>
           </a:p>
           <a:p>
             <a:pPr lvl="1" algn="just"/>
             <a:r>
-              <a:rPr lang="en-US" dirty="0" err="1" smtClean="0"/>
-              <a:t>Impostare</a:t>
-            </a:r>
-            <a:r>
-              <a:rPr lang="en-US" dirty="0" smtClean="0"/>
-              <a:t> un </a:t>
-            </a:r>
-            <a:r>
-              <a:rPr lang="en-US" dirty="0" err="1" smtClean="0"/>
-              <a:t>qualsiasi</a:t>
-            </a:r>
-            <a:r>
-              <a:rPr lang="en-US" dirty="0" smtClean="0"/>
-              <a:t> </a:t>
-            </a:r>
-            <a:r>
-              <a:rPr lang="en-US" dirty="0" err="1" smtClean="0"/>
-              <a:t>nodo</a:t>
-            </a:r>
-            <a:r>
-              <a:rPr lang="en-US" dirty="0" smtClean="0"/>
-              <a:t> come root, o </a:t>
-            </a:r>
-            <a:r>
-              <a:rPr lang="en-US" dirty="0" err="1" smtClean="0"/>
-              <a:t>resettare</a:t>
-            </a:r>
-            <a:r>
-              <a:rPr lang="en-US" dirty="0" smtClean="0"/>
-              <a:t> </a:t>
-            </a:r>
-            <a:r>
-              <a:rPr lang="en-US" dirty="0" err="1" smtClean="0"/>
-              <a:t>alla</a:t>
-            </a:r>
-            <a:r>
-              <a:rPr lang="en-US" dirty="0" smtClean="0"/>
-              <a:t> </a:t>
-            </a:r>
-            <a:r>
-              <a:rPr lang="en-US" dirty="0" err="1" smtClean="0"/>
-              <a:t>condizione</a:t>
-            </a:r>
-            <a:r>
-              <a:rPr lang="en-US" dirty="0" smtClean="0"/>
-              <a:t> </a:t>
-            </a:r>
-            <a:r>
-              <a:rPr lang="en-US" dirty="0" err="1" smtClean="0"/>
-              <a:t>iniziale</a:t>
+              <a:rPr lang="en-US" dirty="0" smtClean="0"/>
+              <a:t>Export Report Data: .csv o .xml</a:t>
+            </a:r>
+          </a:p>
+          <a:p>
+            <a:pPr lvl="1" algn="just"/>
+            <a:r>
+              <a:rPr lang="en-US" dirty="0" smtClean="0"/>
+              <a:t>Save Analyzed Report: </a:t>
+            </a:r>
+            <a:r>
+              <a:rPr lang="en-US" dirty="0" err="1" smtClean="0"/>
+              <a:t>salva</a:t>
+            </a:r>
+            <a:r>
+              <a:rPr lang="en-US" dirty="0" smtClean="0"/>
+              <a:t> in </a:t>
+            </a:r>
+            <a:r>
+              <a:rPr lang="en-US" dirty="0" err="1" smtClean="0"/>
+              <a:t>formato</a:t>
+            </a:r>
+            <a:r>
+              <a:rPr lang="en-US" dirty="0" smtClean="0"/>
+              <a:t> .</a:t>
+            </a:r>
+            <a:r>
+              <a:rPr lang="en-US" dirty="0" err="1" smtClean="0"/>
+              <a:t>vsps</a:t>
             </a:r>
             <a:r>
               <a:rPr lang="en-US" dirty="0" smtClean="0"/>
@@ -13641,377 +14168,51 @@
             </a:r>
             <a:r>
               <a:rPr lang="en-US" dirty="0" err="1" smtClean="0"/>
-              <a:t>mediante</a:t>
-            </a:r>
-            <a:r>
-              <a:rPr lang="en-US" dirty="0" smtClean="0"/>
-              <a:t> </a:t>
-            </a:r>
-            <a:r>
-              <a:rPr lang="en-US" dirty="0" err="1" smtClean="0"/>
-              <a:t>tasto</a:t>
-            </a:r>
-            <a:r>
-              <a:rPr lang="en-US" dirty="0" smtClean="0"/>
-              <a:t> </a:t>
-            </a:r>
-            <a:r>
-              <a:rPr lang="en-US" dirty="0" err="1" smtClean="0"/>
-              <a:t>destro</a:t>
-            </a:r>
-            <a:r>
-              <a:rPr lang="en-US" dirty="0" smtClean="0"/>
-              <a:t> </a:t>
-            </a:r>
-            <a:r>
-              <a:rPr lang="en-US" dirty="0" err="1" smtClean="0"/>
-              <a:t>sull’albero</a:t>
-            </a:r>
+              <a:t>che</a:t>
+            </a:r>
+            <a:r>
+              <a:rPr lang="en-US" dirty="0" smtClean="0"/>
+              <a:t> </a:t>
+            </a:r>
+            <a:r>
+              <a:rPr lang="en-US" dirty="0" err="1" smtClean="0"/>
+              <a:t>si</a:t>
+            </a:r>
+            <a:r>
+              <a:rPr lang="en-US" dirty="0" smtClean="0"/>
+              <a:t> </a:t>
+            </a:r>
+            <a:r>
+              <a:rPr lang="en-US" dirty="0" err="1" smtClean="0"/>
+              <a:t>aprè</a:t>
+            </a:r>
+            <a:r>
+              <a:rPr lang="en-US" dirty="0" smtClean="0"/>
+              <a:t> </a:t>
+            </a:r>
+            <a:r>
+              <a:rPr lang="en-US" dirty="0" err="1" smtClean="0"/>
+              <a:t>più</a:t>
+            </a:r>
+            <a:r>
+              <a:rPr lang="en-US" dirty="0" smtClean="0"/>
+              <a:t> </a:t>
+            </a:r>
+            <a:r>
+              <a:rPr lang="en-US" dirty="0" err="1" smtClean="0"/>
+              <a:t>rapidamente</a:t>
+            </a:r>
+            <a:r>
+              <a:rPr lang="en-US" dirty="0" smtClean="0"/>
+              <a:t> </a:t>
+            </a:r>
+          </a:p>
+          <a:p>
+            <a:pPr lvl="1" algn="just"/>
             <a:endParaRPr lang="en-US" dirty="0" smtClean="0"/>
           </a:p>
           <a:p>
-            <a:pPr lvl="1" algn="just"/>
-            <a:r>
-              <a:rPr lang="en-US" dirty="0" err="1" smtClean="0"/>
-              <a:t>Selezionare</a:t>
-            </a:r>
-            <a:r>
-              <a:rPr lang="en-US" dirty="0" smtClean="0"/>
-              <a:t> diverse </a:t>
-            </a:r>
-            <a:r>
-              <a:rPr lang="en-US" dirty="0" err="1" smtClean="0"/>
-              <a:t>colonne</a:t>
-            </a:r>
-            <a:r>
-              <a:rPr lang="en-US" dirty="0" smtClean="0"/>
-              <a:t> </a:t>
-            </a:r>
-          </a:p>
-          <a:p>
-            <a:pPr marL="274320" lvl="1" indent="0" algn="just">
-              <a:buNone/>
-            </a:pPr>
-            <a:endParaRPr lang="en-US" dirty="0" smtClean="0"/>
-          </a:p>
-          <a:p>
             <a:pPr lvl="0" algn="just"/>
-            <a:r>
-              <a:rPr lang="en-US" dirty="0" smtClean="0"/>
-              <a:t>Modules: </a:t>
-            </a:r>
-            <a:r>
-              <a:rPr lang="en-US" dirty="0" err="1" smtClean="0"/>
-              <a:t>vediamo</a:t>
-            </a:r>
-            <a:r>
-              <a:rPr lang="en-US" dirty="0" smtClean="0"/>
-              <a:t> I moduli </a:t>
-            </a:r>
-            <a:r>
-              <a:rPr lang="en-US" dirty="0" err="1" smtClean="0"/>
-              <a:t>coinvolti</a:t>
-            </a:r>
-            <a:r>
-              <a:rPr lang="en-US" dirty="0" smtClean="0"/>
-              <a:t>, </a:t>
-            </a:r>
-            <a:r>
-              <a:rPr lang="en-US" dirty="0" err="1" smtClean="0"/>
-              <a:t>ognuno</a:t>
-            </a:r>
-            <a:r>
-              <a:rPr lang="en-US" dirty="0" smtClean="0"/>
-              <a:t> </a:t>
-            </a:r>
-            <a:r>
-              <a:rPr lang="en-US" dirty="0" err="1" smtClean="0"/>
-              <a:t>dei</a:t>
-            </a:r>
-            <a:r>
-              <a:rPr lang="en-US" dirty="0" smtClean="0"/>
-              <a:t> </a:t>
-            </a:r>
-            <a:r>
-              <a:rPr lang="en-US" dirty="0" err="1" smtClean="0"/>
-              <a:t>quali</a:t>
-            </a:r>
-            <a:r>
-              <a:rPr lang="en-US" dirty="0" smtClean="0"/>
-              <a:t> è root </a:t>
-            </a:r>
-            <a:r>
-              <a:rPr lang="en-US" dirty="0" err="1" smtClean="0"/>
-              <a:t>dell’albero</a:t>
-            </a:r>
-            <a:endParaRPr lang="en-US" dirty="0"/>
-          </a:p>
-          <a:p>
-            <a:pPr lvl="1" algn="just"/>
-            <a:r>
-              <a:rPr lang="en-US" dirty="0" smtClean="0"/>
-              <a:t>Se </a:t>
-            </a:r>
-            <a:r>
-              <a:rPr lang="en-US" dirty="0" err="1" smtClean="0"/>
-              <a:t>una</a:t>
-            </a:r>
-            <a:r>
-              <a:rPr lang="en-US" dirty="0" smtClean="0"/>
-              <a:t> </a:t>
-            </a:r>
-            <a:r>
-              <a:rPr lang="en-US" dirty="0" err="1" smtClean="0"/>
-              <a:t>determinata</a:t>
-            </a:r>
-            <a:r>
-              <a:rPr lang="en-US" dirty="0" smtClean="0"/>
-              <a:t> </a:t>
-            </a:r>
-            <a:r>
-              <a:rPr lang="en-US" dirty="0" err="1" smtClean="0"/>
-              <a:t>funzione</a:t>
-            </a:r>
-            <a:r>
-              <a:rPr lang="en-US" dirty="0" smtClean="0"/>
-              <a:t> </a:t>
-            </a:r>
-            <a:r>
-              <a:rPr lang="en-US" dirty="0" err="1" smtClean="0"/>
-              <a:t>stava</a:t>
-            </a:r>
-            <a:r>
-              <a:rPr lang="en-US" dirty="0" smtClean="0"/>
-              <a:t> </a:t>
-            </a:r>
-            <a:r>
-              <a:rPr lang="en-US" dirty="0" err="1" smtClean="0"/>
-              <a:t>eseguendo</a:t>
-            </a:r>
-            <a:r>
-              <a:rPr lang="en-US" dirty="0" smtClean="0"/>
-              <a:t> al </a:t>
-            </a:r>
-            <a:r>
-              <a:rPr lang="en-US" dirty="0" err="1" smtClean="0"/>
-              <a:t>momento</a:t>
-            </a:r>
-            <a:r>
-              <a:rPr lang="en-US" dirty="0" smtClean="0"/>
-              <a:t> </a:t>
-            </a:r>
-            <a:r>
-              <a:rPr lang="en-US" dirty="0" err="1" smtClean="0"/>
-              <a:t>della</a:t>
-            </a:r>
-            <a:r>
-              <a:rPr lang="en-US" dirty="0" smtClean="0"/>
-              <a:t> </a:t>
-            </a:r>
-            <a:r>
-              <a:rPr lang="en-US" dirty="0" err="1" smtClean="0"/>
-              <a:t>misurazione</a:t>
-            </a:r>
-            <a:r>
-              <a:rPr lang="en-US" dirty="0" smtClean="0"/>
-              <a:t>, </a:t>
-            </a:r>
-            <a:r>
-              <a:rPr lang="en-US" dirty="0" err="1" smtClean="0"/>
-              <a:t>viene</a:t>
-            </a:r>
-            <a:r>
-              <a:rPr lang="en-US" dirty="0" smtClean="0"/>
-              <a:t> </a:t>
-            </a:r>
-            <a:r>
-              <a:rPr lang="en-US" dirty="0" err="1" smtClean="0"/>
-              <a:t>mostrata</a:t>
-            </a:r>
-            <a:r>
-              <a:rPr lang="en-US" dirty="0" smtClean="0"/>
-              <a:t> in </a:t>
-            </a:r>
-            <a:r>
-              <a:rPr lang="en-US" dirty="0" err="1" smtClean="0"/>
-              <a:t>questa</a:t>
-            </a:r>
-            <a:r>
-              <a:rPr lang="en-US" dirty="0" smtClean="0"/>
-              <a:t> vista. E’ </a:t>
-            </a:r>
-            <a:r>
-              <a:rPr lang="en-US" dirty="0" err="1" smtClean="0"/>
-              <a:t>possibile</a:t>
-            </a:r>
-            <a:r>
-              <a:rPr lang="en-US" dirty="0" smtClean="0"/>
-              <a:t> </a:t>
-            </a:r>
-            <a:r>
-              <a:rPr lang="en-US" dirty="0" err="1" smtClean="0"/>
-              <a:t>cliccare</a:t>
-            </a:r>
-            <a:r>
-              <a:rPr lang="en-US" dirty="0" smtClean="0"/>
-              <a:t> </a:t>
-            </a:r>
-            <a:r>
-              <a:rPr lang="en-US" dirty="0" err="1" smtClean="0"/>
-              <a:t>sulla</a:t>
-            </a:r>
-            <a:r>
-              <a:rPr lang="en-US" dirty="0" smtClean="0"/>
-              <a:t> </a:t>
-            </a:r>
-            <a:r>
-              <a:rPr lang="en-US" dirty="0" err="1" smtClean="0"/>
-              <a:t>funzione</a:t>
-            </a:r>
-            <a:r>
-              <a:rPr lang="en-US" dirty="0" smtClean="0"/>
-              <a:t> e </a:t>
-            </a:r>
-            <a:r>
-              <a:rPr lang="en-US" dirty="0" err="1" smtClean="0"/>
-              <a:t>raggiungere</a:t>
-            </a:r>
-            <a:r>
-              <a:rPr lang="en-US" dirty="0" smtClean="0"/>
-              <a:t> </a:t>
-            </a:r>
-            <a:r>
-              <a:rPr lang="en-US" dirty="0" err="1" smtClean="0"/>
-              <a:t>direttamente</a:t>
-            </a:r>
-            <a:r>
-              <a:rPr lang="en-US" dirty="0" smtClean="0"/>
-              <a:t> </a:t>
-            </a:r>
-            <a:r>
-              <a:rPr lang="en-US" dirty="0" err="1" smtClean="0"/>
-              <a:t>il</a:t>
-            </a:r>
-            <a:r>
-              <a:rPr lang="en-US" dirty="0" smtClean="0"/>
-              <a:t> </a:t>
-            </a:r>
-            <a:r>
-              <a:rPr lang="en-US" dirty="0" err="1" smtClean="0"/>
-              <a:t>sorgente</a:t>
-            </a:r>
-            <a:r>
-              <a:rPr lang="en-US" dirty="0" smtClean="0"/>
-              <a:t>. </a:t>
-            </a:r>
-            <a:r>
-              <a:rPr lang="en-US" dirty="0" err="1" smtClean="0"/>
-              <a:t>Qualora</a:t>
-            </a:r>
-            <a:r>
-              <a:rPr lang="en-US" dirty="0"/>
-              <a:t> </a:t>
-            </a:r>
-            <a:r>
-              <a:rPr lang="en-US" dirty="0" err="1" smtClean="0"/>
-              <a:t>gli</a:t>
-            </a:r>
-            <a:r>
-              <a:rPr lang="en-US" dirty="0" smtClean="0"/>
-              <a:t> </a:t>
-            </a:r>
-            <a:r>
-              <a:rPr lang="en-US" dirty="0" err="1" smtClean="0"/>
-              <a:t>indicatori</a:t>
-            </a:r>
-            <a:r>
-              <a:rPr lang="en-US" dirty="0" smtClean="0"/>
-              <a:t> di inclusive </a:t>
-            </a:r>
-            <a:r>
-              <a:rPr lang="en-US" dirty="0" err="1" smtClean="0"/>
-              <a:t>ed</a:t>
-            </a:r>
-            <a:r>
-              <a:rPr lang="en-US" dirty="0" smtClean="0"/>
-              <a:t> exclusive </a:t>
-            </a:r>
-            <a:r>
-              <a:rPr lang="en-US" dirty="0" err="1" smtClean="0"/>
-              <a:t>coincidano</a:t>
-            </a:r>
-            <a:r>
-              <a:rPr lang="en-US" dirty="0" smtClean="0"/>
-              <a:t>, </a:t>
-            </a:r>
-            <a:r>
-              <a:rPr lang="en-US" dirty="0" err="1" smtClean="0"/>
-              <a:t>il</a:t>
-            </a:r>
-            <a:r>
-              <a:rPr lang="en-US" dirty="0" smtClean="0"/>
-              <a:t> tool ha </a:t>
-            </a:r>
-            <a:r>
-              <a:rPr lang="en-US" dirty="0" err="1" smtClean="0"/>
-              <a:t>tracciato</a:t>
-            </a:r>
-            <a:r>
-              <a:rPr lang="en-US" dirty="0" smtClean="0"/>
-              <a:t> </a:t>
-            </a:r>
-            <a:r>
-              <a:rPr lang="en-US" dirty="0" err="1" smtClean="0"/>
-              <a:t>qualcosa</a:t>
-            </a:r>
-            <a:r>
-              <a:rPr lang="en-US" dirty="0" smtClean="0"/>
-              <a:t> di </a:t>
-            </a:r>
-            <a:r>
-              <a:rPr lang="en-US" dirty="0" err="1" smtClean="0"/>
-              <a:t>atomico</a:t>
-            </a:r>
-            <a:r>
-              <a:rPr lang="en-US" dirty="0" smtClean="0"/>
-              <a:t>, </a:t>
-            </a:r>
-            <a:r>
-              <a:rPr lang="en-US" dirty="0" err="1" smtClean="0"/>
-              <a:t>quindi</a:t>
-            </a:r>
-            <a:r>
-              <a:rPr lang="en-US" dirty="0" smtClean="0"/>
-              <a:t> </a:t>
-            </a:r>
-            <a:r>
-              <a:rPr lang="en-US" dirty="0" err="1" smtClean="0"/>
-              <a:t>l’instruction</a:t>
-            </a:r>
-            <a:r>
-              <a:rPr lang="en-US" dirty="0" smtClean="0"/>
-              <a:t> pointer (ad </a:t>
-            </a:r>
-            <a:r>
-              <a:rPr lang="en-US" dirty="0" err="1" smtClean="0"/>
-              <a:t>esempio</a:t>
-            </a:r>
-            <a:r>
-              <a:rPr lang="en-US" dirty="0" smtClean="0"/>
-              <a:t> in moduli di Sistema)</a:t>
-            </a:r>
-            <a:endParaRPr lang="en-US" dirty="0"/>
-          </a:p>
-          <a:p>
-            <a:pPr marL="274320" lvl="1" indent="0" algn="just">
-              <a:buNone/>
-            </a:pPr>
-            <a:endParaRPr lang="en-US" dirty="0"/>
-          </a:p>
-          <a:p>
-            <a:pPr marL="274320" lvl="1" indent="0" algn="just">
-              <a:buNone/>
-            </a:pPr>
             <a:endParaRPr lang="en-US" dirty="0" smtClean="0"/>
           </a:p>
         </p:txBody>
@@ -14019,7 +14220,7 @@
     </p:spTree>
     <p:extLst>
       <p:ext uri="{BB962C8B-B14F-4D97-AF65-F5344CB8AC3E}">
-        <p14:creationId xmlns:p14="http://schemas.microsoft.com/office/powerpoint/2010/main" val="3226164041"/>
+        <p14:creationId xmlns:p14="http://schemas.microsoft.com/office/powerpoint/2010/main" val="3506873978"/>
       </p:ext>
     </p:extLst>
   </p:cSld>
@@ -14200,10 +14401,6 @@
               <a:rPr lang="en-US" dirty="0" err="1" smtClean="0"/>
               <a:t>viste</a:t>
             </a:r>
-            <a:r>
-              <a:rPr lang="en-US" dirty="0" smtClean="0"/>
-              <a:t> (2)</a:t>
-            </a:r>
             <a:endParaRPr lang="it-IT" dirty="0"/>
           </a:p>
         </p:txBody>
@@ -14228,42 +14425,254 @@
             <a:pPr lvl="0" algn="just"/>
             <a:r>
               <a:rPr lang="en-US" dirty="0" smtClean="0"/>
-              <a:t>Caller/</a:t>
-            </a:r>
-            <a:r>
-              <a:rPr lang="en-US" dirty="0" err="1" smtClean="0"/>
-              <a:t>Calle</a:t>
-            </a:r>
-            <a:r>
-              <a:rPr lang="en-US" dirty="0" smtClean="0"/>
-              <a:t> view: </a:t>
+              <a:t>Call Tree: </a:t>
+            </a:r>
+            <a:r>
+              <a:rPr lang="en-US" dirty="0" err="1" smtClean="0"/>
+              <a:t>piuttosto</a:t>
+            </a:r>
+            <a:r>
+              <a:rPr lang="en-US" dirty="0" smtClean="0"/>
+              <a:t> </a:t>
+            </a:r>
+            <a:r>
+              <a:rPr lang="en-US" dirty="0" err="1" smtClean="0"/>
+              <a:t>intuitivo</a:t>
+            </a:r>
+            <a:r>
+              <a:rPr lang="en-US" dirty="0" smtClean="0"/>
+              <a:t>. </a:t>
+            </a:r>
+            <a:r>
+              <a:rPr lang="en-US" dirty="0" err="1" smtClean="0"/>
+              <a:t>Abbiamo</a:t>
+            </a:r>
+            <a:r>
+              <a:rPr lang="en-US" dirty="0" smtClean="0"/>
+              <a:t> la </a:t>
+            </a:r>
+            <a:r>
+              <a:rPr lang="en-US" dirty="0" err="1" smtClean="0"/>
+              <a:t>possibilità</a:t>
+            </a:r>
+            <a:r>
+              <a:rPr lang="en-US" dirty="0" smtClean="0"/>
+              <a:t> di </a:t>
             </a:r>
           </a:p>
           <a:p>
             <a:pPr lvl="1" algn="just"/>
             <a:r>
               <a:rPr lang="en-US" dirty="0" err="1" smtClean="0"/>
-              <a:t>Vengono</a:t>
-            </a:r>
-            <a:r>
-              <a:rPr lang="en-US" dirty="0" smtClean="0"/>
-              <a:t> </a:t>
-            </a:r>
-            <a:r>
-              <a:rPr lang="en-US" dirty="0" err="1" smtClean="0"/>
-              <a:t>mostrate</a:t>
-            </a:r>
-            <a:r>
-              <a:rPr lang="en-US" dirty="0" smtClean="0"/>
-              <a:t> 3 </a:t>
-            </a:r>
-            <a:r>
-              <a:rPr lang="en-US" dirty="0" err="1" smtClean="0"/>
-              <a:t>viste</a:t>
-            </a:r>
-            <a:r>
-              <a:rPr lang="en-US" dirty="0" smtClean="0"/>
-              <a:t>, la </a:t>
+              <a:t>Filtrare</a:t>
+            </a:r>
+            <a:r>
+              <a:rPr lang="en-US" dirty="0" smtClean="0"/>
+              <a:t> </a:t>
+            </a:r>
+            <a:r>
+              <a:rPr lang="en-US" dirty="0" err="1" smtClean="0"/>
+              <a:t>i</a:t>
+            </a:r>
+            <a:r>
+              <a:rPr lang="en-US" dirty="0" smtClean="0"/>
+              <a:t> </a:t>
+            </a:r>
+            <a:r>
+              <a:rPr lang="en-US" dirty="0" err="1" smtClean="0"/>
+              <a:t>risultati</a:t>
+            </a:r>
+            <a:r>
+              <a:rPr lang="en-US" dirty="0" smtClean="0"/>
+              <a:t> (trimming/folding)</a:t>
+            </a:r>
+          </a:p>
+          <a:p>
+            <a:pPr lvl="1" algn="just"/>
+            <a:r>
+              <a:rPr lang="en-US" dirty="0" err="1" smtClean="0"/>
+              <a:t>Impostare</a:t>
+            </a:r>
+            <a:r>
+              <a:rPr lang="en-US" dirty="0" smtClean="0"/>
+              <a:t> un </a:t>
+            </a:r>
+            <a:r>
+              <a:rPr lang="en-US" dirty="0" err="1" smtClean="0"/>
+              <a:t>qualsiasi</a:t>
+            </a:r>
+            <a:r>
+              <a:rPr lang="en-US" dirty="0" smtClean="0"/>
+              <a:t> </a:t>
+            </a:r>
+            <a:r>
+              <a:rPr lang="en-US" dirty="0" err="1" smtClean="0"/>
+              <a:t>nodo</a:t>
+            </a:r>
+            <a:r>
+              <a:rPr lang="en-US" dirty="0" smtClean="0"/>
+              <a:t> come root, o </a:t>
+            </a:r>
+            <a:r>
+              <a:rPr lang="en-US" dirty="0" err="1" smtClean="0"/>
+              <a:t>resettare</a:t>
+            </a:r>
+            <a:r>
+              <a:rPr lang="en-US" dirty="0" smtClean="0"/>
+              <a:t> </a:t>
+            </a:r>
+            <a:r>
+              <a:rPr lang="en-US" dirty="0" err="1" smtClean="0"/>
+              <a:t>alla</a:t>
+            </a:r>
+            <a:r>
+              <a:rPr lang="en-US" dirty="0" smtClean="0"/>
+              <a:t> </a:t>
+            </a:r>
+            <a:r>
+              <a:rPr lang="en-US" dirty="0" err="1" smtClean="0"/>
+              <a:t>condizione</a:t>
+            </a:r>
+            <a:r>
+              <a:rPr lang="en-US" dirty="0" smtClean="0"/>
+              <a:t> </a:t>
+            </a:r>
+            <a:r>
+              <a:rPr lang="en-US" dirty="0" err="1" smtClean="0"/>
+              <a:t>iniziale</a:t>
+            </a:r>
+            <a:r>
+              <a:rPr lang="en-US" dirty="0" smtClean="0"/>
+              <a:t>, </a:t>
+            </a:r>
+            <a:r>
+              <a:rPr lang="en-US" dirty="0" err="1" smtClean="0"/>
+              <a:t>mediante</a:t>
+            </a:r>
+            <a:r>
+              <a:rPr lang="en-US" dirty="0" smtClean="0"/>
+              <a:t> </a:t>
+            </a:r>
+            <a:r>
+              <a:rPr lang="en-US" dirty="0" err="1" smtClean="0"/>
+              <a:t>tasto</a:t>
+            </a:r>
+            <a:r>
+              <a:rPr lang="en-US" dirty="0" smtClean="0"/>
+              <a:t> </a:t>
+            </a:r>
+            <a:r>
+              <a:rPr lang="en-US" dirty="0" err="1" smtClean="0"/>
+              <a:t>destro</a:t>
+            </a:r>
+            <a:r>
+              <a:rPr lang="en-US" dirty="0" smtClean="0"/>
+              <a:t> </a:t>
+            </a:r>
+            <a:r>
+              <a:rPr lang="en-US" dirty="0" err="1" smtClean="0"/>
+              <a:t>sull’albero</a:t>
+            </a:r>
+            <a:endParaRPr lang="en-US" dirty="0" smtClean="0"/>
+          </a:p>
+          <a:p>
+            <a:pPr lvl="1" algn="just"/>
+            <a:r>
+              <a:rPr lang="en-US" dirty="0" err="1" smtClean="0"/>
+              <a:t>Selezionare</a:t>
+            </a:r>
+            <a:r>
+              <a:rPr lang="en-US" dirty="0" smtClean="0"/>
+              <a:t> diverse </a:t>
+            </a:r>
+            <a:r>
+              <a:rPr lang="en-US" dirty="0" err="1" smtClean="0"/>
+              <a:t>colonne</a:t>
+            </a:r>
+            <a:r>
+              <a:rPr lang="en-US" dirty="0" smtClean="0"/>
+              <a:t> </a:t>
+            </a:r>
+          </a:p>
+          <a:p>
+            <a:pPr marL="274320" lvl="1" indent="0" algn="just">
+              <a:buNone/>
+            </a:pPr>
+            <a:endParaRPr lang="en-US" dirty="0" smtClean="0"/>
+          </a:p>
+          <a:p>
+            <a:pPr lvl="0" algn="just"/>
+            <a:r>
+              <a:rPr lang="en-US" dirty="0" smtClean="0"/>
+              <a:t>Modules: </a:t>
+            </a:r>
+            <a:r>
+              <a:rPr lang="en-US" dirty="0" err="1" smtClean="0"/>
+              <a:t>vediamo</a:t>
+            </a:r>
+            <a:r>
+              <a:rPr lang="en-US" dirty="0" smtClean="0"/>
+              <a:t> I moduli </a:t>
+            </a:r>
+            <a:r>
+              <a:rPr lang="en-US" dirty="0" err="1" smtClean="0"/>
+              <a:t>coinvolti</a:t>
+            </a:r>
+            <a:r>
+              <a:rPr lang="en-US" dirty="0" smtClean="0"/>
+              <a:t>, </a:t>
+            </a:r>
+            <a:r>
+              <a:rPr lang="en-US" dirty="0" err="1" smtClean="0"/>
+              <a:t>ognuno</a:t>
+            </a:r>
+            <a:r>
+              <a:rPr lang="en-US" dirty="0" smtClean="0"/>
+              <a:t> </a:t>
+            </a:r>
+            <a:r>
+              <a:rPr lang="en-US" dirty="0" err="1" smtClean="0"/>
+              <a:t>dei</a:t>
+            </a:r>
+            <a:r>
+              <a:rPr lang="en-US" dirty="0" smtClean="0"/>
+              <a:t> </a:t>
+            </a:r>
+            <a:r>
+              <a:rPr lang="en-US" dirty="0" err="1" smtClean="0"/>
+              <a:t>quali</a:t>
+            </a:r>
+            <a:r>
+              <a:rPr lang="en-US" dirty="0" smtClean="0"/>
+              <a:t> è root </a:t>
+            </a:r>
+            <a:r>
+              <a:rPr lang="en-US" dirty="0" err="1" smtClean="0"/>
+              <a:t>dell’albero</a:t>
+            </a:r>
+            <a:endParaRPr lang="en-US" dirty="0"/>
+          </a:p>
+          <a:p>
+            <a:pPr lvl="1" algn="just"/>
+            <a:r>
+              <a:rPr lang="en-US" dirty="0" smtClean="0"/>
+              <a:t>Se </a:t>
+            </a:r>
+            <a:r>
+              <a:rPr lang="en-US" dirty="0" err="1" smtClean="0"/>
+              <a:t>una</a:t>
+            </a:r>
+            <a:r>
+              <a:rPr lang="en-US" dirty="0" smtClean="0"/>
+              <a:t> </a:t>
+            </a:r>
+            <a:r>
+              <a:rPr lang="en-US" dirty="0" err="1" smtClean="0"/>
+              <a:t>determinata</a:t>
+            </a:r>
+            <a:r>
+              <a:rPr lang="en-US" dirty="0" smtClean="0"/>
+              <a:t> </a:t>
             </a:r>
             <a:r>
               <a:rPr lang="en-US" dirty="0" err="1" smtClean="0"/>
@@ -14271,15 +14680,95 @@
             </a:r>
             <a:r>
               <a:rPr lang="en-US" dirty="0" smtClean="0"/>
+              <a:t> </a:t>
+            </a:r>
+            <a:r>
+              <a:rPr lang="en-US" dirty="0" err="1" smtClean="0"/>
+              <a:t>stava</a:t>
+            </a:r>
+            <a:r>
+              <a:rPr lang="en-US" dirty="0" smtClean="0"/>
+              <a:t> </a:t>
+            </a:r>
+            <a:r>
+              <a:rPr lang="en-US" dirty="0" err="1" smtClean="0"/>
+              <a:t>eseguendo</a:t>
+            </a:r>
+            <a:r>
+              <a:rPr lang="en-US" dirty="0" smtClean="0"/>
+              <a:t> al </a:t>
+            </a:r>
+            <a:r>
+              <a:rPr lang="en-US" dirty="0" err="1" smtClean="0"/>
+              <a:t>momento</a:t>
+            </a:r>
+            <a:r>
+              <a:rPr lang="en-US" dirty="0" smtClean="0"/>
+              <a:t> </a:t>
+            </a:r>
+            <a:r>
+              <a:rPr lang="en-US" dirty="0" err="1" smtClean="0"/>
+              <a:t>della</a:t>
+            </a:r>
+            <a:r>
+              <a:rPr lang="en-US" dirty="0" smtClean="0"/>
+              <a:t> </a:t>
+            </a:r>
+            <a:r>
+              <a:rPr lang="en-US" dirty="0" err="1" smtClean="0"/>
+              <a:t>misurazione</a:t>
+            </a:r>
+            <a:r>
+              <a:rPr lang="en-US" dirty="0" smtClean="0"/>
+              <a:t>, </a:t>
+            </a:r>
+            <a:r>
+              <a:rPr lang="en-US" dirty="0" err="1" smtClean="0"/>
+              <a:t>viene</a:t>
+            </a:r>
+            <a:r>
+              <a:rPr lang="en-US" dirty="0" smtClean="0"/>
+              <a:t> </a:t>
+            </a:r>
+            <a:r>
+              <a:rPr lang="en-US" dirty="0" err="1" smtClean="0"/>
+              <a:t>mostrata</a:t>
+            </a:r>
+            <a:r>
+              <a:rPr lang="en-US" dirty="0" smtClean="0"/>
               <a:t> in </a:t>
             </a:r>
             <a:r>
               <a:rPr lang="en-US" dirty="0" err="1" smtClean="0"/>
-              <a:t>esame</a:t>
-            </a:r>
-            <a:r>
-              <a:rPr lang="en-US" dirty="0" smtClean="0"/>
-              <a:t>, la </a:t>
+              <a:t>questa</a:t>
+            </a:r>
+            <a:r>
+              <a:rPr lang="en-US" dirty="0" smtClean="0"/>
+              <a:t> vista. E’ </a:t>
+            </a:r>
+            <a:r>
+              <a:rPr lang="en-US" dirty="0" err="1" smtClean="0"/>
+              <a:t>possibile</a:t>
+            </a:r>
+            <a:r>
+              <a:rPr lang="en-US" dirty="0" smtClean="0"/>
+              <a:t> </a:t>
+            </a:r>
+            <a:r>
+              <a:rPr lang="en-US" dirty="0" err="1" smtClean="0"/>
+              <a:t>cliccare</a:t>
+            </a:r>
+            <a:r>
+              <a:rPr lang="en-US" dirty="0" smtClean="0"/>
+              <a:t> </a:t>
+            </a:r>
+            <a:r>
+              <a:rPr lang="en-US" dirty="0" err="1" smtClean="0"/>
+              <a:t>sulla</a:t>
+            </a:r>
+            <a:r>
+              <a:rPr lang="en-US" dirty="0" smtClean="0"/>
+              <a:t> </a:t>
             </a:r>
             <a:r>
               <a:rPr lang="en-US" dirty="0" err="1" smtClean="0"/>
@@ -14287,138 +14776,99 @@
             </a:r>
             <a:r>
               <a:rPr lang="en-US" dirty="0" smtClean="0"/>
-              <a:t> padre e le </a:t>
-            </a:r>
-            <a:r>
-              <a:rPr lang="en-US" dirty="0" err="1" smtClean="0"/>
-              <a:t>funzioni</a:t>
-            </a:r>
-            <a:r>
-              <a:rPr lang="en-US" dirty="0" smtClean="0"/>
-              <a:t> </a:t>
-            </a:r>
-            <a:r>
-              <a:rPr lang="en-US" dirty="0" err="1" smtClean="0"/>
-              <a:t>figlie</a:t>
+              <a:t> e </a:t>
+            </a:r>
+            <a:r>
+              <a:rPr lang="en-US" dirty="0" err="1" smtClean="0"/>
+              <a:t>raggiungere</a:t>
+            </a:r>
+            <a:r>
+              <a:rPr lang="en-US" dirty="0" smtClean="0"/>
+              <a:t> </a:t>
+            </a:r>
+            <a:r>
+              <a:rPr lang="en-US" dirty="0" err="1" smtClean="0"/>
+              <a:t>direttamente</a:t>
+            </a:r>
+            <a:r>
+              <a:rPr lang="en-US" dirty="0" smtClean="0"/>
+              <a:t> </a:t>
+            </a:r>
+            <a:r>
+              <a:rPr lang="en-US" dirty="0" err="1" smtClean="0"/>
+              <a:t>il</a:t>
+            </a:r>
+            <a:r>
+              <a:rPr lang="en-US" dirty="0" smtClean="0"/>
+              <a:t> </a:t>
+            </a:r>
+            <a:r>
+              <a:rPr lang="en-US" dirty="0" err="1" smtClean="0"/>
+              <a:t>sorgente</a:t>
             </a:r>
             <a:r>
               <a:rPr lang="en-US" dirty="0" smtClean="0"/>
               <a:t>. </a:t>
             </a:r>
-          </a:p>
-          <a:p>
-            <a:pPr lvl="1" algn="just"/>
-            <a:r>
-              <a:rPr lang="en-US" dirty="0" err="1" smtClean="0"/>
-              <a:t>Anche</a:t>
-            </a:r>
-            <a:r>
-              <a:rPr lang="en-US" dirty="0" smtClean="0"/>
-              <a:t> in </a:t>
-            </a:r>
-            <a:r>
-              <a:rPr lang="en-US" dirty="0" err="1" smtClean="0"/>
-              <a:t>questo</a:t>
-            </a:r>
-            <a:r>
-              <a:rPr lang="en-US" dirty="0" smtClean="0"/>
-              <a:t> </a:t>
-            </a:r>
-            <a:r>
-              <a:rPr lang="en-US" dirty="0" err="1" smtClean="0"/>
-              <a:t>caso</a:t>
-            </a:r>
-            <a:r>
-              <a:rPr lang="en-US" dirty="0" smtClean="0"/>
-              <a:t> è </a:t>
-            </a:r>
-            <a:r>
-              <a:rPr lang="en-US" dirty="0" err="1" smtClean="0"/>
-              <a:t>possibil</a:t>
-            </a:r>
-            <a:r>
-              <a:rPr lang="en-US" dirty="0" err="1" smtClean="0"/>
-              <a:t>e</a:t>
-            </a:r>
-            <a:r>
-              <a:rPr lang="en-US" dirty="0" smtClean="0"/>
-              <a:t> </a:t>
-            </a:r>
-            <a:r>
-              <a:rPr lang="en-US" dirty="0" err="1" smtClean="0"/>
-              <a:t>discriminare</a:t>
-            </a:r>
-            <a:r>
-              <a:rPr lang="en-US" dirty="0" smtClean="0"/>
-              <a:t> </a:t>
-            </a:r>
-            <a:r>
-              <a:rPr lang="en-US" dirty="0" err="1" smtClean="0"/>
-              <a:t>i</a:t>
-            </a:r>
-            <a:r>
-              <a:rPr lang="en-US" dirty="0" smtClean="0"/>
-              <a:t> </a:t>
-            </a:r>
-            <a:r>
-              <a:rPr lang="en-US" dirty="0" err="1" smtClean="0"/>
-              <a:t>contatori</a:t>
-            </a:r>
-            <a:r>
-              <a:rPr lang="en-US" dirty="0" smtClean="0"/>
-              <a:t> inclusive/exclusive e le relative </a:t>
-            </a:r>
-            <a:r>
-              <a:rPr lang="en-US" dirty="0" err="1" smtClean="0"/>
-              <a:t>percentuali</a:t>
-            </a:r>
-            <a:endParaRPr lang="en-US" dirty="0" smtClean="0"/>
-          </a:p>
-          <a:p>
-            <a:pPr lvl="0" algn="just"/>
-            <a:r>
-              <a:rPr lang="en-US" dirty="0" smtClean="0"/>
-              <a:t> Functions </a:t>
-            </a:r>
-            <a:r>
-              <a:rPr lang="en-US" dirty="0"/>
-              <a:t>view: </a:t>
-            </a:r>
-            <a:endParaRPr lang="en-US" dirty="0" smtClean="0"/>
-          </a:p>
-          <a:p>
-            <a:pPr lvl="1" algn="just"/>
-            <a:r>
-              <a:rPr lang="en-US" dirty="0" smtClean="0"/>
-              <a:t>Vista </a:t>
-            </a:r>
-            <a:r>
-              <a:rPr lang="en-US" dirty="0" err="1" smtClean="0"/>
-              <a:t>sulle</a:t>
-            </a:r>
-            <a:r>
-              <a:rPr lang="en-US" dirty="0" smtClean="0"/>
-              <a:t> </a:t>
-            </a:r>
-            <a:r>
-              <a:rPr lang="en-US" dirty="0" err="1" smtClean="0"/>
-              <a:t>funzioni</a:t>
-            </a:r>
-            <a:r>
-              <a:rPr lang="en-US" dirty="0" smtClean="0"/>
-              <a:t> </a:t>
-            </a:r>
-            <a:r>
-              <a:rPr lang="en-US" dirty="0" err="1" smtClean="0"/>
-              <a:t>chiamate</a:t>
-            </a:r>
-            <a:r>
-              <a:rPr lang="en-US" dirty="0" smtClean="0"/>
-              <a:t>. Utile a </a:t>
-            </a:r>
-            <a:r>
-              <a:rPr lang="en-US" dirty="0" err="1" smtClean="0"/>
-              <a:t>patto</a:t>
+            <a:r>
+              <a:rPr lang="en-US" dirty="0" err="1" smtClean="0"/>
+              <a:t>Qualora</a:t>
+            </a:r>
+            <a:r>
+              <a:rPr lang="en-US" dirty="0"/>
+              <a:t> </a:t>
+            </a:r>
+            <a:r>
+              <a:rPr lang="en-US" dirty="0" err="1" smtClean="0"/>
+              <a:t>gli</a:t>
+            </a:r>
+            <a:r>
+              <a:rPr lang="en-US" dirty="0" smtClean="0"/>
+              <a:t> </a:t>
+            </a:r>
+            <a:r>
+              <a:rPr lang="en-US" dirty="0" err="1" smtClean="0"/>
+              <a:t>indicatori</a:t>
+            </a:r>
+            <a:r>
+              <a:rPr lang="en-US" dirty="0" smtClean="0"/>
+              <a:t> di inclusive </a:t>
+            </a:r>
+            <a:r>
+              <a:rPr lang="en-US" dirty="0" err="1" smtClean="0"/>
+              <a:t>ed</a:t>
+            </a:r>
+            <a:r>
+              <a:rPr lang="en-US" dirty="0" smtClean="0"/>
+              <a:t> exclusive </a:t>
+            </a:r>
+            <a:r>
+              <a:rPr lang="en-US" dirty="0" err="1" smtClean="0"/>
+              <a:t>coincidano</a:t>
+            </a:r>
+            <a:r>
+              <a:rPr lang="en-US" dirty="0" smtClean="0"/>
+              <a:t>, </a:t>
+            </a:r>
+            <a:r>
+              <a:rPr lang="en-US" dirty="0" err="1" smtClean="0"/>
+              <a:t>il</a:t>
+            </a:r>
+            <a:r>
+              <a:rPr lang="en-US" dirty="0" smtClean="0"/>
+              <a:t> tool ha </a:t>
+            </a:r>
+            <a:r>
+              <a:rPr lang="en-US" dirty="0" err="1" smtClean="0"/>
+              <a:t>tracciato</a:t>
+            </a:r>
+            <a:r>
+              <a:rPr lang="en-US" dirty="0" smtClean="0"/>
+              <a:t> </a:t>
+            </a:r>
+            <a:r>
+              <a:rPr lang="en-US" dirty="0" err="1" smtClean="0"/>
+              <a:t>qualcosa</a:t>
             </a:r>
             <a:r>
               <a:rPr lang="en-US" dirty="0" smtClean="0"/>
@@ -14426,87 +14876,42 @@
             </a:r>
             <a:r>
               <a:rPr lang="en-US" dirty="0" err="1" smtClean="0"/>
-              <a:t>configurare</a:t>
-            </a:r>
-            <a:r>
-              <a:rPr lang="en-US" dirty="0" smtClean="0"/>
-              <a:t> </a:t>
-            </a:r>
-            <a:r>
-              <a:rPr lang="en-US" dirty="0" err="1" smtClean="0"/>
-              <a:t>il</a:t>
-            </a:r>
-            <a:r>
-              <a:rPr lang="en-US" dirty="0" smtClean="0"/>
-              <a:t> modulo di </a:t>
-            </a:r>
-            <a:r>
-              <a:rPr lang="en-US" dirty="0" err="1" smtClean="0"/>
-              <a:t>provenienza</a:t>
-            </a:r>
-            <a:r>
-              <a:rPr lang="en-US" dirty="0" smtClean="0"/>
-              <a:t> </a:t>
-            </a:r>
-            <a:r>
-              <a:rPr lang="en-US" dirty="0" err="1" smtClean="0"/>
-              <a:t>della</a:t>
-            </a:r>
-            <a:r>
-              <a:rPr lang="en-US" dirty="0" smtClean="0"/>
-              <a:t> </a:t>
-            </a:r>
-            <a:r>
-              <a:rPr lang="en-US" dirty="0" err="1" smtClean="0"/>
-              <a:t>funzione</a:t>
-            </a:r>
-            <a:r>
-              <a:rPr lang="en-US" dirty="0"/>
-              <a:t> </a:t>
-            </a:r>
-            <a:r>
-              <a:rPr lang="en-US" dirty="0" smtClean="0"/>
-              <a:t>o se </a:t>
-            </a:r>
-            <a:r>
-              <a:rPr lang="en-US" dirty="0" err="1" smtClean="0"/>
-              <a:t>si</a:t>
-            </a:r>
-            <a:r>
-              <a:rPr lang="en-US" dirty="0" smtClean="0"/>
-              <a:t> </a:t>
-            </a:r>
-            <a:r>
-              <a:rPr lang="en-US" dirty="0" err="1" smtClean="0"/>
-              <a:t>utilizza</a:t>
-            </a:r>
-            <a:r>
-              <a:rPr lang="en-US" dirty="0" smtClean="0"/>
-              <a:t> “show just my code” </a:t>
-            </a:r>
-            <a:r>
-              <a:rPr lang="en-US" dirty="0" err="1" smtClean="0"/>
-              <a:t>nel</a:t>
-            </a:r>
-            <a:r>
-              <a:rPr lang="en-US" dirty="0" smtClean="0"/>
-              <a:t> summary</a:t>
+              <a:t>atomico</a:t>
+            </a:r>
+            <a:r>
+              <a:rPr lang="en-US" dirty="0" smtClean="0"/>
+              <a:t>, </a:t>
+            </a:r>
+            <a:r>
+              <a:rPr lang="en-US" dirty="0" err="1" smtClean="0"/>
+              <a:t>quindi</a:t>
+            </a:r>
+            <a:r>
+              <a:rPr lang="en-US" dirty="0" smtClean="0"/>
+              <a:t> </a:t>
+            </a:r>
+            <a:r>
+              <a:rPr lang="en-US" dirty="0" err="1" smtClean="0"/>
+              <a:t>l’instruction</a:t>
+            </a:r>
+            <a:r>
+              <a:rPr lang="en-US" dirty="0" smtClean="0"/>
+              <a:t> pointer (ad </a:t>
+            </a:r>
+            <a:r>
+              <a:rPr lang="en-US" dirty="0" err="1" smtClean="0"/>
+              <a:t>esempio</a:t>
+            </a:r>
+            <a:r>
+              <a:rPr lang="en-US" dirty="0" smtClean="0"/>
+              <a:t> in moduli di Sistema)</a:t>
             </a:r>
             <a:endParaRPr lang="en-US" dirty="0"/>
           </a:p>
           <a:p>
-            <a:pPr lvl="0" algn="just"/>
-            <a:r>
-              <a:rPr lang="en-US" dirty="0" smtClean="0"/>
-              <a:t>Lines view</a:t>
-            </a:r>
-            <a:r>
-              <a:rPr lang="en-US" dirty="0"/>
-              <a:t>: </a:t>
-            </a:r>
-          </a:p>
-          <a:p>
-            <a:pPr lvl="1" algn="just"/>
+            <a:pPr marL="274320" lvl="1" indent="0" algn="just">
+              <a:buNone/>
+            </a:pPr>
             <a:endParaRPr lang="en-US" dirty="0"/>
           </a:p>
           <a:p>
@@ -14520,18 +14925,18 @@
     </p:spTree>
     <p:extLst>
       <p:ext uri="{BB962C8B-B14F-4D97-AF65-F5344CB8AC3E}">
-        <p14:creationId xmlns:p14="http://schemas.microsoft.com/office/powerpoint/2010/main" val="2522682778"/>
+        <p14:creationId xmlns:p14="http://schemas.microsoft.com/office/powerpoint/2010/main" val="3226164041"/>
       </p:ext>
     </p:extLst>
   </p:cSld>
   <p:clrMapOvr>
     <a:masterClrMapping/>
   </p:clrMapOvr>
-  <mc:AlternateContent xmlns:mc="http://schemas.openxmlformats.org/markup-compatibility/2006">
-    <mc:Choice xmlns:p14="http://schemas.microsoft.com/office/powerpoint/2010/main" Requires="p14">
+  <mc:AlternateContent xmlns:mc="http://schemas.openxmlformats.org/markup-compatibility/2006" xmlns:p14="http://schemas.microsoft.com/office/powerpoint/2010/main">
+    <mc:Choice Requires="p14">
       <p:transition spd="slow" p14:dur="2000"/>
     </mc:Choice>
-    <mc:Fallback>
+    <mc:Fallback xmlns="">
       <p:transition spd="slow"/>
     </mc:Fallback>
   </mc:AlternateContent>
@@ -14564,7 +14969,7 @@
       </p:grpSpPr>
       <p:sp>
         <p:nvSpPr>
-          <p:cNvPr id="4" name="Title 3"/>
+          <p:cNvPr id="2" name="Title 1"/>
           <p:cNvSpPr>
             <a:spLocks noGrp="1"/>
           </p:cNvSpPr>
@@ -14578,8 +14983,24 @@
           <a:lstStyle/>
           <a:p>
             <a:r>
-              <a:rPr lang="it-IT" dirty="0" smtClean="0"/>
-              <a:t>Demo</a:t>
+              <a:rPr lang="en-US" dirty="0" smtClean="0"/>
+              <a:t>Profiler – </a:t>
+            </a:r>
+            <a:r>
+              <a:rPr lang="en-US" dirty="0" err="1" smtClean="0"/>
+              <a:t>altre</a:t>
+            </a:r>
+            <a:r>
+              <a:rPr lang="en-US" dirty="0" smtClean="0"/>
+              <a:t> </a:t>
+            </a:r>
+            <a:r>
+              <a:rPr lang="en-US" dirty="0" err="1" smtClean="0"/>
+              <a:t>viste</a:t>
+            </a:r>
+            <a:r>
+              <a:rPr lang="en-US" dirty="0" smtClean="0"/>
+              <a:t> (2)</a:t>
             </a:r>
             <a:endParaRPr lang="it-IT" dirty="0"/>
           </a:p>
@@ -14587,39 +15008,313 @@
       </p:sp>
       <p:sp>
         <p:nvSpPr>
-          <p:cNvPr id="5" name="Text Placeholder 4"/>
+          <p:cNvPr id="3" name="Content Placeholder 2"/>
           <p:cNvSpPr>
             <a:spLocks noGrp="1"/>
           </p:cNvSpPr>
           <p:nvPr>
-            <p:ph type="body" idx="1"/>
+            <p:ph idx="1"/>
           </p:nvPr>
         </p:nvSpPr>
         <p:spPr/>
         <p:txBody>
-          <a:bodyPr/>
+          <a:bodyPr>
+            <a:normAutofit/>
+          </a:bodyPr>
           <a:lstStyle/>
           <a:p>
-            <a:r>
-              <a:rPr lang="fr-FR" dirty="0" err="1" smtClean="0"/>
-              <a:t>Sampling</a:t>
-            </a:r>
-            <a:r>
-              <a:rPr lang="fr-FR" dirty="0" smtClean="0"/>
-              <a:t> – Instrumentation - </a:t>
-            </a:r>
-            <a:r>
-              <a:rPr lang="fr-FR" dirty="0" err="1" smtClean="0"/>
-              <a:t>Concurrency</a:t>
-            </a:r>
-            <a:endParaRPr lang="fr-FR" dirty="0"/>
+            <a:pPr lvl="0" algn="just"/>
+            <a:r>
+              <a:rPr lang="en-US" dirty="0" smtClean="0"/>
+              <a:t>Caller/</a:t>
+            </a:r>
+            <a:r>
+              <a:rPr lang="en-US" dirty="0" err="1" smtClean="0"/>
+              <a:t>Calle</a:t>
+            </a:r>
+            <a:r>
+              <a:rPr lang="en-US" dirty="0" smtClean="0"/>
+              <a:t> view: </a:t>
+            </a:r>
+          </a:p>
+          <a:p>
+            <a:pPr lvl="1" algn="just"/>
+            <a:r>
+              <a:rPr lang="en-US" dirty="0" err="1" smtClean="0"/>
+              <a:t>Vengono</a:t>
+            </a:r>
+            <a:r>
+              <a:rPr lang="en-US" dirty="0" smtClean="0"/>
+              <a:t> </a:t>
+            </a:r>
+            <a:r>
+              <a:rPr lang="en-US" dirty="0" err="1" smtClean="0"/>
+              <a:t>mostrate</a:t>
+            </a:r>
+            <a:r>
+              <a:rPr lang="en-US" dirty="0" smtClean="0"/>
+              <a:t> 3 </a:t>
+            </a:r>
+            <a:r>
+              <a:rPr lang="en-US" dirty="0" err="1" smtClean="0"/>
+              <a:t>viste</a:t>
+            </a:r>
+            <a:r>
+              <a:rPr lang="en-US" dirty="0" smtClean="0"/>
+              <a:t>, la </a:t>
+            </a:r>
+            <a:r>
+              <a:rPr lang="en-US" dirty="0" err="1" smtClean="0"/>
+              <a:t>funzione</a:t>
+            </a:r>
+            <a:r>
+              <a:rPr lang="en-US" dirty="0" smtClean="0"/>
+              <a:t> in </a:t>
+            </a:r>
+            <a:r>
+              <a:rPr lang="en-US" dirty="0" err="1" smtClean="0"/>
+              <a:t>esame</a:t>
+            </a:r>
+            <a:r>
+              <a:rPr lang="en-US" dirty="0" smtClean="0"/>
+              <a:t>, la </a:t>
+            </a:r>
+            <a:r>
+              <a:rPr lang="en-US" dirty="0" err="1" smtClean="0"/>
+              <a:t>funzione</a:t>
+            </a:r>
+            <a:r>
+              <a:rPr lang="en-US" dirty="0" smtClean="0"/>
+              <a:t> padre e le </a:t>
+            </a:r>
+            <a:r>
+              <a:rPr lang="en-US" dirty="0" err="1" smtClean="0"/>
+              <a:t>funzioni</a:t>
+            </a:r>
+            <a:r>
+              <a:rPr lang="en-US" dirty="0" smtClean="0"/>
+              <a:t> </a:t>
+            </a:r>
+            <a:r>
+              <a:rPr lang="en-US" dirty="0" err="1" smtClean="0"/>
+              <a:t>figlie</a:t>
+            </a:r>
+            <a:r>
+              <a:rPr lang="en-US" dirty="0" smtClean="0"/>
+              <a:t>. </a:t>
+            </a:r>
+          </a:p>
+          <a:p>
+            <a:pPr lvl="1" algn="just"/>
+            <a:r>
+              <a:rPr lang="en-US" dirty="0" err="1" smtClean="0"/>
+              <a:t>Anche</a:t>
+            </a:r>
+            <a:r>
+              <a:rPr lang="en-US" dirty="0" smtClean="0"/>
+              <a:t> in </a:t>
+            </a:r>
+            <a:r>
+              <a:rPr lang="en-US" dirty="0" err="1" smtClean="0"/>
+              <a:t>questo</a:t>
+            </a:r>
+            <a:r>
+              <a:rPr lang="en-US" dirty="0" smtClean="0"/>
+              <a:t> </a:t>
+            </a:r>
+            <a:r>
+              <a:rPr lang="en-US" dirty="0" err="1" smtClean="0"/>
+              <a:t>caso</a:t>
+            </a:r>
+            <a:r>
+              <a:rPr lang="en-US" dirty="0" smtClean="0"/>
+              <a:t> è </a:t>
+            </a:r>
+            <a:r>
+              <a:rPr lang="en-US" dirty="0" err="1" smtClean="0"/>
+              <a:t>possibile</a:t>
+            </a:r>
+            <a:r>
+              <a:rPr lang="en-US" dirty="0" smtClean="0"/>
+              <a:t> </a:t>
+            </a:r>
+            <a:r>
+              <a:rPr lang="en-US" dirty="0" err="1" smtClean="0"/>
+              <a:t>discriminare</a:t>
+            </a:r>
+            <a:r>
+              <a:rPr lang="en-US" dirty="0" smtClean="0"/>
+              <a:t> </a:t>
+            </a:r>
+            <a:r>
+              <a:rPr lang="en-US" dirty="0" err="1" smtClean="0"/>
+              <a:t>i</a:t>
+            </a:r>
+            <a:r>
+              <a:rPr lang="en-US" dirty="0" smtClean="0"/>
+              <a:t> </a:t>
+            </a:r>
+            <a:r>
+              <a:rPr lang="en-US" dirty="0" err="1" smtClean="0"/>
+              <a:t>contatori</a:t>
+            </a:r>
+            <a:r>
+              <a:rPr lang="en-US" dirty="0" smtClean="0"/>
+              <a:t> inclusive/exclusive e le relative </a:t>
+            </a:r>
+            <a:r>
+              <a:rPr lang="en-US" dirty="0" err="1" smtClean="0"/>
+              <a:t>percentuali</a:t>
+            </a:r>
+            <a:endParaRPr lang="en-US" dirty="0" smtClean="0"/>
+          </a:p>
+          <a:p>
+            <a:pPr lvl="0" algn="just"/>
+            <a:r>
+              <a:rPr lang="en-US" dirty="0" smtClean="0"/>
+              <a:t> Functions </a:t>
+            </a:r>
+            <a:r>
+              <a:rPr lang="en-US" dirty="0"/>
+              <a:t>view: </a:t>
+            </a:r>
+            <a:endParaRPr lang="en-US" dirty="0" smtClean="0"/>
+          </a:p>
+          <a:p>
+            <a:pPr lvl="1" algn="just"/>
+            <a:r>
+              <a:rPr lang="en-US" dirty="0" smtClean="0"/>
+              <a:t>Vista </a:t>
+            </a:r>
+            <a:r>
+              <a:rPr lang="en-US" dirty="0" err="1" smtClean="0"/>
+              <a:t>sulle</a:t>
+            </a:r>
+            <a:r>
+              <a:rPr lang="en-US" dirty="0" smtClean="0"/>
+              <a:t> </a:t>
+            </a:r>
+            <a:r>
+              <a:rPr lang="en-US" dirty="0" err="1" smtClean="0"/>
+              <a:t>funzioni</a:t>
+            </a:r>
+            <a:r>
+              <a:rPr lang="en-US" dirty="0" smtClean="0"/>
+              <a:t> </a:t>
+            </a:r>
+            <a:r>
+              <a:rPr lang="en-US" dirty="0" err="1" smtClean="0"/>
+              <a:t>chiamate</a:t>
+            </a:r>
+            <a:r>
+              <a:rPr lang="en-US" dirty="0" smtClean="0"/>
+              <a:t>. Utile a </a:t>
+            </a:r>
+            <a:r>
+              <a:rPr lang="en-US" dirty="0" err="1" smtClean="0"/>
+              <a:t>patto</a:t>
+            </a:r>
+            <a:r>
+              <a:rPr lang="en-US" dirty="0" smtClean="0"/>
+              <a:t> di </a:t>
+            </a:r>
+            <a:r>
+              <a:rPr lang="en-US" dirty="0" err="1" smtClean="0"/>
+              <a:t>configurare</a:t>
+            </a:r>
+            <a:r>
+              <a:rPr lang="en-US" dirty="0" smtClean="0"/>
+              <a:t> </a:t>
+            </a:r>
+            <a:r>
+              <a:rPr lang="en-US" dirty="0" err="1" smtClean="0"/>
+              <a:t>il</a:t>
+            </a:r>
+            <a:r>
+              <a:rPr lang="en-US" dirty="0" smtClean="0"/>
+              <a:t> modulo di </a:t>
+            </a:r>
+            <a:r>
+              <a:rPr lang="en-US" dirty="0" err="1" smtClean="0"/>
+              <a:t>provenienza</a:t>
+            </a:r>
+            <a:r>
+              <a:rPr lang="en-US" dirty="0" smtClean="0"/>
+              <a:t> </a:t>
+            </a:r>
+            <a:r>
+              <a:rPr lang="en-US" dirty="0" err="1" smtClean="0"/>
+              <a:t>della</a:t>
+            </a:r>
+            <a:r>
+              <a:rPr lang="en-US" dirty="0" smtClean="0"/>
+              <a:t> </a:t>
+            </a:r>
+            <a:r>
+              <a:rPr lang="en-US" dirty="0" err="1" smtClean="0"/>
+              <a:t>funzione</a:t>
+            </a:r>
+            <a:r>
+              <a:rPr lang="en-US" dirty="0"/>
+              <a:t> </a:t>
+            </a:r>
+            <a:r>
+              <a:rPr lang="en-US" dirty="0" smtClean="0"/>
+              <a:t>o se </a:t>
+            </a:r>
+            <a:r>
+              <a:rPr lang="en-US" dirty="0" err="1" smtClean="0"/>
+              <a:t>si</a:t>
+            </a:r>
+            <a:r>
+              <a:rPr lang="en-US" dirty="0" smtClean="0"/>
+              <a:t> </a:t>
+            </a:r>
+            <a:r>
+              <a:rPr lang="en-US" dirty="0" err="1" smtClean="0"/>
+              <a:t>utilizza</a:t>
+            </a:r>
+            <a:r>
+              <a:rPr lang="en-US" dirty="0" smtClean="0"/>
+              <a:t> “show just my code” </a:t>
+            </a:r>
+            <a:r>
+              <a:rPr lang="en-US" dirty="0" err="1" smtClean="0"/>
+              <a:t>nel</a:t>
+            </a:r>
+            <a:r>
+              <a:rPr lang="en-US" dirty="0" smtClean="0"/>
+              <a:t> summary</a:t>
+            </a:r>
+            <a:endParaRPr lang="en-US" dirty="0"/>
+          </a:p>
+          <a:p>
+            <a:pPr lvl="0" algn="just"/>
+            <a:r>
+              <a:rPr lang="en-US" dirty="0" smtClean="0"/>
+              <a:t>Lines view</a:t>
+            </a:r>
+            <a:r>
+              <a:rPr lang="en-US" dirty="0"/>
+              <a:t>: </a:t>
+            </a:r>
+          </a:p>
+          <a:p>
+            <a:pPr lvl="1" algn="just"/>
+            <a:endParaRPr lang="en-US" dirty="0"/>
+          </a:p>
+          <a:p>
+            <a:pPr marL="274320" lvl="1" indent="0" algn="just">
+              <a:buNone/>
+            </a:pPr>
+            <a:endParaRPr lang="en-US" dirty="0" smtClean="0"/>
           </a:p>
         </p:txBody>
       </p:sp>
     </p:spTree>
     <p:extLst>
       <p:ext uri="{BB962C8B-B14F-4D97-AF65-F5344CB8AC3E}">
-        <p14:creationId xmlns:p14="http://schemas.microsoft.com/office/powerpoint/2010/main" val="178878209"/>
+        <p14:creationId xmlns:p14="http://schemas.microsoft.com/office/powerpoint/2010/main" val="2522682778"/>
       </p:ext>
     </p:extLst>
   </p:cSld>
@@ -14677,6 +15372,105 @@
           <a:lstStyle/>
           <a:p>
             <a:r>
+              <a:rPr lang="it-IT" dirty="0" smtClean="0"/>
+              <a:t>Demo</a:t>
+            </a:r>
+            <a:endParaRPr lang="it-IT" dirty="0"/>
+          </a:p>
+        </p:txBody>
+      </p:sp>
+      <p:sp>
+        <p:nvSpPr>
+          <p:cNvPr id="5" name="Text Placeholder 4"/>
+          <p:cNvSpPr>
+            <a:spLocks noGrp="1"/>
+          </p:cNvSpPr>
+          <p:nvPr>
+            <p:ph type="body" idx="1"/>
+          </p:nvPr>
+        </p:nvSpPr>
+        <p:spPr/>
+        <p:txBody>
+          <a:bodyPr/>
+          <a:lstStyle/>
+          <a:p>
+            <a:r>
+              <a:rPr lang="fr-FR" dirty="0" err="1" smtClean="0"/>
+              <a:t>Sampling</a:t>
+            </a:r>
+            <a:r>
+              <a:rPr lang="fr-FR" dirty="0" smtClean="0"/>
+              <a:t> – Instrumentation - </a:t>
+            </a:r>
+            <a:r>
+              <a:rPr lang="fr-FR" dirty="0" err="1" smtClean="0"/>
+              <a:t>Concurrency</a:t>
+            </a:r>
+            <a:endParaRPr lang="fr-FR" dirty="0"/>
+          </a:p>
+        </p:txBody>
+      </p:sp>
+    </p:spTree>
+    <p:extLst>
+      <p:ext uri="{BB962C8B-B14F-4D97-AF65-F5344CB8AC3E}">
+        <p14:creationId xmlns:p14="http://schemas.microsoft.com/office/powerpoint/2010/main" val="178878209"/>
+      </p:ext>
+    </p:extLst>
+  </p:cSld>
+  <p:clrMapOvr>
+    <a:masterClrMapping/>
+  </p:clrMapOvr>
+  <mc:AlternateContent xmlns:mc="http://schemas.openxmlformats.org/markup-compatibility/2006" xmlns:p14="http://schemas.microsoft.com/office/powerpoint/2010/main">
+    <mc:Choice Requires="p14">
+      <p:transition spd="slow" p14:dur="2000"/>
+    </mc:Choice>
+    <mc:Fallback xmlns="">
+      <p:transition spd="slow"/>
+    </mc:Fallback>
+  </mc:AlternateContent>
+  <p:timing>
+    <p:tnLst>
+      <p:par>
+        <p:cTn id="1" dur="indefinite" restart="never" nodeType="tmRoot"/>
+      </p:par>
+    </p:tnLst>
+  </p:timing>
+</p:sld>
+</file>
+
+<file path=ppt/slides/slide33.xml><?xml version="1.0" encoding="utf-8"?>
+<p:sld xmlns:a="http://schemas.openxmlformats.org/drawingml/2006/main" xmlns:r="http://schemas.openxmlformats.org/officeDocument/2006/relationships" xmlns:p="http://schemas.openxmlformats.org/presentationml/2006/main">
+  <p:cSld>
+    <p:spTree>
+      <p:nvGrpSpPr>
+        <p:cNvPr id="1" name=""/>
+        <p:cNvGrpSpPr/>
+        <p:nvPr/>
+      </p:nvGrpSpPr>
+      <p:grpSpPr>
+        <a:xfrm>
+          <a:off x="0" y="0"/>
+          <a:ext cx="0" cy="0"/>
+          <a:chOff x="0" y="0"/>
+          <a:chExt cx="0" cy="0"/>
+        </a:xfrm>
+      </p:grpSpPr>
+      <p:sp>
+        <p:nvSpPr>
+          <p:cNvPr id="4" name="Title 3"/>
+          <p:cNvSpPr>
+            <a:spLocks noGrp="1"/>
+          </p:cNvSpPr>
+          <p:nvPr>
+            <p:ph type="title"/>
+          </p:nvPr>
+        </p:nvSpPr>
+        <p:spPr/>
+        <p:txBody>
+          <a:bodyPr/>
+          <a:lstStyle/>
+          <a:p>
+            <a:r>
               <a:rPr lang="it-IT" dirty="0" err="1" smtClean="0"/>
               <a:t>Recap</a:t>
             </a:r>
@@ -14733,7 +15527,7 @@
 </p:sld>
 </file>
 
-<file path=ppt/slides/slide33.xml><?xml version="1.0" encoding="utf-8"?>
+<file path=ppt/slides/slide34.xml><?xml version="1.0" encoding="utf-8"?>
 <p:sld xmlns:a="http://schemas.openxmlformats.org/drawingml/2006/main" xmlns:r="http://schemas.openxmlformats.org/officeDocument/2006/relationships" xmlns:p="http://schemas.openxmlformats.org/presentationml/2006/main">
   <p:cSld>
     <p:spTree>

</xml_diff>

<commit_message>
alcune slide sul debugger
</commit_message>
<xml_diff>
--- a/presentazioneCDAYS2014.pptx
+++ b/presentazioneCDAYS2014.pptx
@@ -5,10 +5,10 @@
     <p:sldMasterId id="2147483840" r:id="rId1"/>
   </p:sldMasterIdLst>
   <p:notesMasterIdLst>
-    <p:notesMasterId r:id="rId36"/>
+    <p:notesMasterId r:id="rId45"/>
   </p:notesMasterIdLst>
   <p:handoutMasterIdLst>
-    <p:handoutMasterId r:id="rId37"/>
+    <p:handoutMasterId r:id="rId46"/>
   </p:handoutMasterIdLst>
   <p:sldIdLst>
     <p:sldId id="256" r:id="rId2"/>
@@ -43,8 +43,17 @@
     <p:sldId id="289" r:id="rId31"/>
     <p:sldId id="290" r:id="rId32"/>
     <p:sldId id="262" r:id="rId33"/>
-    <p:sldId id="264" r:id="rId34"/>
-    <p:sldId id="263" r:id="rId35"/>
+    <p:sldId id="293" r:id="rId34"/>
+    <p:sldId id="294" r:id="rId35"/>
+    <p:sldId id="295" r:id="rId36"/>
+    <p:sldId id="296" r:id="rId37"/>
+    <p:sldId id="300" r:id="rId38"/>
+    <p:sldId id="297" r:id="rId39"/>
+    <p:sldId id="298" r:id="rId40"/>
+    <p:sldId id="299" r:id="rId41"/>
+    <p:sldId id="301" r:id="rId42"/>
+    <p:sldId id="264" r:id="rId43"/>
+    <p:sldId id="263" r:id="rId44"/>
   </p:sldIdLst>
   <p:sldSz cx="12192000" cy="6858000"/>
   <p:notesSz cx="6858000" cy="9144000"/>
@@ -180,6 +189,15 @@
             <p14:sldId id="289"/>
             <p14:sldId id="290"/>
             <p14:sldId id="262"/>
+            <p14:sldId id="293"/>
+            <p14:sldId id="294"/>
+            <p14:sldId id="295"/>
+            <p14:sldId id="296"/>
+            <p14:sldId id="300"/>
+            <p14:sldId id="297"/>
+            <p14:sldId id="298"/>
+            <p14:sldId id="299"/>
+            <p14:sldId id="301"/>
             <p14:sldId id="264"/>
             <p14:sldId id="263"/>
           </p14:sldIdLst>
@@ -290,7 +308,7 @@
           <a:p>
             <a:fld id="{7541E3AA-7BE5-4B59-82F5-30F2E5FF0CD3}" type="datetimeFigureOut">
               <a:rPr lang="it-IT" smtClean="0"/>
-              <a:t>12/02/2014</a:t>
+              <a:t>16/02/2014</a:t>
             </a:fld>
             <a:endParaRPr lang="it-IT"/>
           </a:p>
@@ -455,7 +473,7 @@
           <a:p>
             <a:fld id="{1634FCDD-F444-4746-A037-762098AD364A}" type="datetimeFigureOut">
               <a:rPr lang="it-IT" smtClean="0"/>
-              <a:t>12/02/2014</a:t>
+              <a:t>16/02/2014</a:t>
             </a:fld>
             <a:endParaRPr lang="it-IT"/>
           </a:p>
@@ -1069,7 +1087,7 @@
           <a:p>
             <a:fld id="{6B6C5E1B-63F6-4CD9-93BD-FBDB130EB2E4}" type="slidenum">
               <a:rPr lang="it-IT" smtClean="0"/>
-              <a:t>34</a:t>
+              <a:t>43</a:t>
             </a:fld>
             <a:endParaRPr lang="it-IT"/>
           </a:p>
@@ -1515,7 +1533,7 @@
           <a:p>
             <a:fld id="{06D8BB37-67E1-420F-B488-3DE93FA3DF1F}" type="datetimeFigureOut">
               <a:rPr lang="en-US" dirty="0"/>
-              <a:t>2/12/2014</a:t>
+              <a:t>2/16/2014</a:t>
             </a:fld>
             <a:endParaRPr lang="en-US" dirty="0"/>
           </a:p>
@@ -1719,7 +1737,7 @@
           <a:p>
             <a:fld id="{E4B96382-B15D-466F-9E7D-0603461872B7}" type="datetimeFigureOut">
               <a:rPr lang="en-US" dirty="0"/>
-              <a:t>2/12/2014</a:t>
+              <a:t>2/16/2014</a:t>
             </a:fld>
             <a:endParaRPr lang="en-US" dirty="0"/>
           </a:p>
@@ -1975,7 +1993,7 @@
           <a:p>
             <a:fld id="{218672AE-FC7B-40BA-8844-0693A2434617}" type="datetimeFigureOut">
               <a:rPr lang="en-US" dirty="0"/>
-              <a:t>2/12/2014</a:t>
+              <a:t>2/16/2014</a:t>
             </a:fld>
             <a:endParaRPr lang="en-US" dirty="0"/>
           </a:p>
@@ -2219,7 +2237,7 @@
           <a:p>
             <a:fld id="{3568EC8D-9508-4A2C-8FBC-4C089BA52EE5}" type="datetimeFigureOut">
               <a:rPr lang="en-US" dirty="0"/>
-              <a:t>2/12/2014</a:t>
+              <a:t>2/16/2014</a:t>
             </a:fld>
             <a:endParaRPr lang="en-US" dirty="0"/>
           </a:p>
@@ -2544,7 +2562,7 @@
           <a:p>
             <a:fld id="{DB7A1C89-C29A-4D79-B5A1-1F424905E9A1}" type="datetimeFigureOut">
               <a:rPr lang="en-US" dirty="0"/>
-              <a:t>2/12/2014</a:t>
+              <a:t>2/16/2014</a:t>
             </a:fld>
             <a:endParaRPr lang="en-US" dirty="0"/>
           </a:p>
@@ -2908,7 +2926,7 @@
           <a:p>
             <a:fld id="{57ECC248-0691-4AB1-BB8B-882D656FF160}" type="datetimeFigureOut">
               <a:rPr lang="en-US" dirty="0"/>
-              <a:t>2/12/2014</a:t>
+              <a:t>2/16/2014</a:t>
             </a:fld>
             <a:endParaRPr lang="en-US" dirty="0"/>
           </a:p>
@@ -3435,7 +3453,7 @@
           <a:p>
             <a:fld id="{D4E54B09-E178-460F-B46D-023FA9745608}" type="datetimeFigureOut">
               <a:rPr lang="en-US" dirty="0"/>
-              <a:t>2/12/2014</a:t>
+              <a:t>2/16/2014</a:t>
             </a:fld>
             <a:endParaRPr lang="en-US" dirty="0"/>
           </a:p>
@@ -3629,7 +3647,7 @@
           <a:p>
             <a:fld id="{6CD62E06-21B3-4A3D-A6C8-F0DFEB8AB04D}" type="datetimeFigureOut">
               <a:rPr lang="en-US" dirty="0"/>
-              <a:t>2/12/2014</a:t>
+              <a:t>2/16/2014</a:t>
             </a:fld>
             <a:endParaRPr lang="en-US" dirty="0"/>
           </a:p>
@@ -3790,7 +3808,7 @@
           <a:p>
             <a:fld id="{2CC7CC01-41FD-4607-B8B1-976991065B2D}" type="datetimeFigureOut">
               <a:rPr lang="en-US" dirty="0"/>
-              <a:t>2/12/2014</a:t>
+              <a:t>2/16/2014</a:t>
             </a:fld>
             <a:endParaRPr lang="en-US" dirty="0"/>
           </a:p>
@@ -4154,7 +4172,7 @@
           <a:p>
             <a:fld id="{6D6740A7-C153-476A-BA27-5BE657EA7C21}" type="datetimeFigureOut">
               <a:rPr lang="en-US" dirty="0"/>
-              <a:t>2/12/2014</a:t>
+              <a:t>2/16/2014</a:t>
             </a:fld>
             <a:endParaRPr lang="en-US" dirty="0"/>
           </a:p>
@@ -4420,7 +4438,7 @@
           <a:p>
             <a:fld id="{1C86C2EC-F3EA-4AFE-88D7-51A6BBFDBA8B}" type="datetimeFigureOut">
               <a:rPr lang="en-US" dirty="0"/>
-              <a:t>2/12/2014</a:t>
+              <a:t>2/16/2014</a:t>
             </a:fld>
             <a:endParaRPr lang="en-US" dirty="0"/>
           </a:p>
@@ -4814,7 +4832,7 @@
           <a:p>
             <a:fld id="{BF2EAB5F-78EB-45CA-9E26-D1BAA0AA6EEC}" type="datetimeFigureOut">
               <a:rPr lang="en-US" dirty="0"/>
-              <a:t>2/12/2014</a:t>
+              <a:t>2/16/2014</a:t>
             </a:fld>
             <a:endParaRPr lang="en-US" dirty="0"/>
           </a:p>
@@ -8672,7 +8690,7 @@
           <a:p>
             <a:r>
               <a:rPr lang="en-US" dirty="0" smtClean="0"/>
-              <a:t>Profiler</a:t>
+              <a:t>Performance and Diagnostic hub</a:t>
             </a:r>
             <a:endParaRPr lang="it-IT" dirty="0"/>
           </a:p>
@@ -13354,11 +13372,11 @@
   <p:clrMapOvr>
     <a:masterClrMapping/>
   </p:clrMapOvr>
-  <mc:AlternateContent xmlns:mc="http://schemas.openxmlformats.org/markup-compatibility/2006">
-    <mc:Choice xmlns:p14="http://schemas.microsoft.com/office/powerpoint/2010/main" Requires="p14">
+  <mc:AlternateContent xmlns:mc="http://schemas.openxmlformats.org/markup-compatibility/2006" xmlns:p14="http://schemas.microsoft.com/office/powerpoint/2010/main">
+    <mc:Choice Requires="p14">
       <p:transition spd="slow" p14:dur="2000"/>
     </mc:Choice>
-    <mc:Fallback>
+    <mc:Fallback xmlns="">
       <p:transition spd="slow"/>
     </mc:Fallback>
   </mc:AlternateContent>
@@ -13609,11 +13627,11 @@
   <p:clrMapOvr>
     <a:masterClrMapping/>
   </p:clrMapOvr>
-  <mc:AlternateContent xmlns:mc="http://schemas.openxmlformats.org/markup-compatibility/2006">
-    <mc:Choice xmlns:p14="http://schemas.microsoft.com/office/powerpoint/2010/main" Requires="p14">
+  <mc:AlternateContent xmlns:mc="http://schemas.openxmlformats.org/markup-compatibility/2006" xmlns:p14="http://schemas.microsoft.com/office/powerpoint/2010/main">
+    <mc:Choice Requires="p14">
       <p:transition spd="slow" p14:dur="2000"/>
     </mc:Choice>
-    <mc:Fallback>
+    <mc:Fallback xmlns="">
       <p:transition spd="slow"/>
     </mc:Fallback>
   </mc:AlternateContent>
@@ -15457,6 +15475,3092 @@
       </p:grpSpPr>
       <p:sp>
         <p:nvSpPr>
+          <p:cNvPr id="2" name="Title 1"/>
+          <p:cNvSpPr>
+            <a:spLocks noGrp="1"/>
+          </p:cNvSpPr>
+          <p:nvPr>
+            <p:ph type="title"/>
+          </p:nvPr>
+        </p:nvSpPr>
+        <p:spPr/>
+        <p:txBody>
+          <a:bodyPr/>
+          <a:lstStyle/>
+          <a:p>
+            <a:r>
+              <a:rPr lang="en-US" dirty="0" smtClean="0"/>
+              <a:t>Debugger</a:t>
+            </a:r>
+            <a:endParaRPr lang="it-IT" dirty="0"/>
+          </a:p>
+        </p:txBody>
+      </p:sp>
+      <p:sp>
+        <p:nvSpPr>
+          <p:cNvPr id="3" name="Content Placeholder 2"/>
+          <p:cNvSpPr>
+            <a:spLocks noGrp="1"/>
+          </p:cNvSpPr>
+          <p:nvPr>
+            <p:ph idx="1"/>
+          </p:nvPr>
+        </p:nvSpPr>
+        <p:spPr/>
+        <p:txBody>
+          <a:bodyPr>
+            <a:normAutofit/>
+          </a:bodyPr>
+          <a:lstStyle/>
+          <a:p>
+            <a:pPr lvl="0" algn="just"/>
+            <a:r>
+              <a:rPr lang="en-US" dirty="0" smtClean="0"/>
+              <a:t>Il debugger di Visual Studio 2013 è </a:t>
+            </a:r>
+            <a:r>
+              <a:rPr lang="en-US" dirty="0" err="1" smtClean="0"/>
+              <a:t>senza</a:t>
+            </a:r>
+            <a:r>
+              <a:rPr lang="en-US" dirty="0" smtClean="0"/>
+              <a:t> </a:t>
+            </a:r>
+            <a:r>
+              <a:rPr lang="en-US" dirty="0" err="1" smtClean="0"/>
+              <a:t>dubbio</a:t>
+            </a:r>
+            <a:r>
+              <a:rPr lang="en-US" dirty="0" smtClean="0"/>
+              <a:t> </a:t>
+            </a:r>
+            <a:r>
+              <a:rPr lang="en-US" dirty="0" err="1" smtClean="0"/>
+              <a:t>uno</a:t>
+            </a:r>
+            <a:r>
+              <a:rPr lang="en-US" dirty="0" smtClean="0"/>
+              <a:t> </a:t>
+            </a:r>
+            <a:r>
+              <a:rPr lang="en-US" dirty="0" err="1" smtClean="0"/>
+              <a:t>strumento</a:t>
+            </a:r>
+            <a:r>
+              <a:rPr lang="en-US" dirty="0" smtClean="0"/>
+              <a:t> </a:t>
+            </a:r>
+            <a:r>
+              <a:rPr lang="en-US" dirty="0" err="1" smtClean="0"/>
+              <a:t>piuttosto</a:t>
+            </a:r>
+            <a:r>
+              <a:rPr lang="en-US" dirty="0" smtClean="0"/>
+              <a:t> </a:t>
+            </a:r>
+            <a:r>
+              <a:rPr lang="en-US" dirty="0" err="1" smtClean="0"/>
+              <a:t>evoluto</a:t>
+            </a:r>
+            <a:endParaRPr lang="en-US" dirty="0" smtClean="0"/>
+          </a:p>
+          <a:p>
+            <a:pPr lvl="0" algn="just"/>
+            <a:r>
+              <a:rPr lang="en-US" dirty="0" err="1" smtClean="0"/>
+              <a:t>Filosoficamente</a:t>
+            </a:r>
+            <a:r>
+              <a:rPr lang="en-US" dirty="0" smtClean="0"/>
+              <a:t> </a:t>
+            </a:r>
+            <a:r>
+              <a:rPr lang="en-US" dirty="0" err="1" smtClean="0"/>
+              <a:t>si</a:t>
+            </a:r>
+            <a:r>
+              <a:rPr lang="en-US" dirty="0" smtClean="0"/>
+              <a:t> </a:t>
+            </a:r>
+            <a:r>
+              <a:rPr lang="en-US" dirty="0" err="1" smtClean="0"/>
+              <a:t>potrebbe</a:t>
+            </a:r>
+            <a:r>
+              <a:rPr lang="en-US" dirty="0" smtClean="0"/>
+              <a:t> </a:t>
+            </a:r>
+            <a:r>
+              <a:rPr lang="en-US" dirty="0" err="1" smtClean="0"/>
+              <a:t>pensare</a:t>
+            </a:r>
+            <a:r>
+              <a:rPr lang="en-US" dirty="0" smtClean="0"/>
+              <a:t> </a:t>
+            </a:r>
+            <a:r>
+              <a:rPr lang="en-US" dirty="0" err="1" smtClean="0"/>
+              <a:t>che</a:t>
+            </a:r>
+            <a:r>
+              <a:rPr lang="en-US" dirty="0" smtClean="0"/>
+              <a:t> </a:t>
+            </a:r>
+            <a:r>
+              <a:rPr lang="en-US" dirty="0" err="1" smtClean="0"/>
+              <a:t>il</a:t>
+            </a:r>
+            <a:r>
+              <a:rPr lang="en-US" dirty="0" smtClean="0"/>
+              <a:t> debugger </a:t>
+            </a:r>
+            <a:r>
+              <a:rPr lang="en-US" dirty="0" err="1" smtClean="0"/>
+              <a:t>sia</a:t>
+            </a:r>
+            <a:r>
+              <a:rPr lang="en-US" dirty="0" smtClean="0"/>
+              <a:t> un </a:t>
+            </a:r>
+            <a:r>
+              <a:rPr lang="en-US" dirty="0" err="1" smtClean="0"/>
+              <a:t>po</a:t>
+            </a:r>
+            <a:r>
+              <a:rPr lang="en-US" dirty="0" smtClean="0"/>
+              <a:t>’ “</a:t>
+            </a:r>
+            <a:r>
+              <a:rPr lang="en-US" dirty="0" err="1" smtClean="0"/>
+              <a:t>l’ultima</a:t>
+            </a:r>
+            <a:r>
+              <a:rPr lang="en-US" dirty="0" smtClean="0"/>
+              <a:t> </a:t>
+            </a:r>
+            <a:r>
+              <a:rPr lang="en-US" dirty="0" err="1" smtClean="0"/>
+              <a:t>spiaggia</a:t>
+            </a:r>
+            <a:r>
+              <a:rPr lang="en-US" dirty="0" smtClean="0"/>
+              <a:t>” </a:t>
+            </a:r>
+            <a:r>
+              <a:rPr lang="en-US" dirty="0" err="1" smtClean="0"/>
+              <a:t>nel</a:t>
+            </a:r>
+            <a:r>
+              <a:rPr lang="en-US" dirty="0" smtClean="0"/>
+              <a:t> </a:t>
+            </a:r>
+            <a:r>
+              <a:rPr lang="en-US" dirty="0" err="1" smtClean="0"/>
+              <a:t>senso</a:t>
+            </a:r>
+            <a:r>
+              <a:rPr lang="en-US" dirty="0" smtClean="0"/>
+              <a:t> </a:t>
+            </a:r>
+            <a:r>
+              <a:rPr lang="en-US" dirty="0" err="1" smtClean="0"/>
+              <a:t>che</a:t>
+            </a:r>
+            <a:r>
+              <a:rPr lang="en-US" dirty="0" smtClean="0"/>
+              <a:t> se un </a:t>
+            </a:r>
+            <a:r>
+              <a:rPr lang="en-US" dirty="0" err="1" smtClean="0"/>
+              <a:t>codice</a:t>
+            </a:r>
+            <a:r>
+              <a:rPr lang="en-US" dirty="0" smtClean="0"/>
+              <a:t> </a:t>
+            </a:r>
+            <a:r>
+              <a:rPr lang="en-US" dirty="0" err="1" smtClean="0"/>
+              <a:t>viene</a:t>
+            </a:r>
+            <a:r>
+              <a:rPr lang="en-US" dirty="0" smtClean="0"/>
+              <a:t> </a:t>
+            </a:r>
+            <a:r>
+              <a:rPr lang="en-US" dirty="0" err="1" smtClean="0"/>
+              <a:t>scritto</a:t>
+            </a:r>
+            <a:r>
+              <a:rPr lang="en-US" dirty="0" smtClean="0"/>
+              <a:t> </a:t>
+            </a:r>
+            <a:r>
+              <a:rPr lang="en-US" dirty="0" err="1" smtClean="0"/>
+              <a:t>correttamente</a:t>
+            </a:r>
+            <a:r>
+              <a:rPr lang="en-US" dirty="0" smtClean="0"/>
+              <a:t>, ne </a:t>
+            </a:r>
+            <a:r>
+              <a:rPr lang="en-US" dirty="0" err="1" smtClean="0"/>
+              <a:t>vengono</a:t>
+            </a:r>
+            <a:r>
+              <a:rPr lang="en-US" dirty="0" smtClean="0"/>
+              <a:t> </a:t>
+            </a:r>
+            <a:r>
+              <a:rPr lang="en-US" dirty="0" err="1" smtClean="0"/>
+              <a:t>fatti</a:t>
+            </a:r>
+            <a:r>
+              <a:rPr lang="en-US" dirty="0" smtClean="0"/>
+              <a:t> </a:t>
+            </a:r>
+            <a:r>
+              <a:rPr lang="en-US" dirty="0" err="1" smtClean="0"/>
+              <a:t>gli</a:t>
+            </a:r>
+            <a:r>
+              <a:rPr lang="en-US" dirty="0" smtClean="0"/>
+              <a:t> </a:t>
+            </a:r>
+            <a:r>
+              <a:rPr lang="en-US" dirty="0" err="1" smtClean="0"/>
+              <a:t>opportuni</a:t>
+            </a:r>
+            <a:r>
+              <a:rPr lang="en-US" dirty="0" smtClean="0"/>
+              <a:t> test (</a:t>
+            </a:r>
+            <a:r>
+              <a:rPr lang="en-US" dirty="0" err="1" smtClean="0"/>
+              <a:t>siano</a:t>
+            </a:r>
+            <a:r>
+              <a:rPr lang="en-US" dirty="0" smtClean="0"/>
+              <a:t> </a:t>
+            </a:r>
+            <a:r>
+              <a:rPr lang="en-US" dirty="0" err="1" smtClean="0"/>
+              <a:t>essi</a:t>
+            </a:r>
+            <a:r>
+              <a:rPr lang="en-US" dirty="0" smtClean="0"/>
+              <a:t> </a:t>
+            </a:r>
+            <a:r>
+              <a:rPr lang="en-US" dirty="0" err="1" smtClean="0"/>
+              <a:t>unitari</a:t>
+            </a:r>
+            <a:r>
+              <a:rPr lang="en-US" dirty="0" smtClean="0"/>
+              <a:t> , di non </a:t>
+            </a:r>
+            <a:r>
+              <a:rPr lang="en-US" dirty="0" err="1" smtClean="0"/>
+              <a:t>regressione</a:t>
+            </a:r>
+            <a:r>
+              <a:rPr lang="en-US" dirty="0" smtClean="0"/>
+              <a:t>, di performances) e </a:t>
+            </a:r>
+            <a:r>
+              <a:rPr lang="en-US" dirty="0" err="1" smtClean="0"/>
+              <a:t>viene</a:t>
+            </a:r>
+            <a:r>
+              <a:rPr lang="en-US" dirty="0" smtClean="0"/>
+              <a:t> </a:t>
+            </a:r>
+            <a:r>
+              <a:rPr lang="en-US" dirty="0" err="1" smtClean="0"/>
+              <a:t>utilizzato</a:t>
+            </a:r>
+            <a:r>
+              <a:rPr lang="en-US" dirty="0" smtClean="0"/>
+              <a:t> in </a:t>
+            </a:r>
+            <a:r>
+              <a:rPr lang="en-US" dirty="0" err="1" smtClean="0"/>
+              <a:t>produzione</a:t>
+            </a:r>
+            <a:r>
+              <a:rPr lang="en-US" dirty="0" smtClean="0"/>
+              <a:t>, </a:t>
+            </a:r>
+            <a:r>
+              <a:rPr lang="en-US" dirty="0" err="1" smtClean="0"/>
+              <a:t>dovremmo</a:t>
+            </a:r>
+            <a:r>
+              <a:rPr lang="en-US" dirty="0" smtClean="0"/>
+              <a:t> </a:t>
+            </a:r>
+            <a:r>
+              <a:rPr lang="en-US" dirty="0" err="1" smtClean="0"/>
+              <a:t>essere</a:t>
+            </a:r>
+            <a:r>
+              <a:rPr lang="en-US" dirty="0" smtClean="0"/>
+              <a:t> </a:t>
+            </a:r>
+            <a:r>
+              <a:rPr lang="en-US" dirty="0" err="1" smtClean="0"/>
+              <a:t>ragionevolmente</a:t>
+            </a:r>
+            <a:r>
+              <a:rPr lang="en-US" dirty="0" smtClean="0"/>
+              <a:t> </a:t>
+            </a:r>
+            <a:r>
+              <a:rPr lang="en-US" dirty="0" err="1" smtClean="0"/>
+              <a:t>sicuri</a:t>
+            </a:r>
+            <a:r>
+              <a:rPr lang="en-US" dirty="0" smtClean="0"/>
+              <a:t> </a:t>
+            </a:r>
+            <a:r>
+              <a:rPr lang="en-US" dirty="0" err="1" smtClean="0"/>
+              <a:t>che</a:t>
+            </a:r>
+            <a:r>
+              <a:rPr lang="en-US" dirty="0" smtClean="0"/>
+              <a:t> </a:t>
+            </a:r>
+            <a:r>
+              <a:rPr lang="en-US" dirty="0" err="1" smtClean="0"/>
+              <a:t>tutto</a:t>
+            </a:r>
+            <a:r>
+              <a:rPr lang="en-US" dirty="0" smtClean="0"/>
+              <a:t> </a:t>
+            </a:r>
+            <a:r>
+              <a:rPr lang="en-US" dirty="0" err="1" smtClean="0"/>
+              <a:t>funzioni</a:t>
+            </a:r>
+            <a:endParaRPr lang="en-US" dirty="0" smtClean="0"/>
+          </a:p>
+          <a:p>
+            <a:pPr lvl="0" algn="just"/>
+            <a:r>
+              <a:rPr lang="en-US" dirty="0" err="1" smtClean="0"/>
+              <a:t>Questo</a:t>
+            </a:r>
+            <a:r>
+              <a:rPr lang="en-US" dirty="0" smtClean="0"/>
+              <a:t> </a:t>
+            </a:r>
+            <a:r>
+              <a:rPr lang="en-US" dirty="0" err="1" smtClean="0"/>
+              <a:t>potrebbe</a:t>
+            </a:r>
+            <a:r>
+              <a:rPr lang="en-US" dirty="0" smtClean="0"/>
+              <a:t> </a:t>
+            </a:r>
+            <a:r>
+              <a:rPr lang="en-US" dirty="0" err="1" smtClean="0"/>
+              <a:t>essere</a:t>
+            </a:r>
+            <a:r>
+              <a:rPr lang="en-US" dirty="0" smtClean="0"/>
+              <a:t> </a:t>
+            </a:r>
+            <a:r>
+              <a:rPr lang="en-US" dirty="0" err="1" smtClean="0"/>
+              <a:t>vero</a:t>
+            </a:r>
+            <a:r>
+              <a:rPr lang="en-US" dirty="0" smtClean="0"/>
+              <a:t> per </a:t>
+            </a:r>
+            <a:r>
+              <a:rPr lang="en-US" dirty="0" err="1" smtClean="0"/>
+              <a:t>applicazioni</a:t>
+            </a:r>
+            <a:r>
+              <a:rPr lang="en-US" dirty="0" smtClean="0"/>
+              <a:t> </a:t>
+            </a:r>
+            <a:r>
+              <a:rPr lang="en-US" dirty="0" err="1" smtClean="0"/>
+              <a:t>nuove</a:t>
+            </a:r>
+            <a:r>
+              <a:rPr lang="en-US" dirty="0"/>
+              <a:t> </a:t>
+            </a:r>
+            <a:r>
+              <a:rPr lang="en-US" dirty="0" smtClean="0"/>
+              <a:t>e </a:t>
+            </a:r>
+            <a:r>
+              <a:rPr lang="en-US" dirty="0" err="1" smtClean="0"/>
+              <a:t>sufficentemente</a:t>
+            </a:r>
+            <a:r>
+              <a:rPr lang="en-US" dirty="0" smtClean="0"/>
+              <a:t> </a:t>
+            </a:r>
+            <a:r>
+              <a:rPr lang="en-US" dirty="0" err="1" smtClean="0"/>
+              <a:t>modulari</a:t>
+            </a:r>
+            <a:endParaRPr lang="en-US" dirty="0" smtClean="0"/>
+          </a:p>
+          <a:p>
+            <a:pPr lvl="0" algn="just"/>
+            <a:r>
+              <a:rPr lang="en-US" dirty="0" smtClean="0"/>
+              <a:t>Ci </a:t>
+            </a:r>
+            <a:r>
+              <a:rPr lang="en-US" dirty="0" err="1" smtClean="0"/>
+              <a:t>sono</a:t>
+            </a:r>
+            <a:r>
+              <a:rPr lang="en-US" dirty="0" smtClean="0"/>
+              <a:t> </a:t>
+            </a:r>
+            <a:r>
+              <a:rPr lang="en-US" dirty="0" err="1" smtClean="0"/>
+              <a:t>però</a:t>
+            </a:r>
+            <a:r>
+              <a:rPr lang="en-US" dirty="0" smtClean="0"/>
+              <a:t> </a:t>
+            </a:r>
+            <a:r>
+              <a:rPr lang="en-US" dirty="0" err="1" smtClean="0"/>
+              <a:t>una</a:t>
+            </a:r>
+            <a:r>
+              <a:rPr lang="en-US" dirty="0" smtClean="0"/>
+              <a:t> </a:t>
+            </a:r>
+            <a:r>
+              <a:rPr lang="en-US" dirty="0" err="1" smtClean="0"/>
+              <a:t>mriade</a:t>
+            </a:r>
+            <a:r>
+              <a:rPr lang="en-US" dirty="0" smtClean="0"/>
+              <a:t> di </a:t>
+            </a:r>
+            <a:r>
+              <a:rPr lang="en-US" dirty="0" err="1" smtClean="0"/>
+              <a:t>casi</a:t>
+            </a:r>
+            <a:r>
+              <a:rPr lang="en-US" dirty="0"/>
+              <a:t> </a:t>
+            </a:r>
+            <a:r>
+              <a:rPr lang="en-US" dirty="0" smtClean="0"/>
+              <a:t>per </a:t>
+            </a:r>
+            <a:r>
+              <a:rPr lang="en-US" dirty="0" err="1" smtClean="0"/>
+              <a:t>i</a:t>
+            </a:r>
+            <a:r>
+              <a:rPr lang="en-US" dirty="0" smtClean="0"/>
+              <a:t> </a:t>
+            </a:r>
+            <a:r>
+              <a:rPr lang="en-US" dirty="0" err="1" smtClean="0"/>
+              <a:t>quali</a:t>
+            </a:r>
+            <a:r>
+              <a:rPr lang="en-US" dirty="0" smtClean="0"/>
+              <a:t> </a:t>
+            </a:r>
+            <a:r>
+              <a:rPr lang="en-US" dirty="0" err="1" smtClean="0"/>
+              <a:t>il</a:t>
+            </a:r>
+            <a:r>
+              <a:rPr lang="en-US" dirty="0" smtClean="0"/>
+              <a:t> debugger </a:t>
+            </a:r>
+            <a:r>
+              <a:rPr lang="en-US" dirty="0" err="1" smtClean="0"/>
+              <a:t>diventa</a:t>
+            </a:r>
+            <a:r>
+              <a:rPr lang="en-US" dirty="0" smtClean="0"/>
+              <a:t> </a:t>
+            </a:r>
+            <a:r>
+              <a:rPr lang="en-US" dirty="0" err="1" smtClean="0"/>
+              <a:t>l’unica</a:t>
+            </a:r>
+            <a:r>
+              <a:rPr lang="en-US" dirty="0" smtClean="0"/>
+              <a:t> </a:t>
+            </a:r>
+            <a:r>
+              <a:rPr lang="en-US" dirty="0" err="1" smtClean="0"/>
+              <a:t>risorsa</a:t>
+            </a:r>
+            <a:r>
+              <a:rPr lang="en-US" dirty="0" smtClean="0"/>
+              <a:t>.</a:t>
+            </a:r>
+            <a:endParaRPr lang="en-US" dirty="0"/>
+          </a:p>
+          <a:p>
+            <a:pPr lvl="1" algn="just"/>
+            <a:endParaRPr lang="en-US" dirty="0"/>
+          </a:p>
+          <a:p>
+            <a:pPr marL="274320" lvl="1" indent="0" algn="just">
+              <a:buNone/>
+            </a:pPr>
+            <a:endParaRPr lang="en-US" dirty="0"/>
+          </a:p>
+          <a:p>
+            <a:pPr marL="0" lvl="0" indent="0" algn="just">
+              <a:buNone/>
+            </a:pPr>
+            <a:endParaRPr lang="en-US" dirty="0"/>
+          </a:p>
+          <a:p>
+            <a:pPr lvl="1" algn="just"/>
+            <a:endParaRPr lang="en-US" dirty="0"/>
+          </a:p>
+          <a:p>
+            <a:pPr marL="274320" lvl="1" indent="0" algn="just">
+              <a:buNone/>
+            </a:pPr>
+            <a:endParaRPr lang="en-US" dirty="0" smtClean="0"/>
+          </a:p>
+        </p:txBody>
+      </p:sp>
+    </p:spTree>
+    <p:extLst>
+      <p:ext uri="{BB962C8B-B14F-4D97-AF65-F5344CB8AC3E}">
+        <p14:creationId xmlns:p14="http://schemas.microsoft.com/office/powerpoint/2010/main" val="62380396"/>
+      </p:ext>
+    </p:extLst>
+  </p:cSld>
+  <p:clrMapOvr>
+    <a:masterClrMapping/>
+  </p:clrMapOvr>
+  <mc:AlternateContent xmlns:mc="http://schemas.openxmlformats.org/markup-compatibility/2006" xmlns:p14="http://schemas.microsoft.com/office/powerpoint/2010/main">
+    <mc:Choice Requires="p14">
+      <p:transition spd="slow" p14:dur="2000"/>
+    </mc:Choice>
+    <mc:Fallback xmlns="">
+      <p:transition spd="slow"/>
+    </mc:Fallback>
+  </mc:AlternateContent>
+  <p:timing>
+    <p:tnLst>
+      <p:par>
+        <p:cTn id="1" dur="indefinite" restart="never" nodeType="tmRoot"/>
+      </p:par>
+    </p:tnLst>
+  </p:timing>
+</p:sld>
+</file>
+
+<file path=ppt/slides/slide34.xml><?xml version="1.0" encoding="utf-8"?>
+<p:sld xmlns:a="http://schemas.openxmlformats.org/drawingml/2006/main" xmlns:r="http://schemas.openxmlformats.org/officeDocument/2006/relationships" xmlns:p="http://schemas.openxmlformats.org/presentationml/2006/main">
+  <p:cSld>
+    <p:spTree>
+      <p:nvGrpSpPr>
+        <p:cNvPr id="1" name=""/>
+        <p:cNvGrpSpPr/>
+        <p:nvPr/>
+      </p:nvGrpSpPr>
+      <p:grpSpPr>
+        <a:xfrm>
+          <a:off x="0" y="0"/>
+          <a:ext cx="0" cy="0"/>
+          <a:chOff x="0" y="0"/>
+          <a:chExt cx="0" cy="0"/>
+        </a:xfrm>
+      </p:grpSpPr>
+      <p:sp>
+        <p:nvSpPr>
+          <p:cNvPr id="2" name="Title 1"/>
+          <p:cNvSpPr>
+            <a:spLocks noGrp="1"/>
+          </p:cNvSpPr>
+          <p:nvPr>
+            <p:ph type="title"/>
+          </p:nvPr>
+        </p:nvSpPr>
+        <p:spPr/>
+        <p:txBody>
+          <a:bodyPr/>
+          <a:lstStyle/>
+          <a:p>
+            <a:r>
+              <a:rPr lang="en-US" dirty="0" smtClean="0"/>
+              <a:t>Debugger – use cases</a:t>
+            </a:r>
+            <a:endParaRPr lang="it-IT" dirty="0"/>
+          </a:p>
+        </p:txBody>
+      </p:sp>
+      <p:sp>
+        <p:nvSpPr>
+          <p:cNvPr id="3" name="Content Placeholder 2"/>
+          <p:cNvSpPr>
+            <a:spLocks noGrp="1"/>
+          </p:cNvSpPr>
+          <p:nvPr>
+            <p:ph idx="1"/>
+          </p:nvPr>
+        </p:nvSpPr>
+        <p:spPr/>
+        <p:txBody>
+          <a:bodyPr>
+            <a:normAutofit/>
+          </a:bodyPr>
+          <a:lstStyle/>
+          <a:p>
+            <a:pPr lvl="0" algn="just"/>
+            <a:r>
+              <a:rPr lang="en-US" dirty="0" smtClean="0"/>
+              <a:t>Un </a:t>
+            </a:r>
+            <a:r>
+              <a:rPr lang="en-US" dirty="0" err="1" smtClean="0"/>
+              <a:t>caso</a:t>
+            </a:r>
+            <a:r>
+              <a:rPr lang="en-US" dirty="0" smtClean="0"/>
+              <a:t> </a:t>
+            </a:r>
+            <a:r>
+              <a:rPr lang="en-US" dirty="0" err="1" smtClean="0"/>
+              <a:t>potrebbe</a:t>
+            </a:r>
+            <a:r>
+              <a:rPr lang="en-US" dirty="0" smtClean="0"/>
+              <a:t> </a:t>
+            </a:r>
+            <a:r>
+              <a:rPr lang="en-US" dirty="0" err="1" smtClean="0"/>
+              <a:t>essere</a:t>
+            </a:r>
+            <a:r>
+              <a:rPr lang="en-US" dirty="0" smtClean="0"/>
+              <a:t> </a:t>
+            </a:r>
+            <a:r>
+              <a:rPr lang="en-US" dirty="0" err="1" smtClean="0"/>
+              <a:t>quello</a:t>
+            </a:r>
+            <a:r>
+              <a:rPr lang="en-US" dirty="0" smtClean="0"/>
+              <a:t> di </a:t>
+            </a:r>
+            <a:r>
+              <a:rPr lang="en-US" dirty="0" err="1" smtClean="0"/>
+              <a:t>un’applicazione</a:t>
+            </a:r>
+            <a:r>
+              <a:rPr lang="en-US" dirty="0" smtClean="0"/>
+              <a:t> legacy, in cui </a:t>
+            </a:r>
+            <a:r>
+              <a:rPr lang="en-US" dirty="0" err="1" smtClean="0"/>
+              <a:t>molte</a:t>
+            </a:r>
+            <a:r>
+              <a:rPr lang="en-US" dirty="0" smtClean="0"/>
+              <a:t> </a:t>
+            </a:r>
+            <a:r>
+              <a:rPr lang="en-US" dirty="0" err="1" smtClean="0"/>
+              <a:t>parti</a:t>
+            </a:r>
+            <a:r>
+              <a:rPr lang="en-US" dirty="0" smtClean="0"/>
+              <a:t> non </a:t>
+            </a:r>
+            <a:r>
+              <a:rPr lang="en-US" dirty="0" err="1" smtClean="0"/>
+              <a:t>sono</a:t>
+            </a:r>
+            <a:r>
+              <a:rPr lang="en-US" dirty="0" smtClean="0"/>
+              <a:t> </a:t>
+            </a:r>
+            <a:r>
+              <a:rPr lang="en-US" dirty="0" err="1" smtClean="0"/>
+              <a:t>conosciute</a:t>
+            </a:r>
+            <a:r>
+              <a:rPr lang="en-US" dirty="0" smtClean="0"/>
+              <a:t> </a:t>
+            </a:r>
+          </a:p>
+          <a:p>
+            <a:pPr lvl="0" algn="just"/>
+            <a:r>
+              <a:rPr lang="en-US" dirty="0" smtClean="0"/>
+              <a:t>Un </a:t>
+            </a:r>
+            <a:r>
+              <a:rPr lang="en-US" dirty="0" err="1" smtClean="0"/>
+              <a:t>caso</a:t>
+            </a:r>
+            <a:r>
+              <a:rPr lang="en-US" dirty="0" smtClean="0"/>
+              <a:t> </a:t>
+            </a:r>
+            <a:r>
+              <a:rPr lang="en-US" dirty="0" err="1" smtClean="0"/>
+              <a:t>potrebbe</a:t>
+            </a:r>
+            <a:r>
+              <a:rPr lang="en-US" dirty="0" smtClean="0"/>
+              <a:t> </a:t>
+            </a:r>
+            <a:r>
+              <a:rPr lang="en-US" dirty="0" err="1" smtClean="0"/>
+              <a:t>essere</a:t>
+            </a:r>
+            <a:r>
+              <a:rPr lang="en-US" dirty="0" smtClean="0"/>
+              <a:t> </a:t>
+            </a:r>
+            <a:r>
+              <a:rPr lang="en-US" dirty="0" err="1" smtClean="0"/>
+              <a:t>che</a:t>
+            </a:r>
+            <a:r>
+              <a:rPr lang="en-US" dirty="0" smtClean="0"/>
+              <a:t> </a:t>
+            </a:r>
+            <a:r>
+              <a:rPr lang="en-US" dirty="0" err="1" smtClean="0"/>
+              <a:t>alcune</a:t>
+            </a:r>
+            <a:r>
+              <a:rPr lang="en-US" dirty="0" smtClean="0"/>
+              <a:t> </a:t>
+            </a:r>
+            <a:r>
+              <a:rPr lang="en-US" dirty="0" err="1" smtClean="0"/>
+              <a:t>parti</a:t>
+            </a:r>
+            <a:r>
+              <a:rPr lang="en-US" dirty="0" smtClean="0"/>
+              <a:t> di </a:t>
+            </a:r>
+            <a:r>
+              <a:rPr lang="en-US" dirty="0" err="1" smtClean="0"/>
+              <a:t>codice</a:t>
+            </a:r>
+            <a:r>
+              <a:rPr lang="en-US" dirty="0" smtClean="0"/>
+              <a:t> </a:t>
+            </a:r>
+            <a:r>
+              <a:rPr lang="en-US" dirty="0" err="1" smtClean="0"/>
+              <a:t>girano</a:t>
+            </a:r>
+            <a:r>
+              <a:rPr lang="en-US" dirty="0" smtClean="0"/>
+              <a:t> in </a:t>
+            </a:r>
+            <a:r>
+              <a:rPr lang="en-US" dirty="0" err="1" smtClean="0"/>
+              <a:t>altri</a:t>
+            </a:r>
+            <a:r>
+              <a:rPr lang="en-US" dirty="0" smtClean="0"/>
+              <a:t> </a:t>
+            </a:r>
+            <a:r>
+              <a:rPr lang="en-US" dirty="0" err="1" smtClean="0"/>
+              <a:t>processi</a:t>
+            </a:r>
+            <a:r>
+              <a:rPr lang="en-US" dirty="0" smtClean="0"/>
+              <a:t> (</a:t>
+            </a:r>
+            <a:r>
+              <a:rPr lang="en-US" dirty="0" err="1" smtClean="0"/>
+              <a:t>quindi</a:t>
+            </a:r>
+            <a:r>
+              <a:rPr lang="en-US" dirty="0" smtClean="0"/>
+              <a:t> </a:t>
+            </a:r>
+            <a:r>
+              <a:rPr lang="en-US" dirty="0" err="1" smtClean="0"/>
+              <a:t>applicazione</a:t>
+            </a:r>
+            <a:r>
+              <a:rPr lang="en-US" dirty="0" smtClean="0"/>
+              <a:t> </a:t>
+            </a:r>
+            <a:r>
+              <a:rPr lang="en-US" dirty="0" err="1" smtClean="0"/>
+              <a:t>fortemente</a:t>
+            </a:r>
+            <a:r>
+              <a:rPr lang="en-US" dirty="0" smtClean="0"/>
+              <a:t> integrate)</a:t>
+            </a:r>
+          </a:p>
+          <a:p>
+            <a:pPr lvl="0" algn="just"/>
+            <a:r>
+              <a:rPr lang="en-US" dirty="0" smtClean="0"/>
+              <a:t>Un </a:t>
+            </a:r>
+            <a:r>
+              <a:rPr lang="en-US" dirty="0" err="1" smtClean="0"/>
+              <a:t>caso</a:t>
+            </a:r>
+            <a:r>
+              <a:rPr lang="en-US" dirty="0" smtClean="0"/>
+              <a:t> </a:t>
+            </a:r>
+            <a:r>
+              <a:rPr lang="en-US" dirty="0" err="1" smtClean="0"/>
+              <a:t>potrebbe</a:t>
+            </a:r>
+            <a:r>
+              <a:rPr lang="en-US" dirty="0" smtClean="0"/>
+              <a:t> </a:t>
+            </a:r>
+            <a:r>
+              <a:rPr lang="en-US" dirty="0" err="1" smtClean="0"/>
+              <a:t>essere</a:t>
+            </a:r>
+            <a:r>
+              <a:rPr lang="en-US" dirty="0" smtClean="0"/>
+              <a:t> in </a:t>
+            </a:r>
+            <a:r>
+              <a:rPr lang="en-US" dirty="0" err="1" smtClean="0"/>
+              <a:t>generale</a:t>
+            </a:r>
+            <a:r>
+              <a:rPr lang="en-US" dirty="0" smtClean="0"/>
+              <a:t> </a:t>
+            </a:r>
+            <a:r>
+              <a:rPr lang="en-US" dirty="0" err="1" smtClean="0"/>
+              <a:t>un’applicazione</a:t>
+            </a:r>
+            <a:r>
+              <a:rPr lang="en-US" dirty="0" smtClean="0"/>
+              <a:t> </a:t>
+            </a:r>
+            <a:r>
+              <a:rPr lang="en-US" dirty="0" err="1" smtClean="0"/>
+              <a:t>scarsamente</a:t>
+            </a:r>
+            <a:r>
+              <a:rPr lang="en-US" dirty="0" smtClean="0"/>
+              <a:t> </a:t>
+            </a:r>
+            <a:r>
+              <a:rPr lang="en-US" dirty="0" err="1" smtClean="0"/>
+              <a:t>osservabile</a:t>
+            </a:r>
+            <a:r>
+              <a:rPr lang="en-US" dirty="0" smtClean="0"/>
+              <a:t>, come </a:t>
+            </a:r>
+            <a:r>
+              <a:rPr lang="en-US" dirty="0" err="1" smtClean="0"/>
+              <a:t>potrebbe</a:t>
+            </a:r>
+            <a:r>
+              <a:rPr lang="en-US" dirty="0" smtClean="0"/>
+              <a:t> </a:t>
+            </a:r>
+            <a:r>
+              <a:rPr lang="en-US" dirty="0" err="1" smtClean="0"/>
+              <a:t>essere</a:t>
+            </a:r>
+            <a:r>
+              <a:rPr lang="en-US" dirty="0"/>
+              <a:t> </a:t>
+            </a:r>
+            <a:r>
+              <a:rPr lang="en-US" dirty="0" smtClean="0"/>
+              <a:t>dover </a:t>
+            </a:r>
+            <a:r>
+              <a:rPr lang="en-US" dirty="0" err="1" smtClean="0"/>
+              <a:t>verificare</a:t>
+            </a:r>
+            <a:r>
+              <a:rPr lang="en-US" dirty="0" smtClean="0"/>
+              <a:t> le </a:t>
+            </a:r>
+            <a:r>
+              <a:rPr lang="en-US" dirty="0" err="1" smtClean="0"/>
+              <a:t>condizioni</a:t>
+            </a:r>
+            <a:r>
+              <a:rPr lang="en-US" dirty="0" smtClean="0"/>
+              <a:t> </a:t>
+            </a:r>
+            <a:r>
+              <a:rPr lang="en-US" dirty="0" err="1" smtClean="0"/>
+              <a:t>limite</a:t>
+            </a:r>
+            <a:r>
+              <a:rPr lang="en-US" dirty="0" smtClean="0"/>
+              <a:t> di un </a:t>
+            </a:r>
+            <a:r>
+              <a:rPr lang="en-US" dirty="0" err="1" smtClean="0"/>
+              <a:t>algoritmo</a:t>
+            </a:r>
+            <a:r>
+              <a:rPr lang="en-US" dirty="0" smtClean="0"/>
+              <a:t> </a:t>
+            </a:r>
+            <a:r>
+              <a:rPr lang="en-US" dirty="0" err="1" smtClean="0"/>
+              <a:t>che</a:t>
+            </a:r>
+            <a:r>
+              <a:rPr lang="en-US" dirty="0" smtClean="0"/>
+              <a:t> </a:t>
+            </a:r>
+            <a:r>
+              <a:rPr lang="en-US" dirty="0" err="1" smtClean="0"/>
+              <a:t>magari</a:t>
+            </a:r>
+            <a:r>
+              <a:rPr lang="en-US" dirty="0" smtClean="0"/>
+              <a:t> ha </a:t>
+            </a:r>
+            <a:r>
+              <a:rPr lang="en-US" dirty="0" err="1" smtClean="0"/>
+              <a:t>una</a:t>
+            </a:r>
+            <a:r>
+              <a:rPr lang="en-US" dirty="0" smtClean="0"/>
+              <a:t> </a:t>
+            </a:r>
+            <a:r>
+              <a:rPr lang="en-US" dirty="0" err="1" smtClean="0"/>
+              <a:t>serie</a:t>
+            </a:r>
+            <a:r>
+              <a:rPr lang="en-US" dirty="0" smtClean="0"/>
+              <a:t> di </a:t>
+            </a:r>
+            <a:r>
+              <a:rPr lang="en-US" dirty="0" err="1" smtClean="0"/>
+              <a:t>risultati</a:t>
+            </a:r>
+            <a:r>
+              <a:rPr lang="en-US" dirty="0" smtClean="0"/>
+              <a:t> </a:t>
+            </a:r>
+            <a:r>
+              <a:rPr lang="en-US" dirty="0" err="1" smtClean="0"/>
+              <a:t>intermedi</a:t>
+            </a:r>
+            <a:r>
+              <a:rPr lang="en-US" dirty="0" smtClean="0"/>
+              <a:t> </a:t>
+            </a:r>
+            <a:r>
+              <a:rPr lang="en-US" dirty="0" err="1" smtClean="0"/>
+              <a:t>che</a:t>
+            </a:r>
+            <a:r>
+              <a:rPr lang="en-US" dirty="0" smtClean="0"/>
+              <a:t> </a:t>
+            </a:r>
+            <a:r>
+              <a:rPr lang="en-US" dirty="0" err="1" smtClean="0"/>
+              <a:t>inficiano</a:t>
+            </a:r>
+            <a:r>
+              <a:rPr lang="en-US" dirty="0" smtClean="0"/>
+              <a:t> </a:t>
+            </a:r>
+            <a:r>
+              <a:rPr lang="en-US" dirty="0" err="1" smtClean="0"/>
+              <a:t>il</a:t>
+            </a:r>
+            <a:r>
+              <a:rPr lang="en-US" dirty="0" smtClean="0"/>
+              <a:t> </a:t>
+            </a:r>
+            <a:r>
+              <a:rPr lang="en-US" dirty="0" err="1" smtClean="0"/>
+              <a:t>risultato</a:t>
+            </a:r>
+            <a:r>
+              <a:rPr lang="en-US" dirty="0" smtClean="0"/>
+              <a:t> finale. </a:t>
+            </a:r>
+          </a:p>
+          <a:p>
+            <a:pPr lvl="0" algn="just"/>
+            <a:r>
+              <a:rPr lang="en-US" dirty="0" smtClean="0"/>
+              <a:t>Un </a:t>
+            </a:r>
+            <a:r>
+              <a:rPr lang="en-US" dirty="0" err="1" smtClean="0"/>
+              <a:t>caso</a:t>
+            </a:r>
+            <a:r>
+              <a:rPr lang="en-US" dirty="0" smtClean="0"/>
+              <a:t> </a:t>
+            </a:r>
+            <a:r>
+              <a:rPr lang="en-US" dirty="0" err="1" smtClean="0"/>
+              <a:t>potrebbe</a:t>
+            </a:r>
+            <a:r>
+              <a:rPr lang="en-US" dirty="0" smtClean="0"/>
+              <a:t> </a:t>
+            </a:r>
+            <a:r>
+              <a:rPr lang="en-US" dirty="0" err="1" smtClean="0"/>
+              <a:t>essere</a:t>
+            </a:r>
+            <a:r>
+              <a:rPr lang="en-US" dirty="0" smtClean="0"/>
+              <a:t> </a:t>
+            </a:r>
+            <a:r>
+              <a:rPr lang="en-US" dirty="0" err="1" smtClean="0"/>
+              <a:t>analizzare</a:t>
+            </a:r>
+            <a:r>
+              <a:rPr lang="en-US" dirty="0" smtClean="0"/>
+              <a:t> un dump di un crash, per </a:t>
+            </a:r>
+            <a:r>
+              <a:rPr lang="en-US" dirty="0" err="1" smtClean="0"/>
+              <a:t>il</a:t>
+            </a:r>
+            <a:r>
+              <a:rPr lang="en-US" dirty="0" smtClean="0"/>
+              <a:t> quale </a:t>
+            </a:r>
+            <a:r>
+              <a:rPr lang="en-US" dirty="0" err="1" smtClean="0"/>
+              <a:t>necessitiamo</a:t>
+            </a:r>
+            <a:r>
+              <a:rPr lang="en-US" dirty="0" smtClean="0"/>
+              <a:t> </a:t>
+            </a:r>
+            <a:r>
+              <a:rPr lang="en-US" dirty="0" err="1" smtClean="0"/>
+              <a:t>dei</a:t>
+            </a:r>
+            <a:r>
+              <a:rPr lang="en-US" dirty="0" smtClean="0"/>
+              <a:t> </a:t>
+            </a:r>
+            <a:r>
+              <a:rPr lang="en-US" dirty="0" err="1" smtClean="0"/>
+              <a:t>simboli</a:t>
+            </a:r>
+            <a:r>
+              <a:rPr lang="en-US" dirty="0" smtClean="0"/>
+              <a:t> </a:t>
+            </a:r>
+            <a:r>
+              <a:rPr lang="en-US" dirty="0" err="1" smtClean="0"/>
+              <a:t>dell’applicazione</a:t>
+            </a:r>
+            <a:endParaRPr lang="en-US" dirty="0" smtClean="0"/>
+          </a:p>
+          <a:p>
+            <a:pPr lvl="0" algn="just"/>
+            <a:endParaRPr lang="en-US" dirty="0" smtClean="0"/>
+          </a:p>
+          <a:p>
+            <a:pPr lvl="0" algn="just"/>
+            <a:endParaRPr lang="en-US" dirty="0" smtClean="0"/>
+          </a:p>
+        </p:txBody>
+      </p:sp>
+    </p:spTree>
+    <p:extLst>
+      <p:ext uri="{BB962C8B-B14F-4D97-AF65-F5344CB8AC3E}">
+        <p14:creationId xmlns:p14="http://schemas.microsoft.com/office/powerpoint/2010/main" val="3272081784"/>
+      </p:ext>
+    </p:extLst>
+  </p:cSld>
+  <p:clrMapOvr>
+    <a:masterClrMapping/>
+  </p:clrMapOvr>
+  <mc:AlternateContent xmlns:mc="http://schemas.openxmlformats.org/markup-compatibility/2006" xmlns:p14="http://schemas.microsoft.com/office/powerpoint/2010/main">
+    <mc:Choice Requires="p14">
+      <p:transition spd="slow" p14:dur="2000"/>
+    </mc:Choice>
+    <mc:Fallback xmlns="">
+      <p:transition spd="slow"/>
+    </mc:Fallback>
+  </mc:AlternateContent>
+  <p:timing>
+    <p:tnLst>
+      <p:par>
+        <p:cTn id="1" dur="indefinite" restart="never" nodeType="tmRoot"/>
+      </p:par>
+    </p:tnLst>
+  </p:timing>
+</p:sld>
+</file>
+
+<file path=ppt/slides/slide35.xml><?xml version="1.0" encoding="utf-8"?>
+<p:sld xmlns:a="http://schemas.openxmlformats.org/drawingml/2006/main" xmlns:r="http://schemas.openxmlformats.org/officeDocument/2006/relationships" xmlns:p="http://schemas.openxmlformats.org/presentationml/2006/main">
+  <p:cSld>
+    <p:spTree>
+      <p:nvGrpSpPr>
+        <p:cNvPr id="1" name=""/>
+        <p:cNvGrpSpPr/>
+        <p:nvPr/>
+      </p:nvGrpSpPr>
+      <p:grpSpPr>
+        <a:xfrm>
+          <a:off x="0" y="0"/>
+          <a:ext cx="0" cy="0"/>
+          <a:chOff x="0" y="0"/>
+          <a:chExt cx="0" cy="0"/>
+        </a:xfrm>
+      </p:grpSpPr>
+      <p:sp>
+        <p:nvSpPr>
+          <p:cNvPr id="2" name="Title 1"/>
+          <p:cNvSpPr>
+            <a:spLocks noGrp="1"/>
+          </p:cNvSpPr>
+          <p:nvPr>
+            <p:ph type="title"/>
+          </p:nvPr>
+        </p:nvSpPr>
+        <p:spPr/>
+        <p:txBody>
+          <a:bodyPr/>
+          <a:lstStyle/>
+          <a:p>
+            <a:r>
+              <a:rPr lang="en-US" dirty="0" smtClean="0"/>
+              <a:t>Debugger – just my code</a:t>
+            </a:r>
+            <a:endParaRPr lang="it-IT" dirty="0"/>
+          </a:p>
+        </p:txBody>
+      </p:sp>
+      <p:sp>
+        <p:nvSpPr>
+          <p:cNvPr id="3" name="Content Placeholder 2"/>
+          <p:cNvSpPr>
+            <a:spLocks noGrp="1"/>
+          </p:cNvSpPr>
+          <p:nvPr>
+            <p:ph idx="1"/>
+          </p:nvPr>
+        </p:nvSpPr>
+        <p:spPr/>
+        <p:txBody>
+          <a:bodyPr>
+            <a:normAutofit/>
+          </a:bodyPr>
+          <a:lstStyle/>
+          <a:p>
+            <a:pPr lvl="0" algn="just"/>
+            <a:r>
+              <a:rPr lang="en-US" dirty="0" smtClean="0"/>
+              <a:t>A </a:t>
+            </a:r>
+            <a:r>
+              <a:rPr lang="en-US" dirty="0" err="1" smtClean="0"/>
+              <a:t>partire</a:t>
+            </a:r>
+            <a:r>
+              <a:rPr lang="en-US" dirty="0" smtClean="0"/>
+              <a:t> da Visual Studio 2013 è </a:t>
+            </a:r>
+            <a:r>
+              <a:rPr lang="en-US" dirty="0" err="1" smtClean="0"/>
+              <a:t>possibile</a:t>
+            </a:r>
+            <a:r>
+              <a:rPr lang="en-US" dirty="0" smtClean="0"/>
+              <a:t> </a:t>
+            </a:r>
+            <a:r>
+              <a:rPr lang="en-US" dirty="0" err="1" smtClean="0"/>
+              <a:t>abilitare</a:t>
+            </a:r>
+            <a:r>
+              <a:rPr lang="en-US" dirty="0" smtClean="0"/>
+              <a:t> </a:t>
+            </a:r>
+            <a:r>
+              <a:rPr lang="en-US" dirty="0" err="1" smtClean="0"/>
+              <a:t>un’utile</a:t>
+            </a:r>
+            <a:r>
+              <a:rPr lang="en-US" dirty="0" smtClean="0"/>
+              <a:t> </a:t>
+            </a:r>
+            <a:r>
+              <a:rPr lang="en-US" dirty="0" err="1" smtClean="0"/>
+              <a:t>opzione</a:t>
+            </a:r>
+            <a:r>
+              <a:rPr lang="en-US" dirty="0" smtClean="0"/>
+              <a:t> </a:t>
+            </a:r>
+            <a:r>
+              <a:rPr lang="en-US" dirty="0" err="1" smtClean="0"/>
+              <a:t>fra</a:t>
+            </a:r>
+            <a:r>
+              <a:rPr lang="en-US" dirty="0" smtClean="0"/>
+              <a:t> </a:t>
+            </a:r>
+            <a:r>
+              <a:rPr lang="en-US" dirty="0" err="1" smtClean="0"/>
+              <a:t>quelle</a:t>
+            </a:r>
+            <a:r>
+              <a:rPr lang="en-US" dirty="0" smtClean="0"/>
+              <a:t> di debug, </a:t>
+            </a:r>
+            <a:r>
+              <a:rPr lang="en-US" dirty="0" err="1" smtClean="0"/>
+              <a:t>ovvero</a:t>
+            </a:r>
+            <a:r>
+              <a:rPr lang="en-US" dirty="0" smtClean="0"/>
+              <a:t> “enable just my code” (di default on) </a:t>
+            </a:r>
+            <a:r>
+              <a:rPr lang="en-US" dirty="0" err="1" smtClean="0"/>
+              <a:t>che</a:t>
+            </a:r>
+            <a:r>
+              <a:rPr lang="en-US" dirty="0" smtClean="0"/>
+              <a:t> </a:t>
+            </a:r>
+            <a:r>
+              <a:rPr lang="en-US" dirty="0" err="1" smtClean="0"/>
+              <a:t>agisce</a:t>
+            </a:r>
+            <a:r>
+              <a:rPr lang="en-US" dirty="0" smtClean="0"/>
+              <a:t> </a:t>
+            </a:r>
+            <a:r>
+              <a:rPr lang="en-US" dirty="0" err="1" smtClean="0"/>
+              <a:t>anche</a:t>
+            </a:r>
+            <a:r>
+              <a:rPr lang="en-US" dirty="0" smtClean="0"/>
+              <a:t> per </a:t>
+            </a:r>
+            <a:r>
+              <a:rPr lang="en-US" dirty="0" err="1" smtClean="0"/>
+              <a:t>il</a:t>
+            </a:r>
+            <a:r>
+              <a:rPr lang="en-US" dirty="0" smtClean="0"/>
+              <a:t> </a:t>
+            </a:r>
+            <a:r>
+              <a:rPr lang="en-US" dirty="0" err="1" smtClean="0"/>
+              <a:t>codice</a:t>
+            </a:r>
+            <a:r>
+              <a:rPr lang="en-US" dirty="0" smtClean="0"/>
+              <a:t> native</a:t>
+            </a:r>
+          </a:p>
+          <a:p>
+            <a:pPr lvl="0" algn="just"/>
+            <a:endParaRPr lang="en-US" dirty="0" smtClean="0"/>
+          </a:p>
+          <a:p>
+            <a:pPr marL="0" lvl="0" indent="0" algn="just">
+              <a:buNone/>
+            </a:pPr>
+            <a:endParaRPr lang="en-US" dirty="0" smtClean="0"/>
+          </a:p>
+          <a:p>
+            <a:pPr marL="0" lvl="0" indent="0" algn="just">
+              <a:buNone/>
+            </a:pPr>
+            <a:endParaRPr lang="en-US" dirty="0"/>
+          </a:p>
+          <a:p>
+            <a:pPr lvl="0" algn="just"/>
+            <a:r>
+              <a:rPr lang="en-US" dirty="0" err="1" smtClean="0"/>
+              <a:t>Viene</a:t>
+            </a:r>
+            <a:r>
+              <a:rPr lang="en-US" dirty="0" smtClean="0"/>
+              <a:t> </a:t>
+            </a:r>
+            <a:r>
+              <a:rPr lang="en-US" dirty="0" err="1" smtClean="0"/>
+              <a:t>considerato</a:t>
+            </a:r>
+            <a:r>
+              <a:rPr lang="en-US" dirty="0" smtClean="0"/>
+              <a:t> “not my code”:</a:t>
+            </a:r>
+          </a:p>
+          <a:p>
+            <a:pPr lvl="1" algn="just"/>
+            <a:r>
+              <a:rPr lang="en-US" dirty="0" err="1" smtClean="0"/>
+              <a:t>Funzioni</a:t>
+            </a:r>
+            <a:r>
+              <a:rPr lang="en-US" dirty="0" smtClean="0"/>
+              <a:t> </a:t>
+            </a:r>
+            <a:r>
+              <a:rPr lang="en-US" dirty="0" err="1" smtClean="0"/>
+              <a:t>che</a:t>
+            </a:r>
+            <a:r>
+              <a:rPr lang="en-US" dirty="0" smtClean="0"/>
+              <a:t> </a:t>
+            </a:r>
+            <a:r>
+              <a:rPr lang="en-US" dirty="0" err="1" smtClean="0"/>
+              <a:t>hanno</a:t>
+            </a:r>
+            <a:r>
+              <a:rPr lang="en-US" dirty="0" smtClean="0"/>
+              <a:t> </a:t>
+            </a:r>
+            <a:r>
+              <a:rPr lang="en-US" dirty="0" err="1" smtClean="0"/>
+              <a:t>il</a:t>
+            </a:r>
+            <a:r>
+              <a:rPr lang="en-US" dirty="0" smtClean="0"/>
+              <a:t> .</a:t>
+            </a:r>
+            <a:r>
+              <a:rPr lang="en-US" dirty="0" err="1" smtClean="0"/>
+              <a:t>pdb</a:t>
+            </a:r>
+            <a:r>
+              <a:rPr lang="en-US" dirty="0" smtClean="0"/>
+              <a:t> </a:t>
+            </a:r>
+            <a:r>
+              <a:rPr lang="en-US" dirty="0" err="1" smtClean="0"/>
+              <a:t>associato</a:t>
+            </a:r>
+            <a:r>
+              <a:rPr lang="en-US" dirty="0" smtClean="0"/>
+              <a:t> ma con </a:t>
+            </a:r>
+            <a:r>
+              <a:rPr lang="en-US" dirty="0" err="1" smtClean="0"/>
+              <a:t>l’informazione</a:t>
+            </a:r>
+            <a:r>
+              <a:rPr lang="en-US" dirty="0" smtClean="0"/>
+              <a:t> stripped</a:t>
+            </a:r>
+          </a:p>
+          <a:p>
+            <a:pPr lvl="1" algn="just"/>
+            <a:r>
+              <a:rPr lang="en-US" dirty="0" err="1" smtClean="0"/>
+              <a:t>Funzioni</a:t>
+            </a:r>
+            <a:r>
+              <a:rPr lang="en-US" dirty="0" smtClean="0"/>
+              <a:t> per le </a:t>
+            </a:r>
+            <a:r>
+              <a:rPr lang="en-US" dirty="0" err="1" smtClean="0"/>
+              <a:t>quali</a:t>
+            </a:r>
+            <a:r>
+              <a:rPr lang="en-US" dirty="0" smtClean="0"/>
+              <a:t> </a:t>
+            </a:r>
+            <a:r>
+              <a:rPr lang="en-US" dirty="0" err="1" smtClean="0"/>
+              <a:t>il</a:t>
+            </a:r>
+            <a:r>
+              <a:rPr lang="en-US" dirty="0" smtClean="0"/>
+              <a:t> .</a:t>
+            </a:r>
+            <a:r>
+              <a:rPr lang="en-US" dirty="0" err="1" smtClean="0"/>
+              <a:t>pdb</a:t>
+            </a:r>
+            <a:r>
+              <a:rPr lang="en-US" dirty="0" smtClean="0"/>
+              <a:t> </a:t>
+            </a:r>
+            <a:r>
+              <a:rPr lang="en-US" dirty="0" err="1" smtClean="0"/>
+              <a:t>indica</a:t>
+            </a:r>
+            <a:r>
+              <a:rPr lang="en-US" dirty="0" smtClean="0"/>
+              <a:t> </a:t>
+            </a:r>
+            <a:r>
+              <a:rPr lang="en-US" dirty="0" err="1" smtClean="0"/>
+              <a:t>che</a:t>
+            </a:r>
+            <a:r>
+              <a:rPr lang="en-US" dirty="0" smtClean="0"/>
+              <a:t> non è </a:t>
+            </a:r>
+            <a:r>
+              <a:rPr lang="en-US" dirty="0" err="1" smtClean="0"/>
+              <a:t>presente</a:t>
+            </a:r>
+            <a:r>
+              <a:rPr lang="en-US" dirty="0" smtClean="0"/>
+              <a:t> </a:t>
+            </a:r>
+            <a:r>
+              <a:rPr lang="en-US" dirty="0" err="1" smtClean="0"/>
+              <a:t>il</a:t>
+            </a:r>
+            <a:r>
+              <a:rPr lang="en-US" dirty="0" smtClean="0"/>
+              <a:t> </a:t>
+            </a:r>
+            <a:r>
+              <a:rPr lang="en-US" dirty="0" err="1" smtClean="0"/>
+              <a:t>sorgente</a:t>
+            </a:r>
+            <a:r>
+              <a:rPr lang="en-US" dirty="0" smtClean="0"/>
+              <a:t> </a:t>
+            </a:r>
+            <a:r>
+              <a:rPr lang="en-US" dirty="0" err="1" smtClean="0"/>
+              <a:t>associato</a:t>
+            </a:r>
+            <a:endParaRPr lang="en-US" dirty="0" smtClean="0"/>
+          </a:p>
+          <a:p>
+            <a:pPr lvl="1" algn="just"/>
+            <a:r>
+              <a:rPr lang="en-US" dirty="0" err="1" smtClean="0"/>
+              <a:t>Funzioni</a:t>
+            </a:r>
+            <a:r>
+              <a:rPr lang="en-US" dirty="0" smtClean="0"/>
+              <a:t> </a:t>
+            </a:r>
+            <a:r>
+              <a:rPr lang="en-US" dirty="0" err="1" smtClean="0"/>
+              <a:t>specificate</a:t>
+            </a:r>
+            <a:r>
+              <a:rPr lang="en-US" dirty="0" smtClean="0"/>
+              <a:t> </a:t>
+            </a:r>
+            <a:r>
+              <a:rPr lang="en-US" dirty="0" err="1" smtClean="0"/>
+              <a:t>nei</a:t>
+            </a:r>
+            <a:r>
+              <a:rPr lang="en-US" dirty="0" smtClean="0"/>
+              <a:t> files .</a:t>
+            </a:r>
+            <a:r>
+              <a:rPr lang="en-US" dirty="0" err="1" smtClean="0"/>
+              <a:t>natjmc</a:t>
+            </a:r>
+            <a:r>
+              <a:rPr lang="en-US" dirty="0" smtClean="0"/>
+              <a:t> :</a:t>
+            </a:r>
+          </a:p>
+          <a:p>
+            <a:pPr lvl="2" algn="just"/>
+            <a:r>
+              <a:rPr lang="it-IT" dirty="0" smtClean="0"/>
+              <a:t>%</a:t>
+            </a:r>
+            <a:r>
+              <a:rPr lang="it-IT" dirty="0"/>
+              <a:t>VsInstallDirectory%\Common7\Packages\Debugger\Visualizer</a:t>
+            </a:r>
+            <a:endParaRPr lang="en-US" dirty="0" smtClean="0"/>
+          </a:p>
+        </p:txBody>
+      </p:sp>
+      <p:pic>
+        <p:nvPicPr>
+          <p:cNvPr id="4" name="Picture 3"/>
+          <p:cNvPicPr>
+            <a:picLocks noChangeAspect="1"/>
+          </p:cNvPicPr>
+          <p:nvPr/>
+        </p:nvPicPr>
+        <p:blipFill>
+          <a:blip r:embed="rId2"/>
+          <a:stretch>
+            <a:fillRect/>
+          </a:stretch>
+        </p:blipFill>
+        <p:spPr>
+          <a:xfrm>
+            <a:off x="1261872" y="2984991"/>
+            <a:ext cx="6905625" cy="1028700"/>
+          </a:xfrm>
+          <a:prstGeom prst="rect">
+            <a:avLst/>
+          </a:prstGeom>
+        </p:spPr>
+      </p:pic>
+    </p:spTree>
+    <p:extLst>
+      <p:ext uri="{BB962C8B-B14F-4D97-AF65-F5344CB8AC3E}">
+        <p14:creationId xmlns:p14="http://schemas.microsoft.com/office/powerpoint/2010/main" val="4040920646"/>
+      </p:ext>
+    </p:extLst>
+  </p:cSld>
+  <p:clrMapOvr>
+    <a:masterClrMapping/>
+  </p:clrMapOvr>
+  <mc:AlternateContent xmlns:mc="http://schemas.openxmlformats.org/markup-compatibility/2006" xmlns:p14="http://schemas.microsoft.com/office/powerpoint/2010/main">
+    <mc:Choice Requires="p14">
+      <p:transition spd="slow" p14:dur="2000"/>
+    </mc:Choice>
+    <mc:Fallback xmlns="">
+      <p:transition spd="slow"/>
+    </mc:Fallback>
+  </mc:AlternateContent>
+  <p:timing>
+    <p:tnLst>
+      <p:par>
+        <p:cTn id="1" dur="indefinite" restart="never" nodeType="tmRoot"/>
+      </p:par>
+    </p:tnLst>
+  </p:timing>
+</p:sld>
+</file>
+
+<file path=ppt/slides/slide36.xml><?xml version="1.0" encoding="utf-8"?>
+<p:sld xmlns:a="http://schemas.openxmlformats.org/drawingml/2006/main" xmlns:r="http://schemas.openxmlformats.org/officeDocument/2006/relationships" xmlns:p="http://schemas.openxmlformats.org/presentationml/2006/main">
+  <p:cSld>
+    <p:spTree>
+      <p:nvGrpSpPr>
+        <p:cNvPr id="1" name=""/>
+        <p:cNvGrpSpPr/>
+        <p:nvPr/>
+      </p:nvGrpSpPr>
+      <p:grpSpPr>
+        <a:xfrm>
+          <a:off x="0" y="0"/>
+          <a:ext cx="0" cy="0"/>
+          <a:chOff x="0" y="0"/>
+          <a:chExt cx="0" cy="0"/>
+        </a:xfrm>
+      </p:grpSpPr>
+      <p:sp>
+        <p:nvSpPr>
+          <p:cNvPr id="2" name="Title 1"/>
+          <p:cNvSpPr>
+            <a:spLocks noGrp="1"/>
+          </p:cNvSpPr>
+          <p:nvPr>
+            <p:ph type="title"/>
+          </p:nvPr>
+        </p:nvSpPr>
+        <p:spPr/>
+        <p:txBody>
+          <a:bodyPr/>
+          <a:lstStyle/>
+          <a:p>
+            <a:r>
+              <a:rPr lang="en-US" dirty="0" err="1" smtClean="0"/>
+              <a:t>Customizzare</a:t>
+            </a:r>
+            <a:r>
+              <a:rPr lang="en-US" dirty="0" smtClean="0"/>
+              <a:t> </a:t>
+            </a:r>
+            <a:r>
+              <a:rPr lang="en-US" dirty="0" err="1" smtClean="0"/>
+              <a:t>il</a:t>
+            </a:r>
+            <a:r>
+              <a:rPr lang="en-US" dirty="0" smtClean="0"/>
+              <a:t> “just my code”	</a:t>
+            </a:r>
+            <a:endParaRPr lang="it-IT" dirty="0"/>
+          </a:p>
+        </p:txBody>
+      </p:sp>
+      <p:sp>
+        <p:nvSpPr>
+          <p:cNvPr id="3" name="Content Placeholder 2"/>
+          <p:cNvSpPr>
+            <a:spLocks noGrp="1"/>
+          </p:cNvSpPr>
+          <p:nvPr>
+            <p:ph idx="1"/>
+          </p:nvPr>
+        </p:nvSpPr>
+        <p:spPr/>
+        <p:txBody>
+          <a:bodyPr>
+            <a:normAutofit/>
+          </a:bodyPr>
+          <a:lstStyle/>
+          <a:p>
+            <a:pPr lvl="0" algn="just"/>
+            <a:r>
+              <a:rPr lang="it-IT" dirty="0" smtClean="0"/>
+              <a:t>All’interno del folder </a:t>
+            </a:r>
+            <a:r>
+              <a:rPr lang="it-IT" b="1" dirty="0" smtClean="0"/>
+              <a:t>..\Common7\Packages\Debugger\Visualizers </a:t>
+            </a:r>
+            <a:r>
+              <a:rPr lang="it-IT" dirty="0" smtClean="0"/>
+              <a:t>troviamo alcuni file con i quali possiamo customizzare il comportamento:</a:t>
+            </a:r>
+          </a:p>
+          <a:p>
+            <a:pPr lvl="1" algn="just"/>
+            <a:r>
+              <a:rPr lang="it-IT" b="1" dirty="0" smtClean="0"/>
+              <a:t>*.natjmc: </a:t>
+            </a:r>
+            <a:r>
+              <a:rPr lang="it-IT" dirty="0" smtClean="0"/>
+              <a:t>contiene le informazioni di ciò che non è considerato </a:t>
+            </a:r>
+            <a:r>
+              <a:rPr lang="en-US" dirty="0" smtClean="0"/>
+              <a:t>“my code” in termini di files (</a:t>
+            </a:r>
+            <a:r>
+              <a:rPr lang="en-US" dirty="0" err="1" smtClean="0"/>
+              <a:t>quindi</a:t>
+            </a:r>
+            <a:r>
+              <a:rPr lang="en-US" dirty="0" smtClean="0"/>
+              <a:t> ad </a:t>
+            </a:r>
+            <a:r>
+              <a:rPr lang="en-US" dirty="0" err="1" smtClean="0"/>
+              <a:t>esempio</a:t>
+            </a:r>
+            <a:r>
+              <a:rPr lang="en-US" dirty="0" smtClean="0"/>
+              <a:t> </a:t>
+            </a:r>
+            <a:r>
+              <a:rPr lang="en-US" dirty="0" err="1" smtClean="0"/>
+              <a:t>locazioni</a:t>
+            </a:r>
+            <a:r>
+              <a:rPr lang="en-US" dirty="0" smtClean="0"/>
+              <a:t> di .</a:t>
+            </a:r>
+            <a:r>
+              <a:rPr lang="en-US" dirty="0" err="1" smtClean="0"/>
+              <a:t>dll</a:t>
+            </a:r>
+            <a:r>
+              <a:rPr lang="en-US" dirty="0" smtClean="0"/>
+              <a:t> o di </a:t>
+            </a:r>
+            <a:r>
+              <a:rPr lang="en-US" dirty="0" err="1" smtClean="0"/>
+              <a:t>sorgenti</a:t>
+            </a:r>
+            <a:r>
+              <a:rPr lang="en-US" dirty="0" smtClean="0"/>
+              <a:t>). </a:t>
+            </a:r>
+          </a:p>
+          <a:p>
+            <a:pPr lvl="1" algn="just"/>
+            <a:r>
+              <a:rPr lang="en-US" b="1" dirty="0" smtClean="0"/>
+              <a:t>*.</a:t>
+            </a:r>
+            <a:r>
+              <a:rPr lang="en-US" b="1" dirty="0" err="1" smtClean="0"/>
+              <a:t>natstepfilter</a:t>
+            </a:r>
+            <a:r>
+              <a:rPr lang="en-US" b="1" dirty="0" smtClean="0"/>
+              <a:t>: </a:t>
+            </a:r>
+            <a:r>
+              <a:rPr lang="en-US" dirty="0" err="1" smtClean="0"/>
+              <a:t>contiene</a:t>
+            </a:r>
+            <a:r>
+              <a:rPr lang="en-US" dirty="0" smtClean="0"/>
+              <a:t> le </a:t>
+            </a:r>
+            <a:r>
+              <a:rPr lang="en-US" dirty="0" err="1" smtClean="0"/>
+              <a:t>informazioni</a:t>
+            </a:r>
+            <a:r>
+              <a:rPr lang="en-US" dirty="0" smtClean="0"/>
+              <a:t> di </a:t>
+            </a:r>
+            <a:r>
+              <a:rPr lang="en-US" dirty="0" err="1" smtClean="0"/>
+              <a:t>ciò</a:t>
+            </a:r>
+            <a:r>
+              <a:rPr lang="en-US" dirty="0" smtClean="0"/>
+              <a:t> </a:t>
+            </a:r>
+            <a:r>
+              <a:rPr lang="en-US" dirty="0" err="1" smtClean="0"/>
+              <a:t>che</a:t>
+            </a:r>
+            <a:r>
+              <a:rPr lang="en-US" dirty="0" smtClean="0"/>
+              <a:t> , </a:t>
+            </a:r>
+            <a:r>
+              <a:rPr lang="en-US" dirty="0" err="1" smtClean="0"/>
+              <a:t>durante</a:t>
+            </a:r>
+            <a:r>
+              <a:rPr lang="en-US" dirty="0" smtClean="0"/>
+              <a:t> lo stepping, non è </a:t>
+            </a:r>
+            <a:r>
+              <a:rPr lang="en-US" dirty="0" err="1" smtClean="0"/>
+              <a:t>considerato</a:t>
+            </a:r>
+            <a:r>
+              <a:rPr lang="en-US" dirty="0" smtClean="0"/>
+              <a:t> “my code”</a:t>
+            </a:r>
+            <a:endParaRPr lang="en-US" b="1" dirty="0"/>
+          </a:p>
+          <a:p>
+            <a:pPr algn="just"/>
+            <a:r>
+              <a:rPr lang="it-IT" dirty="0" smtClean="0"/>
+              <a:t>Seguendo un’opportuna sintasssi xml, possiamo:</a:t>
+            </a:r>
+          </a:p>
+          <a:p>
+            <a:pPr lvl="1" algn="just"/>
+            <a:r>
+              <a:rPr lang="it-IT" dirty="0" smtClean="0"/>
+              <a:t>Cambiare il comportamento del call stack aggiungendo regole del primo tipo</a:t>
+            </a:r>
+          </a:p>
+          <a:p>
+            <a:pPr lvl="1" algn="just"/>
+            <a:r>
+              <a:rPr lang="it-IT" dirty="0" smtClean="0"/>
+              <a:t>Cambiare il comportamento dello stepping, aggiungendo regole del secondo tipo</a:t>
+            </a:r>
+          </a:p>
+          <a:p>
+            <a:pPr lvl="1" algn="just"/>
+            <a:r>
+              <a:rPr lang="it-IT" dirty="0" smtClean="0"/>
+              <a:t>Tutto questo sia a livello macchina che a livello di singolo utente (in questo caso i file vanno aggiunti in ..\My </a:t>
+            </a:r>
+            <a:r>
+              <a:rPr lang="it-IT" dirty="0"/>
+              <a:t>Documents\Visual Studio </a:t>
+            </a:r>
+            <a:r>
+              <a:rPr lang="it-IT" dirty="0" smtClean="0"/>
+              <a:t>2013\Visualizers)</a:t>
+            </a:r>
+          </a:p>
+          <a:p>
+            <a:pPr marL="274320" lvl="1" indent="0" algn="just">
+              <a:buNone/>
+            </a:pPr>
+            <a:endParaRPr lang="it-IT" dirty="0" smtClean="0"/>
+          </a:p>
+        </p:txBody>
+      </p:sp>
+    </p:spTree>
+    <p:extLst>
+      <p:ext uri="{BB962C8B-B14F-4D97-AF65-F5344CB8AC3E}">
+        <p14:creationId xmlns:p14="http://schemas.microsoft.com/office/powerpoint/2010/main" val="3553576382"/>
+      </p:ext>
+    </p:extLst>
+  </p:cSld>
+  <p:clrMapOvr>
+    <a:masterClrMapping/>
+  </p:clrMapOvr>
+  <mc:AlternateContent xmlns:mc="http://schemas.openxmlformats.org/markup-compatibility/2006" xmlns:p14="http://schemas.microsoft.com/office/powerpoint/2010/main">
+    <mc:Choice Requires="p14">
+      <p:transition spd="slow" p14:dur="2000"/>
+    </mc:Choice>
+    <mc:Fallback xmlns="">
+      <p:transition spd="slow"/>
+    </mc:Fallback>
+  </mc:AlternateContent>
+  <p:timing>
+    <p:tnLst>
+      <p:par>
+        <p:cTn id="1" dur="indefinite" restart="never" nodeType="tmRoot"/>
+      </p:par>
+    </p:tnLst>
+  </p:timing>
+</p:sld>
+</file>
+
+<file path=ppt/slides/slide37.xml><?xml version="1.0" encoding="utf-8"?>
+<p:sld xmlns:a="http://schemas.openxmlformats.org/drawingml/2006/main" xmlns:r="http://schemas.openxmlformats.org/officeDocument/2006/relationships" xmlns:p="http://schemas.openxmlformats.org/presentationml/2006/main">
+  <p:cSld>
+    <p:spTree>
+      <p:nvGrpSpPr>
+        <p:cNvPr id="1" name=""/>
+        <p:cNvGrpSpPr/>
+        <p:nvPr/>
+      </p:nvGrpSpPr>
+      <p:grpSpPr>
+        <a:xfrm>
+          <a:off x="0" y="0"/>
+          <a:ext cx="0" cy="0"/>
+          <a:chOff x="0" y="0"/>
+          <a:chExt cx="0" cy="0"/>
+        </a:xfrm>
+      </p:grpSpPr>
+      <p:sp>
+        <p:nvSpPr>
+          <p:cNvPr id="2" name="Title 1"/>
+          <p:cNvSpPr>
+            <a:spLocks noGrp="1"/>
+          </p:cNvSpPr>
+          <p:nvPr>
+            <p:ph type="title"/>
+          </p:nvPr>
+        </p:nvSpPr>
+        <p:spPr/>
+        <p:txBody>
+          <a:bodyPr/>
+          <a:lstStyle/>
+          <a:p>
+            <a:r>
+              <a:rPr lang="en-US" dirty="0" err="1" smtClean="0"/>
+              <a:t>Esempi</a:t>
+            </a:r>
+            <a:r>
+              <a:rPr lang="en-US" dirty="0" smtClean="0"/>
+              <a:t>	</a:t>
+            </a:r>
+            <a:endParaRPr lang="it-IT" dirty="0"/>
+          </a:p>
+        </p:txBody>
+      </p:sp>
+      <p:sp>
+        <p:nvSpPr>
+          <p:cNvPr id="3" name="Content Placeholder 2"/>
+          <p:cNvSpPr>
+            <a:spLocks noGrp="1"/>
+          </p:cNvSpPr>
+          <p:nvPr>
+            <p:ph idx="1"/>
+          </p:nvPr>
+        </p:nvSpPr>
+        <p:spPr/>
+        <p:txBody>
+          <a:bodyPr>
+            <a:normAutofit fontScale="92500" lnSpcReduction="10000"/>
+          </a:bodyPr>
+          <a:lstStyle/>
+          <a:p>
+            <a:pPr lvl="0" algn="just"/>
+            <a:r>
+              <a:rPr lang="it-IT" dirty="0" smtClean="0"/>
+              <a:t>Se vogliamo evitare di fare stepping nelle librerie dello standard, creiamo un file .natstepfilter</a:t>
+            </a:r>
+            <a:r>
+              <a:rPr lang="it-IT" dirty="0"/>
+              <a:t> </a:t>
+            </a:r>
+            <a:r>
+              <a:rPr lang="it-IT" dirty="0" smtClean="0"/>
+              <a:t>di questo tipo</a:t>
+            </a:r>
+          </a:p>
+          <a:p>
+            <a:pPr marL="274320" lvl="1" indent="0" algn="just">
+              <a:buNone/>
+            </a:pPr>
+            <a:r>
+              <a:rPr lang="it-IT" dirty="0"/>
+              <a:t>&lt;?xml version="1.0" encoding="utf-8"?&gt;</a:t>
+            </a:r>
+          </a:p>
+          <a:p>
+            <a:pPr marL="274320" lvl="1" indent="0" algn="just">
+              <a:buNone/>
+            </a:pPr>
+            <a:r>
+              <a:rPr lang="it-IT" dirty="0"/>
+              <a:t>&lt;StepFilter xmlns="http://schemas.microsoft.com/vstudio/debugger/natstepfilter/2010"&gt;</a:t>
+            </a:r>
+          </a:p>
+          <a:p>
+            <a:pPr marL="274320" lvl="1" indent="0" algn="just">
+              <a:buNone/>
+            </a:pPr>
+            <a:r>
+              <a:rPr lang="it-IT" dirty="0" smtClean="0"/>
+              <a:t>&lt;</a:t>
+            </a:r>
+            <a:r>
+              <a:rPr lang="it-IT" dirty="0"/>
+              <a:t>Function&gt;&lt;Name&gt;std::.*&lt;/Name&gt;&lt;Action&gt;NoStepInto&lt;/Action&gt;&lt;/Function&gt;</a:t>
+            </a:r>
+          </a:p>
+          <a:p>
+            <a:pPr marL="274320" lvl="1" indent="0" algn="just">
+              <a:buNone/>
+            </a:pPr>
+            <a:r>
+              <a:rPr lang="it-IT" dirty="0"/>
+              <a:t>&lt;/StepFilter</a:t>
+            </a:r>
+            <a:r>
+              <a:rPr lang="it-IT" dirty="0" smtClean="0"/>
+              <a:t>&gt;</a:t>
+            </a:r>
+            <a:endParaRPr lang="it-IT" dirty="0"/>
+          </a:p>
+          <a:p>
+            <a:pPr marL="274320" lvl="1" indent="0" algn="just">
+              <a:buNone/>
+            </a:pPr>
+            <a:endParaRPr lang="it-IT" dirty="0" smtClean="0"/>
+          </a:p>
+          <a:p>
+            <a:pPr algn="just"/>
+            <a:r>
+              <a:rPr lang="it-IT" dirty="0"/>
+              <a:t>Se vogliamo </a:t>
+            </a:r>
+            <a:r>
+              <a:rPr lang="it-IT" dirty="0" smtClean="0"/>
+              <a:t>non far apparire nel call stack il nostro codice, creiamo un file .natjmc di questo tipo</a:t>
+            </a:r>
+            <a:endParaRPr lang="it-IT" dirty="0"/>
+          </a:p>
+          <a:p>
+            <a:pPr marL="274320" lvl="1" indent="0" algn="just">
+              <a:buNone/>
+            </a:pPr>
+            <a:r>
+              <a:rPr lang="it-IT" dirty="0"/>
+              <a:t>&lt;?xml version="1.0" encoding="utf-8"?&gt;</a:t>
+            </a:r>
+          </a:p>
+          <a:p>
+            <a:pPr marL="274320" lvl="1" indent="0" algn="just">
+              <a:buNone/>
+            </a:pPr>
+            <a:r>
+              <a:rPr lang="it-IT" dirty="0"/>
+              <a:t>&lt;NonUserCode xmlns="http://schemas.microsoft.com/vstudio/debugger/jmc/2013"&gt;</a:t>
+            </a:r>
+          </a:p>
+          <a:p>
+            <a:pPr marL="274320" lvl="1" indent="0" algn="just">
+              <a:buNone/>
+            </a:pPr>
+            <a:r>
+              <a:rPr lang="it-IT" dirty="0"/>
+              <a:t>    &lt;File Name="C:\Users\guido_2\Documents\GitHub\Repo\CNG\*.cpp"/&gt;</a:t>
+            </a:r>
+          </a:p>
+          <a:p>
+            <a:pPr marL="274320" lvl="1" indent="0" algn="just">
+              <a:buNone/>
+            </a:pPr>
+            <a:r>
+              <a:rPr lang="it-IT" dirty="0"/>
+              <a:t>&lt;/NonUserCode&gt;</a:t>
+            </a:r>
+          </a:p>
+        </p:txBody>
+      </p:sp>
+    </p:spTree>
+    <p:extLst>
+      <p:ext uri="{BB962C8B-B14F-4D97-AF65-F5344CB8AC3E}">
+        <p14:creationId xmlns:p14="http://schemas.microsoft.com/office/powerpoint/2010/main" val="694614985"/>
+      </p:ext>
+    </p:extLst>
+  </p:cSld>
+  <p:clrMapOvr>
+    <a:masterClrMapping/>
+  </p:clrMapOvr>
+  <mc:AlternateContent xmlns:mc="http://schemas.openxmlformats.org/markup-compatibility/2006">
+    <mc:Choice xmlns:p14="http://schemas.microsoft.com/office/powerpoint/2010/main" Requires="p14">
+      <p:transition spd="slow" p14:dur="2000"/>
+    </mc:Choice>
+    <mc:Fallback>
+      <p:transition spd="slow"/>
+    </mc:Fallback>
+  </mc:AlternateContent>
+  <p:timing>
+    <p:tnLst>
+      <p:par>
+        <p:cTn id="1" dur="indefinite" restart="never" nodeType="tmRoot"/>
+      </p:par>
+    </p:tnLst>
+  </p:timing>
+</p:sld>
+</file>
+
+<file path=ppt/slides/slide38.xml><?xml version="1.0" encoding="utf-8"?>
+<p:sld xmlns:a="http://schemas.openxmlformats.org/drawingml/2006/main" xmlns:r="http://schemas.openxmlformats.org/officeDocument/2006/relationships" xmlns:p="http://schemas.openxmlformats.org/presentationml/2006/main">
+  <p:cSld>
+    <p:spTree>
+      <p:nvGrpSpPr>
+        <p:cNvPr id="1" name=""/>
+        <p:cNvGrpSpPr/>
+        <p:nvPr/>
+      </p:nvGrpSpPr>
+      <p:grpSpPr>
+        <a:xfrm>
+          <a:off x="0" y="0"/>
+          <a:ext cx="0" cy="0"/>
+          <a:chOff x="0" y="0"/>
+          <a:chExt cx="0" cy="0"/>
+        </a:xfrm>
+      </p:grpSpPr>
+      <p:sp>
+        <p:nvSpPr>
+          <p:cNvPr id="2" name="Title 1"/>
+          <p:cNvSpPr>
+            <a:spLocks noGrp="1"/>
+          </p:cNvSpPr>
+          <p:nvPr>
+            <p:ph type="title"/>
+          </p:nvPr>
+        </p:nvSpPr>
+        <p:spPr/>
+        <p:txBody>
+          <a:bodyPr/>
+          <a:lstStyle/>
+          <a:p>
+            <a:r>
+              <a:rPr lang="en-US" dirty="0" smtClean="0"/>
+              <a:t>Debugger – menu settings	</a:t>
+            </a:r>
+            <a:endParaRPr lang="it-IT" dirty="0"/>
+          </a:p>
+        </p:txBody>
+      </p:sp>
+      <p:sp>
+        <p:nvSpPr>
+          <p:cNvPr id="3" name="Content Placeholder 2"/>
+          <p:cNvSpPr>
+            <a:spLocks noGrp="1"/>
+          </p:cNvSpPr>
+          <p:nvPr>
+            <p:ph idx="1"/>
+          </p:nvPr>
+        </p:nvSpPr>
+        <p:spPr/>
+        <p:txBody>
+          <a:bodyPr>
+            <a:normAutofit/>
+          </a:bodyPr>
+          <a:lstStyle/>
+          <a:p>
+            <a:pPr lvl="0" algn="just"/>
+            <a:r>
+              <a:rPr lang="it-IT" dirty="0" smtClean="0"/>
+              <a:t>Il debugger si customizza in Visual Studio sulla base del profilo di sviluppo scelto. </a:t>
+            </a:r>
+            <a:endParaRPr lang="it-IT" dirty="0"/>
+          </a:p>
+          <a:p>
+            <a:pPr lvl="0" algn="just"/>
+            <a:r>
+              <a:rPr lang="it-IT" dirty="0" smtClean="0"/>
+              <a:t>Qualora non siano presenti alcune impostazioni nel menù è possibile ripristinarle agendo in Tool</a:t>
+            </a:r>
+            <a:r>
+              <a:rPr lang="it-IT" dirty="0" smtClean="0">
+                <a:sym typeface="Wingdings" panose="05000000000000000000" pitchFamily="2" charset="2"/>
+              </a:rPr>
+              <a:t>Customize, verificando che la voce </a:t>
+            </a:r>
+            <a:r>
+              <a:rPr lang="en-US" dirty="0" smtClean="0"/>
+              <a:t>”Menu bar” </a:t>
+            </a:r>
+            <a:r>
+              <a:rPr lang="en-US" dirty="0" err="1" smtClean="0"/>
+              <a:t>sia</a:t>
+            </a:r>
+            <a:r>
+              <a:rPr lang="en-US" dirty="0" smtClean="0"/>
+              <a:t> </a:t>
+            </a:r>
+            <a:r>
+              <a:rPr lang="en-US" dirty="0" err="1" smtClean="0"/>
+              <a:t>impostata</a:t>
+            </a:r>
+            <a:r>
+              <a:rPr lang="en-US" dirty="0" smtClean="0"/>
+              <a:t> </a:t>
+            </a:r>
+            <a:r>
+              <a:rPr lang="en-US" dirty="0" err="1" smtClean="0"/>
+              <a:t>su</a:t>
+            </a:r>
+            <a:r>
+              <a:rPr lang="en-US" dirty="0" smtClean="0"/>
+              <a:t> ”Debug”</a:t>
+            </a:r>
+            <a:endParaRPr lang="it-IT" dirty="0" smtClean="0">
+              <a:sym typeface="Wingdings" panose="05000000000000000000" pitchFamily="2" charset="2"/>
+            </a:endParaRPr>
+          </a:p>
+          <a:p>
+            <a:pPr lvl="0" algn="just"/>
+            <a:endParaRPr lang="it-IT" dirty="0" smtClean="0"/>
+          </a:p>
+        </p:txBody>
+      </p:sp>
+      <p:pic>
+        <p:nvPicPr>
+          <p:cNvPr id="4" name="Picture 3"/>
+          <p:cNvPicPr>
+            <a:picLocks noChangeAspect="1"/>
+          </p:cNvPicPr>
+          <p:nvPr/>
+        </p:nvPicPr>
+        <p:blipFill>
+          <a:blip r:embed="rId2"/>
+          <a:stretch>
+            <a:fillRect/>
+          </a:stretch>
+        </p:blipFill>
+        <p:spPr>
+          <a:xfrm>
+            <a:off x="1562027" y="3659431"/>
+            <a:ext cx="3811831" cy="2134971"/>
+          </a:xfrm>
+          <a:prstGeom prst="rect">
+            <a:avLst/>
+          </a:prstGeom>
+        </p:spPr>
+      </p:pic>
+    </p:spTree>
+    <p:extLst>
+      <p:ext uri="{BB962C8B-B14F-4D97-AF65-F5344CB8AC3E}">
+        <p14:creationId xmlns:p14="http://schemas.microsoft.com/office/powerpoint/2010/main" val="303899561"/>
+      </p:ext>
+    </p:extLst>
+  </p:cSld>
+  <p:clrMapOvr>
+    <a:masterClrMapping/>
+  </p:clrMapOvr>
+  <mc:AlternateContent xmlns:mc="http://schemas.openxmlformats.org/markup-compatibility/2006" xmlns:p14="http://schemas.microsoft.com/office/powerpoint/2010/main">
+    <mc:Choice Requires="p14">
+      <p:transition spd="slow" p14:dur="2000"/>
+    </mc:Choice>
+    <mc:Fallback xmlns="">
+      <p:transition spd="slow"/>
+    </mc:Fallback>
+  </mc:AlternateContent>
+  <p:timing>
+    <p:tnLst>
+      <p:par>
+        <p:cTn id="1" dur="indefinite" restart="never" nodeType="tmRoot"/>
+      </p:par>
+    </p:tnLst>
+  </p:timing>
+</p:sld>
+</file>
+
+<file path=ppt/slides/slide39.xml><?xml version="1.0" encoding="utf-8"?>
+<p:sld xmlns:a="http://schemas.openxmlformats.org/drawingml/2006/main" xmlns:r="http://schemas.openxmlformats.org/officeDocument/2006/relationships" xmlns:p="http://schemas.openxmlformats.org/presentationml/2006/main">
+  <p:cSld>
+    <p:spTree>
+      <p:nvGrpSpPr>
+        <p:cNvPr id="1" name=""/>
+        <p:cNvGrpSpPr/>
+        <p:nvPr/>
+      </p:nvGrpSpPr>
+      <p:grpSpPr>
+        <a:xfrm>
+          <a:off x="0" y="0"/>
+          <a:ext cx="0" cy="0"/>
+          <a:chOff x="0" y="0"/>
+          <a:chExt cx="0" cy="0"/>
+        </a:xfrm>
+      </p:grpSpPr>
+      <p:sp>
+        <p:nvSpPr>
+          <p:cNvPr id="2" name="Title 1"/>
+          <p:cNvSpPr>
+            <a:spLocks noGrp="1"/>
+          </p:cNvSpPr>
+          <p:nvPr>
+            <p:ph type="title"/>
+          </p:nvPr>
+        </p:nvSpPr>
+        <p:spPr/>
+        <p:txBody>
+          <a:bodyPr/>
+          <a:lstStyle/>
+          <a:p>
+            <a:r>
+              <a:rPr lang="en-US" dirty="0" smtClean="0"/>
+              <a:t>Debugger – menu settings</a:t>
+            </a:r>
+            <a:r>
+              <a:rPr lang="en-US" dirty="0"/>
+              <a:t> </a:t>
+            </a:r>
+            <a:r>
+              <a:rPr lang="en-US" dirty="0" smtClean="0"/>
+              <a:t>(2)</a:t>
+            </a:r>
+            <a:endParaRPr lang="it-IT" dirty="0"/>
+          </a:p>
+        </p:txBody>
+      </p:sp>
+      <p:sp>
+        <p:nvSpPr>
+          <p:cNvPr id="3" name="Content Placeholder 2"/>
+          <p:cNvSpPr>
+            <a:spLocks noGrp="1"/>
+          </p:cNvSpPr>
+          <p:nvPr>
+            <p:ph idx="1"/>
+          </p:nvPr>
+        </p:nvSpPr>
+        <p:spPr/>
+        <p:txBody>
+          <a:bodyPr>
+            <a:normAutofit/>
+          </a:bodyPr>
+          <a:lstStyle/>
+          <a:p>
+            <a:pPr lvl="0" algn="just"/>
+            <a:r>
+              <a:rPr lang="it-IT" dirty="0" smtClean="0">
+                <a:sym typeface="Wingdings" panose="05000000000000000000" pitchFamily="2" charset="2"/>
+              </a:rPr>
+              <a:t>Alcune voci di menù non sono ripristinabili con il metodo precedente. </a:t>
+            </a:r>
+            <a:endParaRPr lang="it-IT" dirty="0">
+              <a:sym typeface="Wingdings" panose="05000000000000000000" pitchFamily="2" charset="2"/>
+            </a:endParaRPr>
+          </a:p>
+          <a:p>
+            <a:pPr lvl="0" algn="just"/>
+            <a:r>
+              <a:rPr lang="it-IT" dirty="0" smtClean="0">
+                <a:sym typeface="Wingdings" panose="05000000000000000000" pitchFamily="2" charset="2"/>
+              </a:rPr>
+              <a:t>Possiamo quindi resettare le nostre impostazioni da quelle di default, o utilizzare un profilo condiviso nel team. In tal caso è sufficiente utilizzare il wizard in Tools  Import and Export Settings</a:t>
+            </a:r>
+          </a:p>
+        </p:txBody>
+      </p:sp>
+      <p:pic>
+        <p:nvPicPr>
+          <p:cNvPr id="5" name="Picture 4"/>
+          <p:cNvPicPr>
+            <a:picLocks noChangeAspect="1"/>
+          </p:cNvPicPr>
+          <p:nvPr/>
+        </p:nvPicPr>
+        <p:blipFill>
+          <a:blip r:embed="rId2"/>
+          <a:stretch>
+            <a:fillRect/>
+          </a:stretch>
+        </p:blipFill>
+        <p:spPr>
+          <a:xfrm>
+            <a:off x="1420118" y="3294404"/>
+            <a:ext cx="3243212" cy="2885733"/>
+          </a:xfrm>
+          <a:prstGeom prst="rect">
+            <a:avLst/>
+          </a:prstGeom>
+        </p:spPr>
+      </p:pic>
+      <p:sp>
+        <p:nvSpPr>
+          <p:cNvPr id="7" name="TextBox 6"/>
+          <p:cNvSpPr txBox="1"/>
+          <p:nvPr/>
+        </p:nvSpPr>
+        <p:spPr>
+          <a:xfrm>
+            <a:off x="4994031" y="3896751"/>
+            <a:ext cx="5641144" cy="2031325"/>
+          </a:xfrm>
+          <a:prstGeom prst="rect">
+            <a:avLst/>
+          </a:prstGeom>
+          <a:noFill/>
+        </p:spPr>
+        <p:txBody>
+          <a:bodyPr wrap="square" rtlCol="0">
+            <a:spAutoFit/>
+          </a:bodyPr>
+          <a:lstStyle/>
+          <a:p>
+            <a:pPr marL="285750" indent="-285750">
+              <a:buFont typeface="Arial" panose="020B0604020202020204" pitchFamily="34" charset="0"/>
+              <a:buChar char="•"/>
+            </a:pPr>
+            <a:r>
+              <a:rPr lang="it-IT" dirty="0" smtClean="0"/>
+              <a:t>General development settings o Visual C++ Development settings contengono il maggior numero di opzioni pre-configurate</a:t>
+            </a:r>
+          </a:p>
+          <a:p>
+            <a:endParaRPr lang="it-IT" dirty="0" smtClean="0"/>
+          </a:p>
+          <a:p>
+            <a:pPr marL="285750" indent="-285750">
+              <a:buFont typeface="Arial" panose="020B0604020202020204" pitchFamily="34" charset="0"/>
+              <a:buChar char="•"/>
+            </a:pPr>
+            <a:r>
+              <a:rPr lang="it-IT" dirty="0" smtClean="0"/>
+              <a:t>Nello step finale del wizard, alla voce </a:t>
+            </a:r>
+            <a:r>
+              <a:rPr lang="en-US" dirty="0" smtClean="0"/>
+              <a:t>“Option” </a:t>
+            </a:r>
+            <a:r>
+              <a:rPr lang="en-US" dirty="0" err="1" smtClean="0"/>
+              <a:t>verificare</a:t>
+            </a:r>
+            <a:r>
+              <a:rPr lang="en-US" dirty="0" smtClean="0"/>
+              <a:t> </a:t>
+            </a:r>
+            <a:r>
+              <a:rPr lang="en-US" dirty="0" err="1" smtClean="0"/>
+              <a:t>che</a:t>
+            </a:r>
+            <a:r>
+              <a:rPr lang="en-US" dirty="0" smtClean="0"/>
+              <a:t> </a:t>
+            </a:r>
+            <a:r>
+              <a:rPr lang="en-US" dirty="0" err="1" smtClean="0"/>
+              <a:t>sia</a:t>
+            </a:r>
+            <a:r>
+              <a:rPr lang="en-US" dirty="0" smtClean="0"/>
+              <a:t> </a:t>
+            </a:r>
+            <a:r>
+              <a:rPr lang="en-US" dirty="0" err="1" smtClean="0"/>
+              <a:t>spuntata</a:t>
+            </a:r>
+            <a:r>
+              <a:rPr lang="en-US" dirty="0" smtClean="0"/>
+              <a:t> la voce “Debugging”</a:t>
+            </a:r>
+            <a:endParaRPr lang="it-IT" dirty="0" smtClean="0"/>
+          </a:p>
+          <a:p>
+            <a:endParaRPr lang="it-IT" dirty="0"/>
+          </a:p>
+        </p:txBody>
+      </p:sp>
+    </p:spTree>
+    <p:extLst>
+      <p:ext uri="{BB962C8B-B14F-4D97-AF65-F5344CB8AC3E}">
+        <p14:creationId xmlns:p14="http://schemas.microsoft.com/office/powerpoint/2010/main" val="1596394095"/>
+      </p:ext>
+    </p:extLst>
+  </p:cSld>
+  <p:clrMapOvr>
+    <a:masterClrMapping/>
+  </p:clrMapOvr>
+  <mc:AlternateContent xmlns:mc="http://schemas.openxmlformats.org/markup-compatibility/2006" xmlns:p14="http://schemas.microsoft.com/office/powerpoint/2010/main">
+    <mc:Choice Requires="p14">
+      <p:transition spd="slow" p14:dur="2000"/>
+    </mc:Choice>
+    <mc:Fallback xmlns="">
+      <p:transition spd="slow"/>
+    </mc:Fallback>
+  </mc:AlternateContent>
+  <p:timing>
+    <p:tnLst>
+      <p:par>
+        <p:cTn id="1" dur="indefinite" restart="never" nodeType="tmRoot"/>
+      </p:par>
+    </p:tnLst>
+  </p:timing>
+</p:sld>
+</file>
+
+<file path=ppt/slides/slide4.xml><?xml version="1.0" encoding="utf-8"?>
+<p:sld xmlns:a="http://schemas.openxmlformats.org/drawingml/2006/main" xmlns:r="http://schemas.openxmlformats.org/officeDocument/2006/relationships" xmlns:p="http://schemas.openxmlformats.org/presentationml/2006/main">
+  <p:cSld>
+    <p:spTree>
+      <p:nvGrpSpPr>
+        <p:cNvPr id="1" name=""/>
+        <p:cNvGrpSpPr/>
+        <p:nvPr/>
+      </p:nvGrpSpPr>
+      <p:grpSpPr>
+        <a:xfrm>
+          <a:off x="0" y="0"/>
+          <a:ext cx="0" cy="0"/>
+          <a:chOff x="0" y="0"/>
+          <a:chExt cx="0" cy="0"/>
+        </a:xfrm>
+      </p:grpSpPr>
+      <p:sp>
+        <p:nvSpPr>
+          <p:cNvPr id="2" name="Title 1"/>
+          <p:cNvSpPr>
+            <a:spLocks noGrp="1"/>
+          </p:cNvSpPr>
+          <p:nvPr>
+            <p:ph type="title"/>
+          </p:nvPr>
+        </p:nvSpPr>
+        <p:spPr/>
+        <p:txBody>
+          <a:bodyPr/>
+          <a:lstStyle/>
+          <a:p>
+            <a:r>
+              <a:rPr lang="it-IT" dirty="0" smtClean="0"/>
+              <a:t>Chi sono</a:t>
+            </a:r>
+            <a:endParaRPr lang="it-IT" dirty="0"/>
+          </a:p>
+        </p:txBody>
+      </p:sp>
+      <p:sp>
+        <p:nvSpPr>
+          <p:cNvPr id="3" name="Content Placeholder 2"/>
+          <p:cNvSpPr>
+            <a:spLocks noGrp="1"/>
+          </p:cNvSpPr>
+          <p:nvPr>
+            <p:ph idx="1"/>
+          </p:nvPr>
+        </p:nvSpPr>
+        <p:spPr/>
+        <p:txBody>
+          <a:bodyPr>
+            <a:normAutofit/>
+          </a:bodyPr>
+          <a:lstStyle/>
+          <a:p>
+            <a:pPr lvl="0">
+              <a:buNone/>
+            </a:pPr>
+            <a:r>
+              <a:rPr lang="en-US" dirty="0">
+                <a:latin typeface="Calibri" pitchFamily="34"/>
+              </a:rPr>
+              <a:t>Guido </a:t>
+            </a:r>
+            <a:r>
+              <a:rPr lang="en-US" dirty="0" err="1">
+                <a:latin typeface="Calibri" pitchFamily="34"/>
+              </a:rPr>
+              <a:t>Pederzini</a:t>
+            </a:r>
+            <a:endParaRPr lang="en-US" dirty="0">
+              <a:latin typeface="Calibri" pitchFamily="34"/>
+            </a:endParaRPr>
+          </a:p>
+          <a:p>
+            <a:pPr lvl="0"/>
+            <a:r>
+              <a:rPr lang="en-US" dirty="0" err="1">
+                <a:latin typeface="Calibri" pitchFamily="34"/>
+              </a:rPr>
+              <a:t>Ingegnere</a:t>
+            </a:r>
+            <a:r>
+              <a:rPr lang="en-US" dirty="0">
+                <a:latin typeface="Calibri" pitchFamily="34"/>
+              </a:rPr>
+              <a:t> </a:t>
+            </a:r>
+            <a:r>
+              <a:rPr lang="en-US" dirty="0" err="1">
+                <a:latin typeface="Calibri" pitchFamily="34"/>
+              </a:rPr>
+              <a:t>informatico</a:t>
+            </a:r>
+            <a:r>
+              <a:rPr lang="en-US" dirty="0">
+                <a:latin typeface="Calibri" pitchFamily="34"/>
+              </a:rPr>
+              <a:t> di 37 </a:t>
+            </a:r>
+            <a:r>
+              <a:rPr lang="en-US" dirty="0" err="1">
+                <a:latin typeface="Calibri" pitchFamily="34"/>
+              </a:rPr>
+              <a:t>anni</a:t>
+            </a:r>
+            <a:endParaRPr lang="en-US" dirty="0">
+              <a:latin typeface="Calibri" pitchFamily="34"/>
+            </a:endParaRPr>
+          </a:p>
+          <a:p>
+            <a:pPr lvl="0"/>
+            <a:r>
+              <a:rPr lang="en-US" dirty="0" err="1">
+                <a:latin typeface="Calibri" pitchFamily="34"/>
+              </a:rPr>
+              <a:t>Esperienza</a:t>
+            </a:r>
+            <a:r>
+              <a:rPr lang="en-US" dirty="0">
+                <a:latin typeface="Calibri" pitchFamily="34"/>
+              </a:rPr>
+              <a:t> </a:t>
+            </a:r>
+            <a:r>
+              <a:rPr lang="en-US" dirty="0" err="1">
+                <a:latin typeface="Calibri" pitchFamily="34"/>
+              </a:rPr>
+              <a:t>nel</a:t>
+            </a:r>
+            <a:r>
+              <a:rPr lang="en-US" dirty="0">
+                <a:latin typeface="Calibri" pitchFamily="34"/>
+              </a:rPr>
+              <a:t> </a:t>
+            </a:r>
+            <a:r>
+              <a:rPr lang="en-US" dirty="0" err="1">
+                <a:latin typeface="Calibri" pitchFamily="34"/>
+              </a:rPr>
+              <a:t>mondo</a:t>
+            </a:r>
+            <a:r>
+              <a:rPr lang="en-US" dirty="0">
+                <a:latin typeface="Calibri" pitchFamily="34"/>
+              </a:rPr>
+              <a:t> </a:t>
+            </a:r>
+            <a:r>
+              <a:rPr lang="en-US" dirty="0" err="1">
+                <a:latin typeface="Calibri" pitchFamily="34"/>
+              </a:rPr>
+              <a:t>biomedicale</a:t>
+            </a:r>
+            <a:r>
+              <a:rPr lang="en-US" dirty="0">
+                <a:latin typeface="Calibri" pitchFamily="34"/>
+              </a:rPr>
+              <a:t> dal 2004 al 2007</a:t>
+            </a:r>
+          </a:p>
+          <a:p>
+            <a:pPr lvl="0"/>
+            <a:r>
+              <a:rPr lang="en-US" dirty="0">
+                <a:latin typeface="Calibri" pitchFamily="34"/>
+              </a:rPr>
+              <a:t>Un </a:t>
+            </a:r>
+            <a:r>
+              <a:rPr lang="en-US" dirty="0" err="1">
+                <a:latin typeface="Calibri" pitchFamily="34"/>
+              </a:rPr>
+              <a:t>po</a:t>
+            </a:r>
+            <a:r>
+              <a:rPr lang="en-US" dirty="0">
+                <a:latin typeface="Calibri" pitchFamily="34"/>
+              </a:rPr>
+              <a:t>' di web app dal 2007 al 2008</a:t>
+            </a:r>
+          </a:p>
+          <a:p>
+            <a:pPr lvl="0"/>
+            <a:r>
+              <a:rPr lang="en-US" dirty="0">
+                <a:latin typeface="Calibri" pitchFamily="34"/>
+              </a:rPr>
+              <a:t>Dal 2008 </a:t>
+            </a:r>
+            <a:r>
+              <a:rPr lang="en-US" dirty="0" err="1">
+                <a:latin typeface="Calibri" pitchFamily="34"/>
+              </a:rPr>
+              <a:t>membro</a:t>
+            </a:r>
+            <a:r>
+              <a:rPr lang="en-US" dirty="0">
+                <a:latin typeface="Calibri" pitchFamily="34"/>
+              </a:rPr>
+              <a:t> di un team agile, </a:t>
+            </a:r>
+            <a:r>
+              <a:rPr lang="en-US" dirty="0" err="1">
+                <a:latin typeface="Calibri" pitchFamily="34"/>
+              </a:rPr>
+              <a:t>che</a:t>
+            </a:r>
+            <a:r>
+              <a:rPr lang="en-US" dirty="0">
+                <a:latin typeface="Calibri" pitchFamily="34"/>
+              </a:rPr>
+              <a:t> </a:t>
+            </a:r>
+            <a:r>
+              <a:rPr lang="en-US" dirty="0" err="1">
+                <a:latin typeface="Calibri" pitchFamily="34"/>
+              </a:rPr>
+              <a:t>sviluppa</a:t>
+            </a:r>
+            <a:r>
+              <a:rPr lang="en-US" dirty="0">
+                <a:latin typeface="Calibri" pitchFamily="34"/>
+              </a:rPr>
+              <a:t> software per </a:t>
+            </a:r>
+            <a:r>
+              <a:rPr lang="en-US" dirty="0" err="1">
+                <a:latin typeface="Calibri" pitchFamily="34"/>
+              </a:rPr>
+              <a:t>una</a:t>
+            </a:r>
+            <a:r>
+              <a:rPr lang="en-US" dirty="0">
+                <a:latin typeface="Calibri" pitchFamily="34"/>
+              </a:rPr>
+              <a:t> </a:t>
+            </a:r>
+            <a:r>
+              <a:rPr lang="en-US" dirty="0" err="1">
+                <a:latin typeface="Calibri" pitchFamily="34"/>
+              </a:rPr>
+              <a:t>scuderia</a:t>
+            </a:r>
+            <a:r>
+              <a:rPr lang="en-US" dirty="0">
+                <a:latin typeface="Calibri" pitchFamily="34"/>
+              </a:rPr>
+              <a:t> di F1</a:t>
+            </a:r>
+          </a:p>
+          <a:p>
+            <a:endParaRPr lang="it-IT" dirty="0" smtClean="0"/>
+          </a:p>
+        </p:txBody>
+      </p:sp>
+    </p:spTree>
+    <p:extLst>
+      <p:ext uri="{BB962C8B-B14F-4D97-AF65-F5344CB8AC3E}">
+        <p14:creationId xmlns:p14="http://schemas.microsoft.com/office/powerpoint/2010/main" val="1902386279"/>
+      </p:ext>
+    </p:extLst>
+  </p:cSld>
+  <p:clrMapOvr>
+    <a:masterClrMapping/>
+  </p:clrMapOvr>
+  <mc:AlternateContent xmlns:mc="http://schemas.openxmlformats.org/markup-compatibility/2006" xmlns:p14="http://schemas.microsoft.com/office/powerpoint/2010/main">
+    <mc:Choice Requires="p14">
+      <p:transition spd="slow" p14:dur="2000"/>
+    </mc:Choice>
+    <mc:Fallback xmlns="">
+      <p:transition spd="slow"/>
+    </mc:Fallback>
+  </mc:AlternateContent>
+  <p:timing>
+    <p:tnLst>
+      <p:par>
+        <p:cTn id="1" dur="indefinite" restart="never" nodeType="tmRoot"/>
+      </p:par>
+    </p:tnLst>
+  </p:timing>
+</p:sld>
+</file>
+
+<file path=ppt/slides/slide40.xml><?xml version="1.0" encoding="utf-8"?>
+<p:sld xmlns:a="http://schemas.openxmlformats.org/drawingml/2006/main" xmlns:r="http://schemas.openxmlformats.org/officeDocument/2006/relationships" xmlns:p="http://schemas.openxmlformats.org/presentationml/2006/main">
+  <p:cSld>
+    <p:spTree>
+      <p:nvGrpSpPr>
+        <p:cNvPr id="1" name=""/>
+        <p:cNvGrpSpPr/>
+        <p:nvPr/>
+      </p:nvGrpSpPr>
+      <p:grpSpPr>
+        <a:xfrm>
+          <a:off x="0" y="0"/>
+          <a:ext cx="0" cy="0"/>
+          <a:chOff x="0" y="0"/>
+          <a:chExt cx="0" cy="0"/>
+        </a:xfrm>
+      </p:grpSpPr>
+      <p:sp>
+        <p:nvSpPr>
+          <p:cNvPr id="2" name="Title 1"/>
+          <p:cNvSpPr>
+            <a:spLocks noGrp="1"/>
+          </p:cNvSpPr>
+          <p:nvPr>
+            <p:ph type="title"/>
+          </p:nvPr>
+        </p:nvSpPr>
+        <p:spPr/>
+        <p:txBody>
+          <a:bodyPr/>
+          <a:lstStyle/>
+          <a:p>
+            <a:r>
+              <a:rPr lang="en-US" dirty="0" smtClean="0"/>
+              <a:t>Debugger </a:t>
+            </a:r>
+            <a:r>
+              <a:rPr lang="en-US" dirty="0" smtClean="0"/>
+              <a:t>– </a:t>
+            </a:r>
+            <a:r>
+              <a:rPr lang="en-US" dirty="0" err="1" smtClean="0"/>
+              <a:t>configurazioni</a:t>
+            </a:r>
+            <a:r>
+              <a:rPr lang="en-US" dirty="0" smtClean="0"/>
+              <a:t>	</a:t>
+            </a:r>
+            <a:endParaRPr lang="it-IT" dirty="0"/>
+          </a:p>
+        </p:txBody>
+      </p:sp>
+      <p:sp>
+        <p:nvSpPr>
+          <p:cNvPr id="3" name="Content Placeholder 2"/>
+          <p:cNvSpPr>
+            <a:spLocks noGrp="1"/>
+          </p:cNvSpPr>
+          <p:nvPr>
+            <p:ph idx="1"/>
+          </p:nvPr>
+        </p:nvSpPr>
+        <p:spPr/>
+        <p:txBody>
+          <a:bodyPr>
+            <a:normAutofit/>
+          </a:bodyPr>
+          <a:lstStyle/>
+          <a:p>
+            <a:pPr lvl="0" algn="just"/>
+            <a:r>
+              <a:rPr lang="it-IT" dirty="0" smtClean="0"/>
+              <a:t>Le configurazoni di default di Visual Studio per la compilazione in debug sono tipicamente più che sufficienti a impostare una sessione di debug. </a:t>
+            </a:r>
+          </a:p>
+          <a:p>
+            <a:pPr lvl="0" algn="just"/>
+            <a:r>
+              <a:rPr lang="it-IT" dirty="0" smtClean="0"/>
+              <a:t>Molto utili sono 2 opzioni che vengono utilizzate prima di ogni sessione, ovvero </a:t>
+            </a:r>
+          </a:p>
+          <a:p>
+            <a:pPr lvl="1" algn="just"/>
+            <a:r>
+              <a:rPr lang="it-IT" dirty="0" smtClean="0"/>
+              <a:t>Command Argument: possiamo specificare argomenti con cui lanciare l’eseguibile</a:t>
+            </a:r>
+          </a:p>
+          <a:p>
+            <a:pPr lvl="1" algn="just"/>
+            <a:r>
+              <a:rPr lang="it-IT" dirty="0" smtClean="0"/>
+              <a:t>Environment: possiamo impostare variabili d’ambiente per la sessione</a:t>
+            </a:r>
+          </a:p>
+          <a:p>
+            <a:pPr algn="just"/>
+            <a:r>
+              <a:rPr lang="it-IT" dirty="0" smtClean="0"/>
+              <a:t>A livello di progetto:</a:t>
+            </a:r>
+          </a:p>
+          <a:p>
+            <a:pPr lvl="1" algn="just"/>
+            <a:r>
+              <a:rPr lang="it-IT" dirty="0" smtClean="0"/>
+              <a:t>Ottimizzazioni disabilitate (/Od) </a:t>
+            </a:r>
+            <a:r>
+              <a:rPr lang="it-IT" dirty="0" smtClean="0">
+                <a:sym typeface="Wingdings" panose="05000000000000000000" pitchFamily="2" charset="2"/>
+              </a:rPr>
+              <a:t> compile</a:t>
+            </a:r>
+            <a:endParaRPr lang="it-IT" dirty="0" smtClean="0"/>
+          </a:p>
+          <a:p>
+            <a:pPr lvl="1" algn="just"/>
+            <a:r>
+              <a:rPr lang="it-IT" dirty="0" smtClean="0"/>
+              <a:t>Debug information format (/Zi /Z7 /Zi) </a:t>
+            </a:r>
+            <a:r>
+              <a:rPr lang="it-IT" dirty="0">
+                <a:sym typeface="Wingdings" panose="05000000000000000000" pitchFamily="2" charset="2"/>
+              </a:rPr>
+              <a:t> </a:t>
+            </a:r>
+            <a:r>
+              <a:rPr lang="it-IT" dirty="0" smtClean="0">
+                <a:sym typeface="Wingdings" panose="05000000000000000000" pitchFamily="2" charset="2"/>
+              </a:rPr>
+              <a:t>compile</a:t>
+            </a:r>
+            <a:endParaRPr lang="it-IT" dirty="0" smtClean="0"/>
+          </a:p>
+          <a:p>
+            <a:pPr lvl="1" algn="just"/>
+            <a:r>
+              <a:rPr lang="it-IT" dirty="0" smtClean="0"/>
+              <a:t>Generate debug info (/DEBUG) </a:t>
+            </a:r>
+            <a:r>
+              <a:rPr lang="it-IT" dirty="0">
+                <a:sym typeface="Wingdings" panose="05000000000000000000" pitchFamily="2" charset="2"/>
+              </a:rPr>
+              <a:t> </a:t>
+            </a:r>
+            <a:r>
+              <a:rPr lang="it-IT" dirty="0" smtClean="0">
+                <a:sym typeface="Wingdings" panose="05000000000000000000" pitchFamily="2" charset="2"/>
+              </a:rPr>
+              <a:t>link</a:t>
+            </a:r>
+            <a:endParaRPr lang="it-IT" dirty="0" smtClean="0"/>
+          </a:p>
+          <a:p>
+            <a:pPr lvl="1" algn="just"/>
+            <a:r>
+              <a:rPr lang="it-IT" dirty="0" smtClean="0"/>
+              <a:t>Generate map file (/MAP) </a:t>
+            </a:r>
+            <a:r>
+              <a:rPr lang="it-IT" dirty="0">
+                <a:sym typeface="Wingdings" panose="05000000000000000000" pitchFamily="2" charset="2"/>
+              </a:rPr>
+              <a:t> </a:t>
+            </a:r>
+            <a:r>
+              <a:rPr lang="it-IT" dirty="0" smtClean="0">
+                <a:sym typeface="Wingdings" panose="05000000000000000000" pitchFamily="2" charset="2"/>
+              </a:rPr>
+              <a:t>link (opzionale)</a:t>
+            </a:r>
+            <a:endParaRPr lang="it-IT" dirty="0" smtClean="0"/>
+          </a:p>
+          <a:p>
+            <a:pPr lvl="1" algn="just"/>
+            <a:endParaRPr lang="it-IT" dirty="0"/>
+          </a:p>
+          <a:p>
+            <a:pPr marL="274320" lvl="1" indent="0" algn="just">
+              <a:buNone/>
+            </a:pPr>
+            <a:endParaRPr lang="it-IT" dirty="0"/>
+          </a:p>
+        </p:txBody>
+      </p:sp>
+    </p:spTree>
+    <p:extLst>
+      <p:ext uri="{BB962C8B-B14F-4D97-AF65-F5344CB8AC3E}">
+        <p14:creationId xmlns:p14="http://schemas.microsoft.com/office/powerpoint/2010/main" val="1234220844"/>
+      </p:ext>
+    </p:extLst>
+  </p:cSld>
+  <p:clrMapOvr>
+    <a:masterClrMapping/>
+  </p:clrMapOvr>
+  <mc:AlternateContent xmlns:mc="http://schemas.openxmlformats.org/markup-compatibility/2006" xmlns:p14="http://schemas.microsoft.com/office/powerpoint/2010/main">
+    <mc:Choice Requires="p14">
+      <p:transition spd="slow" p14:dur="2000"/>
+    </mc:Choice>
+    <mc:Fallback xmlns="">
+      <p:transition spd="slow"/>
+    </mc:Fallback>
+  </mc:AlternateContent>
+  <p:timing>
+    <p:tnLst>
+      <p:par>
+        <p:cTn id="1" dur="indefinite" restart="never" nodeType="tmRoot"/>
+      </p:par>
+    </p:tnLst>
+  </p:timing>
+</p:sld>
+</file>
+
+<file path=ppt/slides/slide41.xml><?xml version="1.0" encoding="utf-8"?>
+<p:sld xmlns:a="http://schemas.openxmlformats.org/drawingml/2006/main" xmlns:r="http://schemas.openxmlformats.org/officeDocument/2006/relationships" xmlns:p="http://schemas.openxmlformats.org/presentationml/2006/main">
+  <p:cSld>
+    <p:spTree>
+      <p:nvGrpSpPr>
+        <p:cNvPr id="1" name=""/>
+        <p:cNvGrpSpPr/>
+        <p:nvPr/>
+      </p:nvGrpSpPr>
+      <p:grpSpPr>
+        <a:xfrm>
+          <a:off x="0" y="0"/>
+          <a:ext cx="0" cy="0"/>
+          <a:chOff x="0" y="0"/>
+          <a:chExt cx="0" cy="0"/>
+        </a:xfrm>
+      </p:grpSpPr>
+      <p:sp>
+        <p:nvSpPr>
+          <p:cNvPr id="2" name="Title 1"/>
+          <p:cNvSpPr>
+            <a:spLocks noGrp="1"/>
+          </p:cNvSpPr>
+          <p:nvPr>
+            <p:ph type="title"/>
+          </p:nvPr>
+        </p:nvSpPr>
+        <p:spPr/>
+        <p:txBody>
+          <a:bodyPr/>
+          <a:lstStyle/>
+          <a:p>
+            <a:r>
+              <a:rPr lang="en-US" dirty="0" smtClean="0"/>
+              <a:t>Debugger </a:t>
+            </a:r>
+            <a:r>
+              <a:rPr lang="en-US" dirty="0" smtClean="0"/>
+              <a:t>– attach to process</a:t>
+            </a:r>
+            <a:r>
+              <a:rPr lang="en-US" dirty="0" smtClean="0"/>
+              <a:t>	</a:t>
+            </a:r>
+            <a:endParaRPr lang="it-IT" dirty="0"/>
+          </a:p>
+        </p:txBody>
+      </p:sp>
+      <p:sp>
+        <p:nvSpPr>
+          <p:cNvPr id="3" name="Content Placeholder 2"/>
+          <p:cNvSpPr>
+            <a:spLocks noGrp="1"/>
+          </p:cNvSpPr>
+          <p:nvPr>
+            <p:ph idx="1"/>
+          </p:nvPr>
+        </p:nvSpPr>
+        <p:spPr/>
+        <p:txBody>
+          <a:bodyPr>
+            <a:normAutofit/>
+          </a:bodyPr>
+          <a:lstStyle/>
+          <a:p>
+            <a:pPr lvl="0" algn="just"/>
+            <a:r>
+              <a:rPr lang="it-IT" smtClean="0"/>
+              <a:t>Questa opzione è una delle mie preferite, sia per la robustezza che per i vantaggi che porta</a:t>
+            </a:r>
+          </a:p>
+          <a:p>
+            <a:pPr lvl="0" algn="just"/>
+            <a:endParaRPr lang="it-IT" dirty="0"/>
+          </a:p>
+        </p:txBody>
+      </p:sp>
+    </p:spTree>
+    <p:extLst>
+      <p:ext uri="{BB962C8B-B14F-4D97-AF65-F5344CB8AC3E}">
+        <p14:creationId xmlns:p14="http://schemas.microsoft.com/office/powerpoint/2010/main" val="783134709"/>
+      </p:ext>
+    </p:extLst>
+  </p:cSld>
+  <p:clrMapOvr>
+    <a:masterClrMapping/>
+  </p:clrMapOvr>
+  <mc:AlternateContent xmlns:mc="http://schemas.openxmlformats.org/markup-compatibility/2006">
+    <mc:Choice xmlns:p14="http://schemas.microsoft.com/office/powerpoint/2010/main" Requires="p14">
+      <p:transition spd="slow" p14:dur="2000"/>
+    </mc:Choice>
+    <mc:Fallback>
+      <p:transition spd="slow"/>
+    </mc:Fallback>
+  </mc:AlternateContent>
+  <p:timing>
+    <p:tnLst>
+      <p:par>
+        <p:cTn id="1" dur="indefinite" restart="never" nodeType="tmRoot"/>
+      </p:par>
+    </p:tnLst>
+  </p:timing>
+</p:sld>
+</file>
+
+<file path=ppt/slides/slide42.xml><?xml version="1.0" encoding="utf-8"?>
+<p:sld xmlns:a="http://schemas.openxmlformats.org/drawingml/2006/main" xmlns:r="http://schemas.openxmlformats.org/officeDocument/2006/relationships" xmlns:p="http://schemas.openxmlformats.org/presentationml/2006/main">
+  <p:cSld>
+    <p:spTree>
+      <p:nvGrpSpPr>
+        <p:cNvPr id="1" name=""/>
+        <p:cNvGrpSpPr/>
+        <p:nvPr/>
+      </p:nvGrpSpPr>
+      <p:grpSpPr>
+        <a:xfrm>
+          <a:off x="0" y="0"/>
+          <a:ext cx="0" cy="0"/>
+          <a:chOff x="0" y="0"/>
+          <a:chExt cx="0" cy="0"/>
+        </a:xfrm>
+      </p:grpSpPr>
+      <p:sp>
+        <p:nvSpPr>
           <p:cNvPr id="4" name="Title 3"/>
           <p:cNvSpPr>
             <a:spLocks noGrp="1"/>
@@ -15527,7 +18631,7 @@
 </p:sld>
 </file>
 
-<file path=ppt/slides/slide34.xml><?xml version="1.0" encoding="utf-8"?>
+<file path=ppt/slides/slide43.xml><?xml version="1.0" encoding="utf-8"?>
 <p:sld xmlns:a="http://schemas.openxmlformats.org/drawingml/2006/main" xmlns:r="http://schemas.openxmlformats.org/officeDocument/2006/relationships" xmlns:p="http://schemas.openxmlformats.org/presentationml/2006/main">
   <p:cSld>
     <p:spTree>
@@ -15743,292 +18847,6 @@
   <p:clrMapOvr>
     <a:masterClrMapping/>
   </p:clrMapOvr>
-  <p:timing>
-    <p:tnLst>
-      <p:par>
-        <p:cTn id="1" dur="indefinite" restart="never" nodeType="tmRoot"/>
-      </p:par>
-    </p:tnLst>
-  </p:timing>
-</p:sld>
-</file>
-
-<file path=ppt/slides/slide4.xml><?xml version="1.0" encoding="utf-8"?>
-<p:sld xmlns:a="http://schemas.openxmlformats.org/drawingml/2006/main" xmlns:r="http://schemas.openxmlformats.org/officeDocument/2006/relationships" xmlns:p="http://schemas.openxmlformats.org/presentationml/2006/main">
-  <p:cSld>
-    <p:spTree>
-      <p:nvGrpSpPr>
-        <p:cNvPr id="1" name=""/>
-        <p:cNvGrpSpPr/>
-        <p:nvPr/>
-      </p:nvGrpSpPr>
-      <p:grpSpPr>
-        <a:xfrm>
-          <a:off x="0" y="0"/>
-          <a:ext cx="0" cy="0"/>
-          <a:chOff x="0" y="0"/>
-          <a:chExt cx="0" cy="0"/>
-        </a:xfrm>
-      </p:grpSpPr>
-      <p:sp>
-        <p:nvSpPr>
-          <p:cNvPr id="2" name="Title 1"/>
-          <p:cNvSpPr>
-            <a:spLocks noGrp="1"/>
-          </p:cNvSpPr>
-          <p:nvPr>
-            <p:ph type="title"/>
-          </p:nvPr>
-        </p:nvSpPr>
-        <p:spPr/>
-        <p:txBody>
-          <a:bodyPr/>
-          <a:lstStyle/>
-          <a:p>
-            <a:r>
-              <a:rPr lang="it-IT" dirty="0" smtClean="0"/>
-              <a:t>Chi sono</a:t>
-            </a:r>
-            <a:endParaRPr lang="it-IT" dirty="0"/>
-          </a:p>
-        </p:txBody>
-      </p:sp>
-      <p:sp>
-        <p:nvSpPr>
-          <p:cNvPr id="3" name="Content Placeholder 2"/>
-          <p:cNvSpPr>
-            <a:spLocks noGrp="1"/>
-          </p:cNvSpPr>
-          <p:nvPr>
-            <p:ph idx="1"/>
-          </p:nvPr>
-        </p:nvSpPr>
-        <p:spPr/>
-        <p:txBody>
-          <a:bodyPr>
-            <a:normAutofit/>
-          </a:bodyPr>
-          <a:lstStyle/>
-          <a:p>
-            <a:pPr lvl="0">
-              <a:buNone/>
-            </a:pPr>
-            <a:r>
-              <a:rPr lang="en-US" dirty="0">
-                <a:latin typeface="Calibri" pitchFamily="34"/>
-              </a:rPr>
-              <a:t>Guido </a:t>
-            </a:r>
-            <a:r>
-              <a:rPr lang="en-US" dirty="0" err="1">
-                <a:latin typeface="Calibri" pitchFamily="34"/>
-              </a:rPr>
-              <a:t>Pederzini</a:t>
-            </a:r>
-            <a:endParaRPr lang="en-US" dirty="0">
-              <a:latin typeface="Calibri" pitchFamily="34"/>
-            </a:endParaRPr>
-          </a:p>
-          <a:p>
-            <a:pPr lvl="0"/>
-            <a:r>
-              <a:rPr lang="en-US" dirty="0" err="1">
-                <a:latin typeface="Calibri" pitchFamily="34"/>
-              </a:rPr>
-              <a:t>Ingegnere</a:t>
-            </a:r>
-            <a:r>
-              <a:rPr lang="en-US" dirty="0">
-                <a:latin typeface="Calibri" pitchFamily="34"/>
-              </a:rPr>
-              <a:t> </a:t>
-            </a:r>
-            <a:r>
-              <a:rPr lang="en-US" dirty="0" err="1">
-                <a:latin typeface="Calibri" pitchFamily="34"/>
-              </a:rPr>
-              <a:t>informatico</a:t>
-            </a:r>
-            <a:r>
-              <a:rPr lang="en-US" dirty="0">
-                <a:latin typeface="Calibri" pitchFamily="34"/>
-              </a:rPr>
-              <a:t> di 37 </a:t>
-            </a:r>
-            <a:r>
-              <a:rPr lang="en-US" dirty="0" err="1">
-                <a:latin typeface="Calibri" pitchFamily="34"/>
-              </a:rPr>
-              <a:t>anni</a:t>
-            </a:r>
-            <a:endParaRPr lang="en-US" dirty="0">
-              <a:latin typeface="Calibri" pitchFamily="34"/>
-            </a:endParaRPr>
-          </a:p>
-          <a:p>
-            <a:pPr lvl="0"/>
-            <a:r>
-              <a:rPr lang="en-US" dirty="0" err="1">
-                <a:latin typeface="Calibri" pitchFamily="34"/>
-              </a:rPr>
-              <a:t>Esperienza</a:t>
-            </a:r>
-            <a:r>
-              <a:rPr lang="en-US" dirty="0">
-                <a:latin typeface="Calibri" pitchFamily="34"/>
-              </a:rPr>
-              <a:t> </a:t>
-            </a:r>
-            <a:r>
-              <a:rPr lang="en-US" dirty="0" err="1">
-                <a:latin typeface="Calibri" pitchFamily="34"/>
-              </a:rPr>
-              <a:t>nel</a:t>
-            </a:r>
-            <a:r>
-              <a:rPr lang="en-US" dirty="0">
-                <a:latin typeface="Calibri" pitchFamily="34"/>
-              </a:rPr>
-              <a:t> </a:t>
-            </a:r>
-            <a:r>
-              <a:rPr lang="en-US" dirty="0" err="1">
-                <a:latin typeface="Calibri" pitchFamily="34"/>
-              </a:rPr>
-              <a:t>mondo</a:t>
-            </a:r>
-            <a:r>
-              <a:rPr lang="en-US" dirty="0">
-                <a:latin typeface="Calibri" pitchFamily="34"/>
-              </a:rPr>
-              <a:t> </a:t>
-            </a:r>
-            <a:r>
-              <a:rPr lang="en-US" dirty="0" err="1">
-                <a:latin typeface="Calibri" pitchFamily="34"/>
-              </a:rPr>
-              <a:t>biomedicale</a:t>
-            </a:r>
-            <a:r>
-              <a:rPr lang="en-US" dirty="0">
-                <a:latin typeface="Calibri" pitchFamily="34"/>
-              </a:rPr>
-              <a:t> dal 2004 al 2007</a:t>
-            </a:r>
-          </a:p>
-          <a:p>
-            <a:pPr lvl="0"/>
-            <a:r>
-              <a:rPr lang="en-US" dirty="0">
-                <a:latin typeface="Calibri" pitchFamily="34"/>
-              </a:rPr>
-              <a:t>Un </a:t>
-            </a:r>
-            <a:r>
-              <a:rPr lang="en-US" dirty="0" err="1">
-                <a:latin typeface="Calibri" pitchFamily="34"/>
-              </a:rPr>
-              <a:t>po</a:t>
-            </a:r>
-            <a:r>
-              <a:rPr lang="en-US" dirty="0">
-                <a:latin typeface="Calibri" pitchFamily="34"/>
-              </a:rPr>
-              <a:t>' di web app dal 2007 al 2008</a:t>
-            </a:r>
-          </a:p>
-          <a:p>
-            <a:pPr lvl="0"/>
-            <a:r>
-              <a:rPr lang="en-US" dirty="0">
-                <a:latin typeface="Calibri" pitchFamily="34"/>
-              </a:rPr>
-              <a:t>Dal 2008 </a:t>
-            </a:r>
-            <a:r>
-              <a:rPr lang="en-US" dirty="0" err="1">
-                <a:latin typeface="Calibri" pitchFamily="34"/>
-              </a:rPr>
-              <a:t>membro</a:t>
-            </a:r>
-            <a:r>
-              <a:rPr lang="en-US" dirty="0">
-                <a:latin typeface="Calibri" pitchFamily="34"/>
-              </a:rPr>
-              <a:t> di un team agile, </a:t>
-            </a:r>
-            <a:r>
-              <a:rPr lang="en-US" dirty="0" err="1">
-                <a:latin typeface="Calibri" pitchFamily="34"/>
-              </a:rPr>
-              <a:t>che</a:t>
-            </a:r>
-            <a:r>
-              <a:rPr lang="en-US" dirty="0">
-                <a:latin typeface="Calibri" pitchFamily="34"/>
-              </a:rPr>
-              <a:t> </a:t>
-            </a:r>
-            <a:r>
-              <a:rPr lang="en-US" dirty="0" err="1">
-                <a:latin typeface="Calibri" pitchFamily="34"/>
-              </a:rPr>
-              <a:t>sviluppa</a:t>
-            </a:r>
-            <a:r>
-              <a:rPr lang="en-US" dirty="0">
-                <a:latin typeface="Calibri" pitchFamily="34"/>
-              </a:rPr>
-              <a:t> software per </a:t>
-            </a:r>
-            <a:r>
-              <a:rPr lang="en-US" dirty="0" err="1">
-                <a:latin typeface="Calibri" pitchFamily="34"/>
-              </a:rPr>
-              <a:t>una</a:t>
-            </a:r>
-            <a:r>
-              <a:rPr lang="en-US" dirty="0">
-                <a:latin typeface="Calibri" pitchFamily="34"/>
-              </a:rPr>
-              <a:t> </a:t>
-            </a:r>
-            <a:r>
-              <a:rPr lang="en-US" dirty="0" err="1">
-                <a:latin typeface="Calibri" pitchFamily="34"/>
-              </a:rPr>
-              <a:t>scuderia</a:t>
-            </a:r>
-            <a:r>
-              <a:rPr lang="en-US" dirty="0">
-                <a:latin typeface="Calibri" pitchFamily="34"/>
-              </a:rPr>
-              <a:t> di F1</a:t>
-            </a:r>
-          </a:p>
-          <a:p>
-            <a:endParaRPr lang="it-IT" dirty="0" smtClean="0"/>
-          </a:p>
-        </p:txBody>
-      </p:sp>
-    </p:spTree>
-    <p:extLst>
-      <p:ext uri="{BB962C8B-B14F-4D97-AF65-F5344CB8AC3E}">
-        <p14:creationId xmlns:p14="http://schemas.microsoft.com/office/powerpoint/2010/main" val="1902386279"/>
-      </p:ext>
-    </p:extLst>
-  </p:cSld>
-  <p:clrMapOvr>
-    <a:masterClrMapping/>
-  </p:clrMapOvr>
-  <mc:AlternateContent xmlns:mc="http://schemas.openxmlformats.org/markup-compatibility/2006" xmlns:p14="http://schemas.microsoft.com/office/powerpoint/2010/main">
-    <mc:Choice Requires="p14">
-      <p:transition spd="slow" p14:dur="2000"/>
-    </mc:Choice>
-    <mc:Fallback xmlns="">
-      <p:transition spd="slow"/>
-    </mc:Fallback>
-  </mc:AlternateContent>
   <p:timing>
     <p:tnLst>
       <p:par>
@@ -17028,13 +19846,10 @@
               </a:spcBef>
             </a:pPr>
             <a:r>
-              <a:rPr lang="en-US" dirty="0" err="1"/>
-              <a:t>Strumenti</a:t>
-            </a:r>
-            <a:r>
-              <a:rPr lang="en-US" dirty="0"/>
-              <a:t> di testing</a:t>
-            </a:r>
+              <a:rPr lang="en-US" dirty="0" err="1" smtClean="0"/>
+              <a:t>Conclusioni</a:t>
+            </a:r>
+            <a:endParaRPr lang="en-US" dirty="0"/>
           </a:p>
           <a:p>
             <a:pPr marL="0" lvl="0" indent="0">

</xml_diff>